<commit_message>
Added home page content and overall documentation.
</commit_message>
<xml_diff>
--- a/diagrams/FHIR Measure IG Diagram.pptx
+++ b/diagrams/FHIR Measure IG Diagram.pptx
@@ -6,6 +6,9 @@
   </p:sldMasterIdLst>
   <p:sldIdLst>
     <p:sldId id="256" r:id="rId2"/>
+    <p:sldId id="257" r:id="rId3"/>
+    <p:sldId id="258" r:id="rId4"/>
+    <p:sldId id="259" r:id="rId5"/>
   </p:sldIdLst>
   <p:sldSz cx="12192000" cy="6858000"/>
   <p:notesSz cx="6858000" cy="9144000"/>
@@ -104,6 +107,11 @@
       </a:defRPr>
     </a:lvl9pPr>
   </p:defaultTextStyle>
+  <p:extLst>
+    <p:ext uri="{EFAFB233-063F-42B5-8137-9DF3F51BA10A}">
+      <p15:sldGuideLst xmlns:p15="http://schemas.microsoft.com/office/powerpoint/2012/main"/>
+    </p:ext>
+  </p:extLst>
 </p:presentation>
 </file>
 
@@ -254,7 +262,7 @@
           <a:p>
             <a:fld id="{A1C33FE8-8021-45D4-B0C5-0B5FC73F013B}" type="datetimeFigureOut">
               <a:rPr lang="en-US" smtClean="0"/>
-              <a:t>2/28/2019</a:t>
+              <a:t>3/3/2019</a:t>
             </a:fld>
             <a:endParaRPr lang="en-US"/>
           </a:p>
@@ -452,7 +460,7 @@
           <a:p>
             <a:fld id="{A1C33FE8-8021-45D4-B0C5-0B5FC73F013B}" type="datetimeFigureOut">
               <a:rPr lang="en-US" smtClean="0"/>
-              <a:t>2/28/2019</a:t>
+              <a:t>3/3/2019</a:t>
             </a:fld>
             <a:endParaRPr lang="en-US"/>
           </a:p>
@@ -660,7 +668,7 @@
           <a:p>
             <a:fld id="{A1C33FE8-8021-45D4-B0C5-0B5FC73F013B}" type="datetimeFigureOut">
               <a:rPr lang="en-US" smtClean="0"/>
-              <a:t>2/28/2019</a:t>
+              <a:t>3/3/2019</a:t>
             </a:fld>
             <a:endParaRPr lang="en-US"/>
           </a:p>
@@ -858,7 +866,7 @@
           <a:p>
             <a:fld id="{A1C33FE8-8021-45D4-B0C5-0B5FC73F013B}" type="datetimeFigureOut">
               <a:rPr lang="en-US" smtClean="0"/>
-              <a:t>2/28/2019</a:t>
+              <a:t>3/3/2019</a:t>
             </a:fld>
             <a:endParaRPr lang="en-US"/>
           </a:p>
@@ -1133,7 +1141,7 @@
           <a:p>
             <a:fld id="{A1C33FE8-8021-45D4-B0C5-0B5FC73F013B}" type="datetimeFigureOut">
               <a:rPr lang="en-US" smtClean="0"/>
-              <a:t>2/28/2019</a:t>
+              <a:t>3/3/2019</a:t>
             </a:fld>
             <a:endParaRPr lang="en-US"/>
           </a:p>
@@ -1398,7 +1406,7 @@
           <a:p>
             <a:fld id="{A1C33FE8-8021-45D4-B0C5-0B5FC73F013B}" type="datetimeFigureOut">
               <a:rPr lang="en-US" smtClean="0"/>
-              <a:t>2/28/2019</a:t>
+              <a:t>3/3/2019</a:t>
             </a:fld>
             <a:endParaRPr lang="en-US"/>
           </a:p>
@@ -1810,7 +1818,7 @@
           <a:p>
             <a:fld id="{A1C33FE8-8021-45D4-B0C5-0B5FC73F013B}" type="datetimeFigureOut">
               <a:rPr lang="en-US" smtClean="0"/>
-              <a:t>2/28/2019</a:t>
+              <a:t>3/3/2019</a:t>
             </a:fld>
             <a:endParaRPr lang="en-US"/>
           </a:p>
@@ -1951,7 +1959,7 @@
           <a:p>
             <a:fld id="{A1C33FE8-8021-45D4-B0C5-0B5FC73F013B}" type="datetimeFigureOut">
               <a:rPr lang="en-US" smtClean="0"/>
-              <a:t>2/28/2019</a:t>
+              <a:t>3/3/2019</a:t>
             </a:fld>
             <a:endParaRPr lang="en-US"/>
           </a:p>
@@ -2064,7 +2072,7 @@
           <a:p>
             <a:fld id="{A1C33FE8-8021-45D4-B0C5-0B5FC73F013B}" type="datetimeFigureOut">
               <a:rPr lang="en-US" smtClean="0"/>
-              <a:t>2/28/2019</a:t>
+              <a:t>3/3/2019</a:t>
             </a:fld>
             <a:endParaRPr lang="en-US"/>
           </a:p>
@@ -2375,7 +2383,7 @@
           <a:p>
             <a:fld id="{A1C33FE8-8021-45D4-B0C5-0B5FC73F013B}" type="datetimeFigureOut">
               <a:rPr lang="en-US" smtClean="0"/>
-              <a:t>2/28/2019</a:t>
+              <a:t>3/3/2019</a:t>
             </a:fld>
             <a:endParaRPr lang="en-US"/>
           </a:p>
@@ -2663,7 +2671,7 @@
           <a:p>
             <a:fld id="{A1C33FE8-8021-45D4-B0C5-0B5FC73F013B}" type="datetimeFigureOut">
               <a:rPr lang="en-US" smtClean="0"/>
-              <a:t>2/28/2019</a:t>
+              <a:t>3/3/2019</a:t>
             </a:fld>
             <a:endParaRPr lang="en-US"/>
           </a:p>
@@ -2904,7 +2912,7 @@
           <a:p>
             <a:fld id="{A1C33FE8-8021-45D4-B0C5-0B5FC73F013B}" type="datetimeFigureOut">
               <a:rPr lang="en-US" smtClean="0"/>
-              <a:t>2/28/2019</a:t>
+              <a:t>3/3/2019</a:t>
             </a:fld>
             <a:endParaRPr lang="en-US"/>
           </a:p>
@@ -4111,6 +4119,3466 @@
 </p:sld>
 </file>
 
+<file path=ppt/slides/slide2.xml><?xml version="1.0" encoding="utf-8"?>
+<p:sld xmlns:a="http://schemas.openxmlformats.org/drawingml/2006/main" xmlns:r="http://schemas.openxmlformats.org/officeDocument/2006/relationships" xmlns:p="http://schemas.openxmlformats.org/presentationml/2006/main">
+  <p:cSld>
+    <p:spTree>
+      <p:nvGrpSpPr>
+        <p:cNvPr id="1" name=""/>
+        <p:cNvGrpSpPr/>
+        <p:nvPr/>
+      </p:nvGrpSpPr>
+      <p:grpSpPr>
+        <a:xfrm>
+          <a:off x="0" y="0"/>
+          <a:ext cx="0" cy="0"/>
+          <a:chOff x="0" y="0"/>
+          <a:chExt cx="0" cy="0"/>
+        </a:xfrm>
+      </p:grpSpPr>
+      <p:sp>
+        <p:nvSpPr>
+          <p:cNvPr id="6" name="Rectangle: Rounded Corners 5">
+            <a:extLst>
+              <a:ext uri="{FF2B5EF4-FFF2-40B4-BE49-F238E27FC236}">
+                <a16:creationId xmlns:a16="http://schemas.microsoft.com/office/drawing/2014/main" id="{4E289A37-AAC9-488D-9593-3C38AE6BDFBC}"/>
+              </a:ext>
+            </a:extLst>
+          </p:cNvPr>
+          <p:cNvSpPr/>
+          <p:nvPr/>
+        </p:nvSpPr>
+        <p:spPr>
+          <a:xfrm>
+            <a:off x="1498600" y="1371600"/>
+            <a:ext cx="4699000" cy="4051300"/>
+          </a:xfrm>
+          <a:prstGeom prst="roundRect">
+            <a:avLst>
+              <a:gd name="adj" fmla="val 2343"/>
+            </a:avLst>
+          </a:prstGeom>
+        </p:spPr>
+        <p:style>
+          <a:lnRef idx="2">
+            <a:schemeClr val="dk1"/>
+          </a:lnRef>
+          <a:fillRef idx="1">
+            <a:schemeClr val="lt1"/>
+          </a:fillRef>
+          <a:effectRef idx="0">
+            <a:schemeClr val="dk1"/>
+          </a:effectRef>
+          <a:fontRef idx="minor">
+            <a:schemeClr val="dk1"/>
+          </a:fontRef>
+        </p:style>
+        <p:txBody>
+          <a:bodyPr rtlCol="0" anchor="ctr"/>
+          <a:lstStyle/>
+          <a:p>
+            <a:pPr algn="ctr"/>
+            <a:endParaRPr lang="en-US"/>
+          </a:p>
+        </p:txBody>
+      </p:sp>
+      <p:sp>
+        <p:nvSpPr>
+          <p:cNvPr id="7" name="Rectangle: Rounded Corners 6">
+            <a:extLst>
+              <a:ext uri="{FF2B5EF4-FFF2-40B4-BE49-F238E27FC236}">
+                <a16:creationId xmlns:a16="http://schemas.microsoft.com/office/drawing/2014/main" id="{2149A16D-3E06-4C75-9E39-09DBD6971A85}"/>
+              </a:ext>
+            </a:extLst>
+          </p:cNvPr>
+          <p:cNvSpPr/>
+          <p:nvPr/>
+        </p:nvSpPr>
+        <p:spPr>
+          <a:xfrm>
+            <a:off x="6350000" y="1371598"/>
+            <a:ext cx="4699000" cy="4051301"/>
+          </a:xfrm>
+          <a:prstGeom prst="roundRect">
+            <a:avLst>
+              <a:gd name="adj" fmla="val 2343"/>
+            </a:avLst>
+          </a:prstGeom>
+        </p:spPr>
+        <p:style>
+          <a:lnRef idx="2">
+            <a:schemeClr val="dk1"/>
+          </a:lnRef>
+          <a:fillRef idx="1">
+            <a:schemeClr val="lt1"/>
+          </a:fillRef>
+          <a:effectRef idx="0">
+            <a:schemeClr val="dk1"/>
+          </a:effectRef>
+          <a:fontRef idx="minor">
+            <a:schemeClr val="dk1"/>
+          </a:fontRef>
+        </p:style>
+        <p:txBody>
+          <a:bodyPr rtlCol="0" anchor="ctr"/>
+          <a:lstStyle/>
+          <a:p>
+            <a:pPr algn="ctr"/>
+            <a:endParaRPr lang="en-US"/>
+          </a:p>
+        </p:txBody>
+      </p:sp>
+      <p:sp>
+        <p:nvSpPr>
+          <p:cNvPr id="37" name="Rectangle: Rounded Corners 36">
+            <a:extLst>
+              <a:ext uri="{FF2B5EF4-FFF2-40B4-BE49-F238E27FC236}">
+                <a16:creationId xmlns:a16="http://schemas.microsoft.com/office/drawing/2014/main" id="{052A4214-ECE4-40CE-A54B-ACBE1A839161}"/>
+              </a:ext>
+            </a:extLst>
+          </p:cNvPr>
+          <p:cNvSpPr/>
+          <p:nvPr/>
+        </p:nvSpPr>
+        <p:spPr>
+          <a:xfrm>
+            <a:off x="1749428" y="3383933"/>
+            <a:ext cx="9020173" cy="502093"/>
+          </a:xfrm>
+          <a:prstGeom prst="roundRect">
+            <a:avLst/>
+          </a:prstGeom>
+        </p:spPr>
+        <p:style>
+          <a:lnRef idx="1">
+            <a:schemeClr val="accent3"/>
+          </a:lnRef>
+          <a:fillRef idx="2">
+            <a:schemeClr val="accent3"/>
+          </a:fillRef>
+          <a:effectRef idx="1">
+            <a:schemeClr val="accent3"/>
+          </a:effectRef>
+          <a:fontRef idx="minor">
+            <a:schemeClr val="dk1"/>
+          </a:fontRef>
+        </p:style>
+        <p:txBody>
+          <a:bodyPr rtlCol="0" anchor="ctr"/>
+          <a:lstStyle/>
+          <a:p>
+            <a:pPr algn="ctr"/>
+            <a:endParaRPr lang="en-US"/>
+          </a:p>
+        </p:txBody>
+      </p:sp>
+      <p:sp>
+        <p:nvSpPr>
+          <p:cNvPr id="24" name="Rectangle: Rounded Corners 23">
+            <a:extLst>
+              <a:ext uri="{FF2B5EF4-FFF2-40B4-BE49-F238E27FC236}">
+                <a16:creationId xmlns:a16="http://schemas.microsoft.com/office/drawing/2014/main" id="{AFEA0268-1FB0-4632-93CF-73B62257520E}"/>
+              </a:ext>
+            </a:extLst>
+          </p:cNvPr>
+          <p:cNvSpPr/>
+          <p:nvPr/>
+        </p:nvSpPr>
+        <p:spPr>
+          <a:xfrm>
+            <a:off x="7889874" y="3980250"/>
+            <a:ext cx="2882897" cy="1257556"/>
+          </a:xfrm>
+          <a:prstGeom prst="roundRect">
+            <a:avLst>
+              <a:gd name="adj" fmla="val 10318"/>
+            </a:avLst>
+          </a:prstGeom>
+        </p:spPr>
+        <p:style>
+          <a:lnRef idx="1">
+            <a:schemeClr val="accent1"/>
+          </a:lnRef>
+          <a:fillRef idx="2">
+            <a:schemeClr val="accent1"/>
+          </a:fillRef>
+          <a:effectRef idx="1">
+            <a:schemeClr val="accent1"/>
+          </a:effectRef>
+          <a:fontRef idx="minor">
+            <a:schemeClr val="dk1"/>
+          </a:fontRef>
+        </p:style>
+        <p:txBody>
+          <a:bodyPr rtlCol="0" anchor="ctr"/>
+          <a:lstStyle/>
+          <a:p>
+            <a:pPr algn="ctr"/>
+            <a:endParaRPr lang="en-US"/>
+          </a:p>
+        </p:txBody>
+      </p:sp>
+      <p:sp>
+        <p:nvSpPr>
+          <p:cNvPr id="23" name="Rectangle: Rounded Corners 22">
+            <a:extLst>
+              <a:ext uri="{FF2B5EF4-FFF2-40B4-BE49-F238E27FC236}">
+                <a16:creationId xmlns:a16="http://schemas.microsoft.com/office/drawing/2014/main" id="{F395024D-6F23-4B7B-91C4-91702F3CB480}"/>
+              </a:ext>
+            </a:extLst>
+          </p:cNvPr>
+          <p:cNvSpPr/>
+          <p:nvPr/>
+        </p:nvSpPr>
+        <p:spPr>
+          <a:xfrm>
+            <a:off x="4829175" y="3980250"/>
+            <a:ext cx="2927347" cy="1257556"/>
+          </a:xfrm>
+          <a:prstGeom prst="roundRect">
+            <a:avLst>
+              <a:gd name="adj" fmla="val 10318"/>
+            </a:avLst>
+          </a:prstGeom>
+        </p:spPr>
+        <p:style>
+          <a:lnRef idx="1">
+            <a:schemeClr val="accent4"/>
+          </a:lnRef>
+          <a:fillRef idx="2">
+            <a:schemeClr val="accent4"/>
+          </a:fillRef>
+          <a:effectRef idx="1">
+            <a:schemeClr val="accent4"/>
+          </a:effectRef>
+          <a:fontRef idx="minor">
+            <a:schemeClr val="dk1"/>
+          </a:fontRef>
+        </p:style>
+        <p:txBody>
+          <a:bodyPr rtlCol="0" anchor="ctr"/>
+          <a:lstStyle/>
+          <a:p>
+            <a:pPr algn="ctr"/>
+            <a:endParaRPr lang="en-US"/>
+          </a:p>
+        </p:txBody>
+      </p:sp>
+      <p:sp>
+        <p:nvSpPr>
+          <p:cNvPr id="22" name="Rectangle: Rounded Corners 21">
+            <a:extLst>
+              <a:ext uri="{FF2B5EF4-FFF2-40B4-BE49-F238E27FC236}">
+                <a16:creationId xmlns:a16="http://schemas.microsoft.com/office/drawing/2014/main" id="{B8730D48-DA44-4CFF-96B0-42AB11912DE8}"/>
+              </a:ext>
+            </a:extLst>
+          </p:cNvPr>
+          <p:cNvSpPr/>
+          <p:nvPr/>
+        </p:nvSpPr>
+        <p:spPr>
+          <a:xfrm>
+            <a:off x="1749428" y="3980250"/>
+            <a:ext cx="2927347" cy="1257556"/>
+          </a:xfrm>
+          <a:prstGeom prst="roundRect">
+            <a:avLst>
+              <a:gd name="adj" fmla="val 10318"/>
+            </a:avLst>
+          </a:prstGeom>
+        </p:spPr>
+        <p:style>
+          <a:lnRef idx="1">
+            <a:schemeClr val="accent6"/>
+          </a:lnRef>
+          <a:fillRef idx="2">
+            <a:schemeClr val="accent6"/>
+          </a:fillRef>
+          <a:effectRef idx="1">
+            <a:schemeClr val="accent6"/>
+          </a:effectRef>
+          <a:fontRef idx="minor">
+            <a:schemeClr val="dk1"/>
+          </a:fontRef>
+        </p:style>
+        <p:txBody>
+          <a:bodyPr rtlCol="0" anchor="ctr"/>
+          <a:lstStyle/>
+          <a:p>
+            <a:pPr algn="ctr"/>
+            <a:endParaRPr lang="en-US"/>
+          </a:p>
+        </p:txBody>
+      </p:sp>
+      <p:sp>
+        <p:nvSpPr>
+          <p:cNvPr id="20" name="Rectangle: Rounded Corners 19">
+            <a:extLst>
+              <a:ext uri="{FF2B5EF4-FFF2-40B4-BE49-F238E27FC236}">
+                <a16:creationId xmlns:a16="http://schemas.microsoft.com/office/drawing/2014/main" id="{9CBB8A51-5E31-4B40-9525-A6D4D6FDC7FF}"/>
+              </a:ext>
+            </a:extLst>
+          </p:cNvPr>
+          <p:cNvSpPr/>
+          <p:nvPr/>
+        </p:nvSpPr>
+        <p:spPr>
+          <a:xfrm>
+            <a:off x="1752598" y="1559698"/>
+            <a:ext cx="9020173" cy="1724451"/>
+          </a:xfrm>
+          <a:prstGeom prst="roundRect">
+            <a:avLst>
+              <a:gd name="adj" fmla="val 7143"/>
+            </a:avLst>
+          </a:prstGeom>
+        </p:spPr>
+        <p:style>
+          <a:lnRef idx="1">
+            <a:schemeClr val="accent2"/>
+          </a:lnRef>
+          <a:fillRef idx="2">
+            <a:schemeClr val="accent2"/>
+          </a:fillRef>
+          <a:effectRef idx="1">
+            <a:schemeClr val="accent2"/>
+          </a:effectRef>
+          <a:fontRef idx="minor">
+            <a:schemeClr val="dk1"/>
+          </a:fontRef>
+        </p:style>
+        <p:txBody>
+          <a:bodyPr rtlCol="0" anchor="ctr"/>
+          <a:lstStyle/>
+          <a:p>
+            <a:pPr algn="ctr"/>
+            <a:endParaRPr lang="en-US"/>
+          </a:p>
+        </p:txBody>
+      </p:sp>
+      <p:sp>
+        <p:nvSpPr>
+          <p:cNvPr id="8" name="TextBox 7">
+            <a:extLst>
+              <a:ext uri="{FF2B5EF4-FFF2-40B4-BE49-F238E27FC236}">
+                <a16:creationId xmlns:a16="http://schemas.microsoft.com/office/drawing/2014/main" id="{8AAD56A5-1A07-4063-AB94-C8A47FDE7D77}"/>
+              </a:ext>
+            </a:extLst>
+          </p:cNvPr>
+          <p:cNvSpPr txBox="1"/>
+          <p:nvPr/>
+        </p:nvSpPr>
+        <p:spPr>
+          <a:xfrm>
+            <a:off x="1498600" y="979746"/>
+            <a:ext cx="3060700" cy="369332"/>
+          </a:xfrm>
+          <a:prstGeom prst="rect">
+            <a:avLst/>
+          </a:prstGeom>
+          <a:noFill/>
+        </p:spPr>
+        <p:txBody>
+          <a:bodyPr wrap="square" rtlCol="0">
+            <a:spAutoFit/>
+          </a:bodyPr>
+          <a:lstStyle/>
+          <a:p>
+            <a:r>
+              <a:rPr lang="en-US" dirty="0"/>
+              <a:t>Measure Specification</a:t>
+            </a:r>
+          </a:p>
+        </p:txBody>
+      </p:sp>
+      <p:sp>
+        <p:nvSpPr>
+          <p:cNvPr id="9" name="TextBox 8">
+            <a:extLst>
+              <a:ext uri="{FF2B5EF4-FFF2-40B4-BE49-F238E27FC236}">
+                <a16:creationId xmlns:a16="http://schemas.microsoft.com/office/drawing/2014/main" id="{04203A66-A0E8-426A-9776-984E6A83D2CD}"/>
+              </a:ext>
+            </a:extLst>
+          </p:cNvPr>
+          <p:cNvSpPr txBox="1"/>
+          <p:nvPr/>
+        </p:nvSpPr>
+        <p:spPr>
+          <a:xfrm>
+            <a:off x="8509000" y="978351"/>
+            <a:ext cx="2540000" cy="369332"/>
+          </a:xfrm>
+          <a:prstGeom prst="rect">
+            <a:avLst/>
+          </a:prstGeom>
+          <a:noFill/>
+        </p:spPr>
+        <p:txBody>
+          <a:bodyPr wrap="square" rtlCol="0">
+            <a:spAutoFit/>
+          </a:bodyPr>
+          <a:lstStyle/>
+          <a:p>
+            <a:pPr algn="r"/>
+            <a:r>
+              <a:rPr lang="en-US" dirty="0"/>
+              <a:t>Measure Reporting</a:t>
+            </a:r>
+          </a:p>
+        </p:txBody>
+      </p:sp>
+      <p:sp>
+        <p:nvSpPr>
+          <p:cNvPr id="10" name="Rectangle: Rounded Corners 9">
+            <a:extLst>
+              <a:ext uri="{FF2B5EF4-FFF2-40B4-BE49-F238E27FC236}">
+                <a16:creationId xmlns:a16="http://schemas.microsoft.com/office/drawing/2014/main" id="{2FC18C92-B48B-4007-BDF0-EC419AA74A84}"/>
+              </a:ext>
+            </a:extLst>
+          </p:cNvPr>
+          <p:cNvSpPr/>
+          <p:nvPr/>
+        </p:nvSpPr>
+        <p:spPr>
+          <a:xfrm>
+            <a:off x="3270249" y="1907748"/>
+            <a:ext cx="1968501" cy="1724452"/>
+          </a:xfrm>
+          <a:prstGeom prst="roundRect">
+            <a:avLst>
+              <a:gd name="adj" fmla="val 6344"/>
+            </a:avLst>
+          </a:prstGeom>
+        </p:spPr>
+        <p:style>
+          <a:lnRef idx="2">
+            <a:schemeClr val="dk1"/>
+          </a:lnRef>
+          <a:fillRef idx="1">
+            <a:schemeClr val="lt1"/>
+          </a:fillRef>
+          <a:effectRef idx="0">
+            <a:schemeClr val="dk1"/>
+          </a:effectRef>
+          <a:fontRef idx="minor">
+            <a:schemeClr val="dk1"/>
+          </a:fontRef>
+        </p:style>
+        <p:txBody>
+          <a:bodyPr rtlCol="0" anchor="ctr"/>
+          <a:lstStyle/>
+          <a:p>
+            <a:pPr algn="ctr"/>
+            <a:endParaRPr lang="en-US" dirty="0"/>
+          </a:p>
+        </p:txBody>
+      </p:sp>
+      <p:sp>
+        <p:nvSpPr>
+          <p:cNvPr id="11" name="Rectangle: Rounded Corners 10">
+            <a:extLst>
+              <a:ext uri="{FF2B5EF4-FFF2-40B4-BE49-F238E27FC236}">
+                <a16:creationId xmlns:a16="http://schemas.microsoft.com/office/drawing/2014/main" id="{87EE5140-16A0-40AE-BFD4-B34371D3F71E}"/>
+              </a:ext>
+            </a:extLst>
+          </p:cNvPr>
+          <p:cNvSpPr/>
+          <p:nvPr/>
+        </p:nvSpPr>
+        <p:spPr>
+          <a:xfrm>
+            <a:off x="7283449" y="1907748"/>
+            <a:ext cx="1968501" cy="1724452"/>
+          </a:xfrm>
+          <a:prstGeom prst="roundRect">
+            <a:avLst>
+              <a:gd name="adj" fmla="val 6344"/>
+            </a:avLst>
+          </a:prstGeom>
+        </p:spPr>
+        <p:style>
+          <a:lnRef idx="2">
+            <a:schemeClr val="dk1"/>
+          </a:lnRef>
+          <a:fillRef idx="1">
+            <a:schemeClr val="lt1"/>
+          </a:fillRef>
+          <a:effectRef idx="0">
+            <a:schemeClr val="dk1"/>
+          </a:effectRef>
+          <a:fontRef idx="minor">
+            <a:schemeClr val="dk1"/>
+          </a:fontRef>
+        </p:style>
+        <p:txBody>
+          <a:bodyPr rtlCol="0" anchor="ctr"/>
+          <a:lstStyle/>
+          <a:p>
+            <a:pPr algn="ctr"/>
+            <a:endParaRPr lang="en-US"/>
+          </a:p>
+        </p:txBody>
+      </p:sp>
+      <p:sp>
+        <p:nvSpPr>
+          <p:cNvPr id="12" name="TextBox 11">
+            <a:extLst>
+              <a:ext uri="{FF2B5EF4-FFF2-40B4-BE49-F238E27FC236}">
+                <a16:creationId xmlns:a16="http://schemas.microsoft.com/office/drawing/2014/main" id="{8844EEA7-3A56-468B-BE94-7DF1B8527B5C}"/>
+              </a:ext>
+            </a:extLst>
+          </p:cNvPr>
+          <p:cNvSpPr txBox="1"/>
+          <p:nvPr/>
+        </p:nvSpPr>
+        <p:spPr>
+          <a:xfrm>
+            <a:off x="3270249" y="1539701"/>
+            <a:ext cx="1968501" cy="369332"/>
+          </a:xfrm>
+          <a:prstGeom prst="rect">
+            <a:avLst/>
+          </a:prstGeom>
+          <a:noFill/>
+        </p:spPr>
+        <p:txBody>
+          <a:bodyPr wrap="square" rtlCol="0">
+            <a:spAutoFit/>
+          </a:bodyPr>
+          <a:lstStyle/>
+          <a:p>
+            <a:pPr algn="ctr"/>
+            <a:r>
+              <a:rPr lang="en-US" dirty="0"/>
+              <a:t>Producers</a:t>
+            </a:r>
+          </a:p>
+        </p:txBody>
+      </p:sp>
+      <p:sp>
+        <p:nvSpPr>
+          <p:cNvPr id="13" name="TextBox 12">
+            <a:extLst>
+              <a:ext uri="{FF2B5EF4-FFF2-40B4-BE49-F238E27FC236}">
+                <a16:creationId xmlns:a16="http://schemas.microsoft.com/office/drawing/2014/main" id="{986BD7EF-39FA-472B-B8F8-04233EDBBFE9}"/>
+              </a:ext>
+            </a:extLst>
+          </p:cNvPr>
+          <p:cNvSpPr txBox="1"/>
+          <p:nvPr/>
+        </p:nvSpPr>
+        <p:spPr>
+          <a:xfrm>
+            <a:off x="7283449" y="1542347"/>
+            <a:ext cx="1968501" cy="369332"/>
+          </a:xfrm>
+          <a:prstGeom prst="rect">
+            <a:avLst/>
+          </a:prstGeom>
+          <a:noFill/>
+        </p:spPr>
+        <p:txBody>
+          <a:bodyPr wrap="square" rtlCol="0">
+            <a:spAutoFit/>
+          </a:bodyPr>
+          <a:lstStyle/>
+          <a:p>
+            <a:pPr algn="ctr"/>
+            <a:r>
+              <a:rPr lang="en-US" dirty="0"/>
+              <a:t>Consumers</a:t>
+            </a:r>
+          </a:p>
+        </p:txBody>
+      </p:sp>
+      <p:sp>
+        <p:nvSpPr>
+          <p:cNvPr id="14" name="Arrow: Left-Right 13">
+            <a:extLst>
+              <a:ext uri="{FF2B5EF4-FFF2-40B4-BE49-F238E27FC236}">
+                <a16:creationId xmlns:a16="http://schemas.microsoft.com/office/drawing/2014/main" id="{3C43A20C-3D83-4F50-97B1-FCD0D9B5B4EB}"/>
+              </a:ext>
+            </a:extLst>
+          </p:cNvPr>
+          <p:cNvSpPr/>
+          <p:nvPr/>
+        </p:nvSpPr>
+        <p:spPr>
+          <a:xfrm>
+            <a:off x="5248277" y="2821878"/>
+            <a:ext cx="2025650" cy="266700"/>
+          </a:xfrm>
+          <a:prstGeom prst="leftRightArrow">
+            <a:avLst/>
+          </a:prstGeom>
+        </p:spPr>
+        <p:style>
+          <a:lnRef idx="2">
+            <a:schemeClr val="dk1"/>
+          </a:lnRef>
+          <a:fillRef idx="1">
+            <a:schemeClr val="lt1"/>
+          </a:fillRef>
+          <a:effectRef idx="0">
+            <a:schemeClr val="dk1"/>
+          </a:effectRef>
+          <a:fontRef idx="minor">
+            <a:schemeClr val="dk1"/>
+          </a:fontRef>
+        </p:style>
+        <p:txBody>
+          <a:bodyPr rtlCol="0" anchor="ctr"/>
+          <a:lstStyle/>
+          <a:p>
+            <a:pPr algn="ctr"/>
+            <a:endParaRPr lang="en-US"/>
+          </a:p>
+        </p:txBody>
+      </p:sp>
+      <p:sp>
+        <p:nvSpPr>
+          <p:cNvPr id="15" name="TextBox 14">
+            <a:extLst>
+              <a:ext uri="{FF2B5EF4-FFF2-40B4-BE49-F238E27FC236}">
+                <a16:creationId xmlns:a16="http://schemas.microsoft.com/office/drawing/2014/main" id="{8EC74090-F0C5-4408-B1E8-BDB0BB40B2F5}"/>
+              </a:ext>
+            </a:extLst>
+          </p:cNvPr>
+          <p:cNvSpPr txBox="1"/>
+          <p:nvPr/>
+        </p:nvSpPr>
+        <p:spPr>
+          <a:xfrm>
+            <a:off x="5537202" y="2535096"/>
+            <a:ext cx="1428753" cy="369332"/>
+          </a:xfrm>
+          <a:prstGeom prst="rect">
+            <a:avLst/>
+          </a:prstGeom>
+          <a:noFill/>
+        </p:spPr>
+        <p:txBody>
+          <a:bodyPr wrap="square" rtlCol="0">
+            <a:spAutoFit/>
+          </a:bodyPr>
+          <a:lstStyle/>
+          <a:p>
+            <a:pPr algn="ctr"/>
+            <a:r>
+              <a:rPr lang="en-US" dirty="0"/>
+              <a:t>Interactions</a:t>
+            </a:r>
+          </a:p>
+        </p:txBody>
+      </p:sp>
+      <p:sp>
+        <p:nvSpPr>
+          <p:cNvPr id="16" name="Flowchart: Multidocument 15">
+            <a:extLst>
+              <a:ext uri="{FF2B5EF4-FFF2-40B4-BE49-F238E27FC236}">
+                <a16:creationId xmlns:a16="http://schemas.microsoft.com/office/drawing/2014/main" id="{E1EEF914-7607-4488-95D5-544BFCBFDF91}"/>
+              </a:ext>
+            </a:extLst>
+          </p:cNvPr>
+          <p:cNvSpPr/>
+          <p:nvPr/>
+        </p:nvSpPr>
+        <p:spPr>
+          <a:xfrm>
+            <a:off x="2235197" y="3011916"/>
+            <a:ext cx="679450" cy="736600"/>
+          </a:xfrm>
+          <a:prstGeom prst="flowChartMultidocument">
+            <a:avLst/>
+          </a:prstGeom>
+        </p:spPr>
+        <p:style>
+          <a:lnRef idx="2">
+            <a:schemeClr val="dk1"/>
+          </a:lnRef>
+          <a:fillRef idx="1">
+            <a:schemeClr val="lt1"/>
+          </a:fillRef>
+          <a:effectRef idx="0">
+            <a:schemeClr val="dk1"/>
+          </a:effectRef>
+          <a:fontRef idx="minor">
+            <a:schemeClr val="dk1"/>
+          </a:fontRef>
+        </p:style>
+        <p:txBody>
+          <a:bodyPr rtlCol="0" anchor="ctr"/>
+          <a:lstStyle/>
+          <a:p>
+            <a:pPr algn="ctr"/>
+            <a:endParaRPr lang="en-US"/>
+          </a:p>
+        </p:txBody>
+      </p:sp>
+      <p:sp>
+        <p:nvSpPr>
+          <p:cNvPr id="17" name="TextBox 16">
+            <a:extLst>
+              <a:ext uri="{FF2B5EF4-FFF2-40B4-BE49-F238E27FC236}">
+                <a16:creationId xmlns:a16="http://schemas.microsoft.com/office/drawing/2014/main" id="{54D46FF0-73FB-499B-B6D4-CA1698F477C6}"/>
+              </a:ext>
+            </a:extLst>
+          </p:cNvPr>
+          <p:cNvSpPr txBox="1"/>
+          <p:nvPr/>
+        </p:nvSpPr>
+        <p:spPr>
+          <a:xfrm>
+            <a:off x="2178047" y="2746417"/>
+            <a:ext cx="793750" cy="276999"/>
+          </a:xfrm>
+          <a:prstGeom prst="rect">
+            <a:avLst/>
+          </a:prstGeom>
+          <a:noFill/>
+        </p:spPr>
+        <p:txBody>
+          <a:bodyPr wrap="square" rtlCol="0">
+            <a:spAutoFit/>
+          </a:bodyPr>
+          <a:lstStyle/>
+          <a:p>
+            <a:r>
+              <a:rPr lang="en-US" sz="1200" dirty="0"/>
+              <a:t>Measures</a:t>
+            </a:r>
+          </a:p>
+        </p:txBody>
+      </p:sp>
+      <p:sp>
+        <p:nvSpPr>
+          <p:cNvPr id="18" name="Flowchart: Multidocument 17">
+            <a:extLst>
+              <a:ext uri="{FF2B5EF4-FFF2-40B4-BE49-F238E27FC236}">
+                <a16:creationId xmlns:a16="http://schemas.microsoft.com/office/drawing/2014/main" id="{A6DE0178-E815-41A2-B6BC-D35FC17ED4F9}"/>
+              </a:ext>
+            </a:extLst>
+          </p:cNvPr>
+          <p:cNvSpPr/>
+          <p:nvPr/>
+        </p:nvSpPr>
+        <p:spPr>
+          <a:xfrm>
+            <a:off x="9702802" y="3008834"/>
+            <a:ext cx="679450" cy="736600"/>
+          </a:xfrm>
+          <a:prstGeom prst="flowChartMultidocument">
+            <a:avLst/>
+          </a:prstGeom>
+        </p:spPr>
+        <p:style>
+          <a:lnRef idx="2">
+            <a:schemeClr val="dk1"/>
+          </a:lnRef>
+          <a:fillRef idx="1">
+            <a:schemeClr val="lt1"/>
+          </a:fillRef>
+          <a:effectRef idx="0">
+            <a:schemeClr val="dk1"/>
+          </a:effectRef>
+          <a:fontRef idx="minor">
+            <a:schemeClr val="dk1"/>
+          </a:fontRef>
+        </p:style>
+        <p:txBody>
+          <a:bodyPr rtlCol="0" anchor="ctr"/>
+          <a:lstStyle/>
+          <a:p>
+            <a:pPr algn="ctr"/>
+            <a:endParaRPr lang="en-US"/>
+          </a:p>
+        </p:txBody>
+      </p:sp>
+      <p:sp>
+        <p:nvSpPr>
+          <p:cNvPr id="19" name="TextBox 18">
+            <a:extLst>
+              <a:ext uri="{FF2B5EF4-FFF2-40B4-BE49-F238E27FC236}">
+                <a16:creationId xmlns:a16="http://schemas.microsoft.com/office/drawing/2014/main" id="{78B1D05D-7CE6-4A0B-8AB6-5297D4F49082}"/>
+              </a:ext>
+            </a:extLst>
+          </p:cNvPr>
+          <p:cNvSpPr txBox="1"/>
+          <p:nvPr/>
+        </p:nvSpPr>
+        <p:spPr>
+          <a:xfrm>
+            <a:off x="9404350" y="2743851"/>
+            <a:ext cx="1289050" cy="276999"/>
+          </a:xfrm>
+          <a:prstGeom prst="rect">
+            <a:avLst/>
+          </a:prstGeom>
+          <a:noFill/>
+        </p:spPr>
+        <p:txBody>
+          <a:bodyPr wrap="square" rtlCol="0">
+            <a:spAutoFit/>
+          </a:bodyPr>
+          <a:lstStyle/>
+          <a:p>
+            <a:r>
+              <a:rPr lang="en-US" sz="1200" dirty="0" err="1"/>
+              <a:t>MeasureReports</a:t>
+            </a:r>
+            <a:endParaRPr lang="en-US" sz="1200" dirty="0"/>
+          </a:p>
+        </p:txBody>
+      </p:sp>
+      <p:sp>
+        <p:nvSpPr>
+          <p:cNvPr id="26" name="Callout: Line 25">
+            <a:extLst>
+              <a:ext uri="{FF2B5EF4-FFF2-40B4-BE49-F238E27FC236}">
+                <a16:creationId xmlns:a16="http://schemas.microsoft.com/office/drawing/2014/main" id="{FF81B22E-E570-41D6-91E6-F30B697DD5A9}"/>
+              </a:ext>
+            </a:extLst>
+          </p:cNvPr>
+          <p:cNvSpPr/>
+          <p:nvPr/>
+        </p:nvSpPr>
+        <p:spPr>
+          <a:xfrm>
+            <a:off x="285748" y="2255515"/>
+            <a:ext cx="914400" cy="332816"/>
+          </a:xfrm>
+          <a:prstGeom prst="borderCallout1">
+            <a:avLst>
+              <a:gd name="adj1" fmla="val 53991"/>
+              <a:gd name="adj2" fmla="val 98611"/>
+              <a:gd name="adj3" fmla="val 52878"/>
+              <a:gd name="adj4" fmla="val 158890"/>
+            </a:avLst>
+          </a:prstGeom>
+        </p:spPr>
+        <p:style>
+          <a:lnRef idx="1">
+            <a:schemeClr val="accent2"/>
+          </a:lnRef>
+          <a:fillRef idx="2">
+            <a:schemeClr val="accent2"/>
+          </a:fillRef>
+          <a:effectRef idx="1">
+            <a:schemeClr val="accent2"/>
+          </a:effectRef>
+          <a:fontRef idx="minor">
+            <a:schemeClr val="dk1"/>
+          </a:fontRef>
+        </p:style>
+        <p:txBody>
+          <a:bodyPr rtlCol="0" anchor="ctr"/>
+          <a:lstStyle/>
+          <a:p>
+            <a:pPr algn="ctr"/>
+            <a:r>
+              <a:rPr lang="en-US" dirty="0"/>
+              <a:t>FHIR</a:t>
+            </a:r>
+          </a:p>
+        </p:txBody>
+      </p:sp>
+      <p:sp>
+        <p:nvSpPr>
+          <p:cNvPr id="27" name="Callout: Line 26">
+            <a:extLst>
+              <a:ext uri="{FF2B5EF4-FFF2-40B4-BE49-F238E27FC236}">
+                <a16:creationId xmlns:a16="http://schemas.microsoft.com/office/drawing/2014/main" id="{EFF183AC-2628-40C7-A1B9-704FEA846AA1}"/>
+              </a:ext>
+            </a:extLst>
+          </p:cNvPr>
+          <p:cNvSpPr/>
+          <p:nvPr/>
+        </p:nvSpPr>
+        <p:spPr>
+          <a:xfrm>
+            <a:off x="1949451" y="5585858"/>
+            <a:ext cx="2508250" cy="306324"/>
+          </a:xfrm>
+          <a:prstGeom prst="borderCallout1">
+            <a:avLst>
+              <a:gd name="adj1" fmla="val 93"/>
+              <a:gd name="adj2" fmla="val 50000"/>
+              <a:gd name="adj3" fmla="val -123818"/>
+              <a:gd name="adj4" fmla="val 50050"/>
+            </a:avLst>
+          </a:prstGeom>
+        </p:spPr>
+        <p:style>
+          <a:lnRef idx="1">
+            <a:schemeClr val="accent6"/>
+          </a:lnRef>
+          <a:fillRef idx="2">
+            <a:schemeClr val="accent6"/>
+          </a:fillRef>
+          <a:effectRef idx="1">
+            <a:schemeClr val="accent6"/>
+          </a:effectRef>
+          <a:fontRef idx="minor">
+            <a:schemeClr val="dk1"/>
+          </a:fontRef>
+        </p:style>
+        <p:txBody>
+          <a:bodyPr rtlCol="0" anchor="ctr"/>
+          <a:lstStyle/>
+          <a:p>
+            <a:pPr algn="ctr"/>
+            <a:r>
+              <a:rPr lang="en-US" dirty="0"/>
+              <a:t>Quality Measure IG</a:t>
+            </a:r>
+          </a:p>
+        </p:txBody>
+      </p:sp>
+      <p:sp>
+        <p:nvSpPr>
+          <p:cNvPr id="28" name="Callout: Line 27">
+            <a:extLst>
+              <a:ext uri="{FF2B5EF4-FFF2-40B4-BE49-F238E27FC236}">
+                <a16:creationId xmlns:a16="http://schemas.microsoft.com/office/drawing/2014/main" id="{16EE7878-4B12-4477-9337-92F96656884D}"/>
+              </a:ext>
+            </a:extLst>
+          </p:cNvPr>
+          <p:cNvSpPr/>
+          <p:nvPr/>
+        </p:nvSpPr>
+        <p:spPr>
+          <a:xfrm>
+            <a:off x="5016499" y="5598323"/>
+            <a:ext cx="2508250" cy="306324"/>
+          </a:xfrm>
+          <a:prstGeom prst="borderCallout1">
+            <a:avLst>
+              <a:gd name="adj1" fmla="val 93"/>
+              <a:gd name="adj2" fmla="val 50000"/>
+              <a:gd name="adj3" fmla="val -123818"/>
+              <a:gd name="adj4" fmla="val 50050"/>
+            </a:avLst>
+          </a:prstGeom>
+        </p:spPr>
+        <p:style>
+          <a:lnRef idx="1">
+            <a:schemeClr val="accent4"/>
+          </a:lnRef>
+          <a:fillRef idx="2">
+            <a:schemeClr val="accent4"/>
+          </a:fillRef>
+          <a:effectRef idx="1">
+            <a:schemeClr val="accent4"/>
+          </a:effectRef>
+          <a:fontRef idx="minor">
+            <a:schemeClr val="dk1"/>
+          </a:fontRef>
+        </p:style>
+        <p:txBody>
+          <a:bodyPr rtlCol="0" anchor="ctr"/>
+          <a:lstStyle/>
+          <a:p>
+            <a:pPr algn="ctr"/>
+            <a:r>
+              <a:rPr lang="en-US" dirty="0"/>
+              <a:t>QI Core</a:t>
+            </a:r>
+          </a:p>
+        </p:txBody>
+      </p:sp>
+      <p:sp>
+        <p:nvSpPr>
+          <p:cNvPr id="29" name="Callout: Line 28">
+            <a:extLst>
+              <a:ext uri="{FF2B5EF4-FFF2-40B4-BE49-F238E27FC236}">
+                <a16:creationId xmlns:a16="http://schemas.microsoft.com/office/drawing/2014/main" id="{9E2BC99F-B034-40D6-8A71-BC2F61894FC5}"/>
+              </a:ext>
+            </a:extLst>
+          </p:cNvPr>
+          <p:cNvSpPr/>
+          <p:nvPr/>
+        </p:nvSpPr>
+        <p:spPr>
+          <a:xfrm>
+            <a:off x="8077197" y="5598323"/>
+            <a:ext cx="2508250" cy="306324"/>
+          </a:xfrm>
+          <a:prstGeom prst="borderCallout1">
+            <a:avLst>
+              <a:gd name="adj1" fmla="val 93"/>
+              <a:gd name="adj2" fmla="val 50000"/>
+              <a:gd name="adj3" fmla="val -123818"/>
+              <a:gd name="adj4" fmla="val 50050"/>
+            </a:avLst>
+          </a:prstGeom>
+        </p:spPr>
+        <p:style>
+          <a:lnRef idx="1">
+            <a:schemeClr val="accent1"/>
+          </a:lnRef>
+          <a:fillRef idx="2">
+            <a:schemeClr val="accent1"/>
+          </a:fillRef>
+          <a:effectRef idx="1">
+            <a:schemeClr val="accent1"/>
+          </a:effectRef>
+          <a:fontRef idx="minor">
+            <a:schemeClr val="dk1"/>
+          </a:fontRef>
+        </p:style>
+        <p:txBody>
+          <a:bodyPr rtlCol="0" anchor="ctr"/>
+          <a:lstStyle/>
+          <a:p>
+            <a:pPr algn="ctr"/>
+            <a:r>
+              <a:rPr lang="en-US" dirty="0"/>
+              <a:t>DEQM IG</a:t>
+            </a:r>
+          </a:p>
+        </p:txBody>
+      </p:sp>
+      <p:sp>
+        <p:nvSpPr>
+          <p:cNvPr id="30" name="TextBox 29">
+            <a:extLst>
+              <a:ext uri="{FF2B5EF4-FFF2-40B4-BE49-F238E27FC236}">
+                <a16:creationId xmlns:a16="http://schemas.microsoft.com/office/drawing/2014/main" id="{16971C34-6842-49C5-9C17-67AE0536DA59}"/>
+              </a:ext>
+            </a:extLst>
+          </p:cNvPr>
+          <p:cNvSpPr txBox="1"/>
+          <p:nvPr/>
+        </p:nvSpPr>
+        <p:spPr>
+          <a:xfrm>
+            <a:off x="3495674" y="2012627"/>
+            <a:ext cx="1247778" cy="830997"/>
+          </a:xfrm>
+          <a:prstGeom prst="rect">
+            <a:avLst/>
+          </a:prstGeom>
+          <a:noFill/>
+        </p:spPr>
+        <p:txBody>
+          <a:bodyPr wrap="square" rtlCol="0">
+            <a:spAutoFit/>
+          </a:bodyPr>
+          <a:lstStyle/>
+          <a:p>
+            <a:r>
+              <a:rPr lang="en-US" sz="1200" dirty="0"/>
+              <a:t>Providers</a:t>
+            </a:r>
+          </a:p>
+          <a:p>
+            <a:r>
+              <a:rPr lang="en-US" sz="1200" dirty="0"/>
+              <a:t>Patients</a:t>
+            </a:r>
+          </a:p>
+          <a:p>
+            <a:r>
+              <a:rPr lang="en-US" sz="1200" dirty="0"/>
+              <a:t>Care Givers</a:t>
+            </a:r>
+          </a:p>
+          <a:p>
+            <a:r>
+              <a:rPr lang="en-US" sz="1200" dirty="0"/>
+              <a:t>Clinical Systems</a:t>
+            </a:r>
+          </a:p>
+        </p:txBody>
+      </p:sp>
+      <p:sp>
+        <p:nvSpPr>
+          <p:cNvPr id="31" name="TextBox 30">
+            <a:extLst>
+              <a:ext uri="{FF2B5EF4-FFF2-40B4-BE49-F238E27FC236}">
+                <a16:creationId xmlns:a16="http://schemas.microsoft.com/office/drawing/2014/main" id="{4B649C0A-EAE4-47BC-9414-0FB319A287C4}"/>
+              </a:ext>
+            </a:extLst>
+          </p:cNvPr>
+          <p:cNvSpPr txBox="1"/>
+          <p:nvPr/>
+        </p:nvSpPr>
+        <p:spPr>
+          <a:xfrm>
+            <a:off x="7512055" y="2012627"/>
+            <a:ext cx="1247778" cy="830997"/>
+          </a:xfrm>
+          <a:prstGeom prst="rect">
+            <a:avLst/>
+          </a:prstGeom>
+          <a:noFill/>
+        </p:spPr>
+        <p:txBody>
+          <a:bodyPr wrap="square" rtlCol="0">
+            <a:spAutoFit/>
+          </a:bodyPr>
+          <a:lstStyle/>
+          <a:p>
+            <a:r>
+              <a:rPr lang="en-US" sz="1200" dirty="0"/>
+              <a:t>Aggregators</a:t>
+            </a:r>
+          </a:p>
+          <a:p>
+            <a:r>
+              <a:rPr lang="en-US" sz="1200" dirty="0"/>
+              <a:t>Payers</a:t>
+            </a:r>
+          </a:p>
+          <a:p>
+            <a:r>
+              <a:rPr lang="en-US" sz="1200" dirty="0"/>
+              <a:t>HIEs</a:t>
+            </a:r>
+          </a:p>
+          <a:p>
+            <a:r>
+              <a:rPr lang="en-US" sz="1200" dirty="0"/>
+              <a:t>Health Agencies</a:t>
+            </a:r>
+          </a:p>
+        </p:txBody>
+      </p:sp>
+      <p:sp>
+        <p:nvSpPr>
+          <p:cNvPr id="32" name="Rectangle: Rounded Corners 31">
+            <a:extLst>
+              <a:ext uri="{FF2B5EF4-FFF2-40B4-BE49-F238E27FC236}">
+                <a16:creationId xmlns:a16="http://schemas.microsoft.com/office/drawing/2014/main" id="{57971D83-D681-46C3-AA76-86952CA309B8}"/>
+              </a:ext>
+            </a:extLst>
+          </p:cNvPr>
+          <p:cNvSpPr/>
+          <p:nvPr/>
+        </p:nvSpPr>
+        <p:spPr>
+          <a:xfrm>
+            <a:off x="3863183" y="3839388"/>
+            <a:ext cx="4795834" cy="1083061"/>
+          </a:xfrm>
+          <a:prstGeom prst="roundRect">
+            <a:avLst/>
+          </a:prstGeom>
+        </p:spPr>
+        <p:style>
+          <a:lnRef idx="2">
+            <a:schemeClr val="dk1"/>
+          </a:lnRef>
+          <a:fillRef idx="1">
+            <a:schemeClr val="lt1"/>
+          </a:fillRef>
+          <a:effectRef idx="0">
+            <a:schemeClr val="dk1"/>
+          </a:effectRef>
+          <a:fontRef idx="minor">
+            <a:schemeClr val="dk1"/>
+          </a:fontRef>
+        </p:style>
+        <p:txBody>
+          <a:bodyPr rtlCol="0" anchor="ctr"/>
+          <a:lstStyle/>
+          <a:p>
+            <a:pPr algn="ctr"/>
+            <a:endParaRPr lang="en-US"/>
+          </a:p>
+        </p:txBody>
+      </p:sp>
+      <p:sp>
+        <p:nvSpPr>
+          <p:cNvPr id="33" name="TextBox 32">
+            <a:extLst>
+              <a:ext uri="{FF2B5EF4-FFF2-40B4-BE49-F238E27FC236}">
+                <a16:creationId xmlns:a16="http://schemas.microsoft.com/office/drawing/2014/main" id="{20714F33-C148-4DD7-B312-225AFC0F8712}"/>
+              </a:ext>
+            </a:extLst>
+          </p:cNvPr>
+          <p:cNvSpPr txBox="1"/>
+          <p:nvPr/>
+        </p:nvSpPr>
+        <p:spPr>
+          <a:xfrm>
+            <a:off x="5256215" y="3474137"/>
+            <a:ext cx="1968501" cy="369332"/>
+          </a:xfrm>
+          <a:prstGeom prst="rect">
+            <a:avLst/>
+          </a:prstGeom>
+          <a:noFill/>
+        </p:spPr>
+        <p:txBody>
+          <a:bodyPr wrap="square" rtlCol="0">
+            <a:spAutoFit/>
+          </a:bodyPr>
+          <a:lstStyle/>
+          <a:p>
+            <a:pPr algn="ctr"/>
+            <a:r>
+              <a:rPr lang="en-US" dirty="0"/>
+              <a:t>Specifiers</a:t>
+            </a:r>
+          </a:p>
+        </p:txBody>
+      </p:sp>
+      <p:sp>
+        <p:nvSpPr>
+          <p:cNvPr id="34" name="TextBox 33">
+            <a:extLst>
+              <a:ext uri="{FF2B5EF4-FFF2-40B4-BE49-F238E27FC236}">
+                <a16:creationId xmlns:a16="http://schemas.microsoft.com/office/drawing/2014/main" id="{F1861AE7-5041-4A28-B503-5148C40161E7}"/>
+              </a:ext>
+            </a:extLst>
+          </p:cNvPr>
+          <p:cNvSpPr txBox="1"/>
+          <p:nvPr/>
+        </p:nvSpPr>
+        <p:spPr>
+          <a:xfrm>
+            <a:off x="5099049" y="3967460"/>
+            <a:ext cx="1968501" cy="830997"/>
+          </a:xfrm>
+          <a:prstGeom prst="rect">
+            <a:avLst/>
+          </a:prstGeom>
+          <a:noFill/>
+        </p:spPr>
+        <p:txBody>
+          <a:bodyPr wrap="square" rtlCol="0">
+            <a:spAutoFit/>
+          </a:bodyPr>
+          <a:lstStyle/>
+          <a:p>
+            <a:r>
+              <a:rPr lang="en-US" sz="1200" dirty="0"/>
+              <a:t>Quality Agencies</a:t>
+            </a:r>
+          </a:p>
+          <a:p>
+            <a:r>
+              <a:rPr lang="en-US" sz="1200" dirty="0"/>
+              <a:t>Government Agencies</a:t>
+            </a:r>
+          </a:p>
+          <a:p>
+            <a:r>
+              <a:rPr lang="en-US" sz="1200" dirty="0"/>
+              <a:t>Industry Consortiums</a:t>
+            </a:r>
+          </a:p>
+          <a:p>
+            <a:r>
+              <a:rPr lang="en-US" sz="1200" dirty="0"/>
+              <a:t>Clinical Societies</a:t>
+            </a:r>
+          </a:p>
+        </p:txBody>
+      </p:sp>
+      <p:sp>
+        <p:nvSpPr>
+          <p:cNvPr id="38" name="Callout: Line 37">
+            <a:extLst>
+              <a:ext uri="{FF2B5EF4-FFF2-40B4-BE49-F238E27FC236}">
+                <a16:creationId xmlns:a16="http://schemas.microsoft.com/office/drawing/2014/main" id="{7505725F-BBE6-47D5-A586-57FEE2A96617}"/>
+              </a:ext>
+            </a:extLst>
+          </p:cNvPr>
+          <p:cNvSpPr/>
+          <p:nvPr/>
+        </p:nvSpPr>
+        <p:spPr>
+          <a:xfrm>
+            <a:off x="282575" y="3465792"/>
+            <a:ext cx="914400" cy="332816"/>
+          </a:xfrm>
+          <a:prstGeom prst="borderCallout1">
+            <a:avLst>
+              <a:gd name="adj1" fmla="val 53991"/>
+              <a:gd name="adj2" fmla="val 98611"/>
+              <a:gd name="adj3" fmla="val 52878"/>
+              <a:gd name="adj4" fmla="val 158890"/>
+            </a:avLst>
+          </a:prstGeom>
+        </p:spPr>
+        <p:style>
+          <a:lnRef idx="1">
+            <a:schemeClr val="accent3"/>
+          </a:lnRef>
+          <a:fillRef idx="2">
+            <a:schemeClr val="accent3"/>
+          </a:fillRef>
+          <a:effectRef idx="1">
+            <a:schemeClr val="accent3"/>
+          </a:effectRef>
+          <a:fontRef idx="minor">
+            <a:schemeClr val="dk1"/>
+          </a:fontRef>
+        </p:style>
+        <p:txBody>
+          <a:bodyPr rtlCol="0" anchor="ctr"/>
+          <a:lstStyle/>
+          <a:p>
+            <a:pPr algn="ctr"/>
+            <a:r>
+              <a:rPr lang="en-US" dirty="0"/>
+              <a:t>CQL</a:t>
+            </a:r>
+          </a:p>
+        </p:txBody>
+      </p:sp>
+      <p:sp>
+        <p:nvSpPr>
+          <p:cNvPr id="39" name="TextBox 38">
+            <a:extLst>
+              <a:ext uri="{FF2B5EF4-FFF2-40B4-BE49-F238E27FC236}">
+                <a16:creationId xmlns:a16="http://schemas.microsoft.com/office/drawing/2014/main" id="{71C81CAE-B658-4A4B-8763-C796C3E4A5B5}"/>
+              </a:ext>
+            </a:extLst>
+          </p:cNvPr>
+          <p:cNvSpPr txBox="1"/>
+          <p:nvPr/>
+        </p:nvSpPr>
+        <p:spPr>
+          <a:xfrm>
+            <a:off x="188663" y="201721"/>
+            <a:ext cx="4260910" cy="369332"/>
+          </a:xfrm>
+          <a:prstGeom prst="rect">
+            <a:avLst/>
+          </a:prstGeom>
+          <a:noFill/>
+        </p:spPr>
+        <p:txBody>
+          <a:bodyPr wrap="none" rtlCol="0">
+            <a:spAutoFit/>
+          </a:bodyPr>
+          <a:lstStyle/>
+          <a:p>
+            <a:r>
+              <a:rPr lang="en-US" dirty="0"/>
+              <a:t>Quality Measurement Standards Landscape</a:t>
+            </a:r>
+          </a:p>
+        </p:txBody>
+      </p:sp>
+    </p:spTree>
+    <p:extLst>
+      <p:ext uri="{BB962C8B-B14F-4D97-AF65-F5344CB8AC3E}">
+        <p14:creationId xmlns:p14="http://schemas.microsoft.com/office/powerpoint/2010/main" val="2106489814"/>
+      </p:ext>
+    </p:extLst>
+  </p:cSld>
+  <p:clrMapOvr>
+    <a:masterClrMapping/>
+  </p:clrMapOvr>
+</p:sld>
+</file>
+
+<file path=ppt/slides/slide3.xml><?xml version="1.0" encoding="utf-8"?>
+<p:sld xmlns:a="http://schemas.openxmlformats.org/drawingml/2006/main" xmlns:r="http://schemas.openxmlformats.org/officeDocument/2006/relationships" xmlns:p="http://schemas.openxmlformats.org/presentationml/2006/main">
+  <p:cSld>
+    <p:spTree>
+      <p:nvGrpSpPr>
+        <p:cNvPr id="1" name=""/>
+        <p:cNvGrpSpPr/>
+        <p:nvPr/>
+      </p:nvGrpSpPr>
+      <p:grpSpPr>
+        <a:xfrm>
+          <a:off x="0" y="0"/>
+          <a:ext cx="0" cy="0"/>
+          <a:chOff x="0" y="0"/>
+          <a:chExt cx="0" cy="0"/>
+        </a:xfrm>
+      </p:grpSpPr>
+      <p:sp>
+        <p:nvSpPr>
+          <p:cNvPr id="5" name="Trapezoid 4">
+            <a:extLst>
+              <a:ext uri="{FF2B5EF4-FFF2-40B4-BE49-F238E27FC236}">
+                <a16:creationId xmlns:a16="http://schemas.microsoft.com/office/drawing/2014/main" id="{74DF24FE-5007-4763-BE3F-A86B44B2A45E}"/>
+              </a:ext>
+            </a:extLst>
+          </p:cNvPr>
+          <p:cNvSpPr/>
+          <p:nvPr/>
+        </p:nvSpPr>
+        <p:spPr>
+          <a:xfrm>
+            <a:off x="2551112" y="4495800"/>
+            <a:ext cx="8153400" cy="1028700"/>
+          </a:xfrm>
+          <a:prstGeom prst="trapezoid">
+            <a:avLst>
+              <a:gd name="adj" fmla="val 50926"/>
+            </a:avLst>
+          </a:prstGeom>
+        </p:spPr>
+        <p:style>
+          <a:lnRef idx="1">
+            <a:schemeClr val="accent2"/>
+          </a:lnRef>
+          <a:fillRef idx="2">
+            <a:schemeClr val="accent2"/>
+          </a:fillRef>
+          <a:effectRef idx="1">
+            <a:schemeClr val="accent2"/>
+          </a:effectRef>
+          <a:fontRef idx="minor">
+            <a:schemeClr val="dk1"/>
+          </a:fontRef>
+        </p:style>
+        <p:txBody>
+          <a:bodyPr rtlCol="0" anchor="ctr"/>
+          <a:lstStyle/>
+          <a:p>
+            <a:pPr algn="ctr"/>
+            <a:r>
+              <a:rPr lang="en-US" dirty="0"/>
+              <a:t>Universally applicable resources and guidance</a:t>
+            </a:r>
+          </a:p>
+        </p:txBody>
+      </p:sp>
+      <p:sp>
+        <p:nvSpPr>
+          <p:cNvPr id="6" name="Trapezoid 5">
+            <a:extLst>
+              <a:ext uri="{FF2B5EF4-FFF2-40B4-BE49-F238E27FC236}">
+                <a16:creationId xmlns:a16="http://schemas.microsoft.com/office/drawing/2014/main" id="{50B2B962-9349-4B5B-8FF3-CF5DDD2DEA35}"/>
+              </a:ext>
+            </a:extLst>
+          </p:cNvPr>
+          <p:cNvSpPr/>
+          <p:nvPr/>
+        </p:nvSpPr>
+        <p:spPr>
+          <a:xfrm>
+            <a:off x="3087687" y="3467100"/>
+            <a:ext cx="7070725" cy="1028700"/>
+          </a:xfrm>
+          <a:prstGeom prst="trapezoid">
+            <a:avLst>
+              <a:gd name="adj" fmla="val 50926"/>
+            </a:avLst>
+          </a:prstGeom>
+        </p:spPr>
+        <p:style>
+          <a:lnRef idx="1">
+            <a:schemeClr val="accent3"/>
+          </a:lnRef>
+          <a:fillRef idx="2">
+            <a:schemeClr val="accent3"/>
+          </a:fillRef>
+          <a:effectRef idx="1">
+            <a:schemeClr val="accent3"/>
+          </a:effectRef>
+          <a:fontRef idx="minor">
+            <a:schemeClr val="dk1"/>
+          </a:fontRef>
+        </p:style>
+        <p:txBody>
+          <a:bodyPr rtlCol="0" anchor="ctr"/>
+          <a:lstStyle/>
+          <a:p>
+            <a:pPr algn="ctr"/>
+            <a:r>
+              <a:rPr lang="en-US" dirty="0"/>
+              <a:t>US Realm specific profiles</a:t>
+            </a:r>
+          </a:p>
+        </p:txBody>
+      </p:sp>
+      <p:sp>
+        <p:nvSpPr>
+          <p:cNvPr id="7" name="Trapezoid 6">
+            <a:extLst>
+              <a:ext uri="{FF2B5EF4-FFF2-40B4-BE49-F238E27FC236}">
+                <a16:creationId xmlns:a16="http://schemas.microsoft.com/office/drawing/2014/main" id="{D5F8BA9C-B816-420E-8BA6-29E06DF95C8C}"/>
+              </a:ext>
+            </a:extLst>
+          </p:cNvPr>
+          <p:cNvSpPr/>
+          <p:nvPr/>
+        </p:nvSpPr>
+        <p:spPr>
+          <a:xfrm>
+            <a:off x="3621087" y="2438400"/>
+            <a:ext cx="6016625" cy="1028700"/>
+          </a:xfrm>
+          <a:prstGeom prst="trapezoid">
+            <a:avLst>
+              <a:gd name="adj" fmla="val 50926"/>
+            </a:avLst>
+          </a:prstGeom>
+        </p:spPr>
+        <p:style>
+          <a:lnRef idx="1">
+            <a:schemeClr val="accent4"/>
+          </a:lnRef>
+          <a:fillRef idx="2">
+            <a:schemeClr val="accent4"/>
+          </a:fillRef>
+          <a:effectRef idx="1">
+            <a:schemeClr val="accent4"/>
+          </a:effectRef>
+          <a:fontRef idx="minor">
+            <a:schemeClr val="dk1"/>
+          </a:fontRef>
+        </p:style>
+        <p:txBody>
+          <a:bodyPr rtlCol="0" anchor="ctr"/>
+          <a:lstStyle/>
+          <a:p>
+            <a:pPr algn="ctr"/>
+            <a:r>
+              <a:rPr lang="en-US" dirty="0"/>
+              <a:t>Quality Improvement focused</a:t>
+            </a:r>
+          </a:p>
+        </p:txBody>
+      </p:sp>
+      <p:sp>
+        <p:nvSpPr>
+          <p:cNvPr id="8" name="Trapezoid 7">
+            <a:extLst>
+              <a:ext uri="{FF2B5EF4-FFF2-40B4-BE49-F238E27FC236}">
+                <a16:creationId xmlns:a16="http://schemas.microsoft.com/office/drawing/2014/main" id="{58D92A33-8EEC-4B0F-A875-C570D8F758F1}"/>
+              </a:ext>
+            </a:extLst>
+          </p:cNvPr>
+          <p:cNvSpPr/>
+          <p:nvPr/>
+        </p:nvSpPr>
+        <p:spPr>
+          <a:xfrm>
+            <a:off x="4141787" y="1409700"/>
+            <a:ext cx="4975225" cy="1028700"/>
+          </a:xfrm>
+          <a:prstGeom prst="trapezoid">
+            <a:avLst>
+              <a:gd name="adj" fmla="val 50926"/>
+            </a:avLst>
+          </a:prstGeom>
+        </p:spPr>
+        <p:style>
+          <a:lnRef idx="1">
+            <a:schemeClr val="accent1"/>
+          </a:lnRef>
+          <a:fillRef idx="2">
+            <a:schemeClr val="accent1"/>
+          </a:fillRef>
+          <a:effectRef idx="1">
+            <a:schemeClr val="accent1"/>
+          </a:effectRef>
+          <a:fontRef idx="minor">
+            <a:schemeClr val="dk1"/>
+          </a:fontRef>
+        </p:style>
+        <p:txBody>
+          <a:bodyPr rtlCol="0" anchor="ctr"/>
+          <a:lstStyle/>
+          <a:p>
+            <a:pPr algn="ctr"/>
+            <a:r>
+              <a:rPr lang="en-US" dirty="0"/>
+              <a:t>Quality Measurement focused</a:t>
+            </a:r>
+          </a:p>
+        </p:txBody>
+      </p:sp>
+      <p:sp>
+        <p:nvSpPr>
+          <p:cNvPr id="10" name="Rectangle 9">
+            <a:extLst>
+              <a:ext uri="{FF2B5EF4-FFF2-40B4-BE49-F238E27FC236}">
+                <a16:creationId xmlns:a16="http://schemas.microsoft.com/office/drawing/2014/main" id="{B1230B7B-CB86-41C2-8818-A7793453FB67}"/>
+              </a:ext>
+            </a:extLst>
+          </p:cNvPr>
+          <p:cNvSpPr/>
+          <p:nvPr/>
+        </p:nvSpPr>
+        <p:spPr>
+          <a:xfrm>
+            <a:off x="1193800" y="4826000"/>
+            <a:ext cx="2120900" cy="368300"/>
+          </a:xfrm>
+          <a:prstGeom prst="rect">
+            <a:avLst/>
+          </a:prstGeom>
+        </p:spPr>
+        <p:style>
+          <a:lnRef idx="1">
+            <a:schemeClr val="accent2"/>
+          </a:lnRef>
+          <a:fillRef idx="2">
+            <a:schemeClr val="accent2"/>
+          </a:fillRef>
+          <a:effectRef idx="1">
+            <a:schemeClr val="accent2"/>
+          </a:effectRef>
+          <a:fontRef idx="minor">
+            <a:schemeClr val="dk1"/>
+          </a:fontRef>
+        </p:style>
+        <p:txBody>
+          <a:bodyPr rtlCol="0" anchor="ctr"/>
+          <a:lstStyle/>
+          <a:p>
+            <a:pPr algn="ctr"/>
+            <a:r>
+              <a:rPr lang="en-US" dirty="0"/>
+              <a:t>FHIR</a:t>
+            </a:r>
+          </a:p>
+        </p:txBody>
+      </p:sp>
+      <p:sp>
+        <p:nvSpPr>
+          <p:cNvPr id="11" name="Rectangle 10">
+            <a:extLst>
+              <a:ext uri="{FF2B5EF4-FFF2-40B4-BE49-F238E27FC236}">
+                <a16:creationId xmlns:a16="http://schemas.microsoft.com/office/drawing/2014/main" id="{07191C11-0908-47DE-BA7D-FF6C65FB0B91}"/>
+              </a:ext>
+            </a:extLst>
+          </p:cNvPr>
+          <p:cNvSpPr/>
+          <p:nvPr/>
+        </p:nvSpPr>
+        <p:spPr>
+          <a:xfrm>
+            <a:off x="1193800" y="3797300"/>
+            <a:ext cx="2120900" cy="368300"/>
+          </a:xfrm>
+          <a:prstGeom prst="rect">
+            <a:avLst/>
+          </a:prstGeom>
+        </p:spPr>
+        <p:style>
+          <a:lnRef idx="1">
+            <a:schemeClr val="accent3"/>
+          </a:lnRef>
+          <a:fillRef idx="2">
+            <a:schemeClr val="accent3"/>
+          </a:fillRef>
+          <a:effectRef idx="1">
+            <a:schemeClr val="accent3"/>
+          </a:effectRef>
+          <a:fontRef idx="minor">
+            <a:schemeClr val="dk1"/>
+          </a:fontRef>
+        </p:style>
+        <p:txBody>
+          <a:bodyPr rtlCol="0" anchor="ctr"/>
+          <a:lstStyle/>
+          <a:p>
+            <a:pPr algn="ctr"/>
+            <a:r>
+              <a:rPr lang="en-US" dirty="0"/>
+              <a:t>US Core</a:t>
+            </a:r>
+          </a:p>
+        </p:txBody>
+      </p:sp>
+      <p:sp>
+        <p:nvSpPr>
+          <p:cNvPr id="12" name="Rectangle 11">
+            <a:extLst>
+              <a:ext uri="{FF2B5EF4-FFF2-40B4-BE49-F238E27FC236}">
+                <a16:creationId xmlns:a16="http://schemas.microsoft.com/office/drawing/2014/main" id="{3E920B8A-C1BD-46CE-9080-20E9DE13D2EC}"/>
+              </a:ext>
+            </a:extLst>
+          </p:cNvPr>
+          <p:cNvSpPr/>
+          <p:nvPr/>
+        </p:nvSpPr>
+        <p:spPr>
+          <a:xfrm>
+            <a:off x="1193800" y="2768600"/>
+            <a:ext cx="2120900" cy="368300"/>
+          </a:xfrm>
+          <a:prstGeom prst="rect">
+            <a:avLst/>
+          </a:prstGeom>
+        </p:spPr>
+        <p:style>
+          <a:lnRef idx="1">
+            <a:schemeClr val="accent4"/>
+          </a:lnRef>
+          <a:fillRef idx="2">
+            <a:schemeClr val="accent4"/>
+          </a:fillRef>
+          <a:effectRef idx="1">
+            <a:schemeClr val="accent4"/>
+          </a:effectRef>
+          <a:fontRef idx="minor">
+            <a:schemeClr val="dk1"/>
+          </a:fontRef>
+        </p:style>
+        <p:txBody>
+          <a:bodyPr rtlCol="0" anchor="ctr"/>
+          <a:lstStyle/>
+          <a:p>
+            <a:pPr algn="ctr"/>
+            <a:r>
+              <a:rPr lang="en-US" dirty="0"/>
+              <a:t>QI Core</a:t>
+            </a:r>
+          </a:p>
+        </p:txBody>
+      </p:sp>
+      <p:sp>
+        <p:nvSpPr>
+          <p:cNvPr id="13" name="Rectangle 12">
+            <a:extLst>
+              <a:ext uri="{FF2B5EF4-FFF2-40B4-BE49-F238E27FC236}">
+                <a16:creationId xmlns:a16="http://schemas.microsoft.com/office/drawing/2014/main" id="{5F0E9B49-D113-473E-AA9D-7B2E8A38E8EF}"/>
+              </a:ext>
+            </a:extLst>
+          </p:cNvPr>
+          <p:cNvSpPr/>
+          <p:nvPr/>
+        </p:nvSpPr>
+        <p:spPr>
+          <a:xfrm>
+            <a:off x="1193800" y="1739900"/>
+            <a:ext cx="2120900" cy="368300"/>
+          </a:xfrm>
+          <a:prstGeom prst="rect">
+            <a:avLst/>
+          </a:prstGeom>
+        </p:spPr>
+        <p:style>
+          <a:lnRef idx="1">
+            <a:schemeClr val="accent1"/>
+          </a:lnRef>
+          <a:fillRef idx="2">
+            <a:schemeClr val="accent1"/>
+          </a:fillRef>
+          <a:effectRef idx="1">
+            <a:schemeClr val="accent1"/>
+          </a:effectRef>
+          <a:fontRef idx="minor">
+            <a:schemeClr val="dk1"/>
+          </a:fontRef>
+        </p:style>
+        <p:txBody>
+          <a:bodyPr rtlCol="0" anchor="ctr"/>
+          <a:lstStyle/>
+          <a:p>
+            <a:pPr algn="ctr"/>
+            <a:r>
+              <a:rPr lang="en-US" dirty="0"/>
+              <a:t>DEQM</a:t>
+            </a:r>
+          </a:p>
+        </p:txBody>
+      </p:sp>
+      <p:sp>
+        <p:nvSpPr>
+          <p:cNvPr id="14" name="Arrow: Down 13">
+            <a:extLst>
+              <a:ext uri="{FF2B5EF4-FFF2-40B4-BE49-F238E27FC236}">
+                <a16:creationId xmlns:a16="http://schemas.microsoft.com/office/drawing/2014/main" id="{639D5AAE-8AA3-4833-A148-7B002C90B6CC}"/>
+              </a:ext>
+            </a:extLst>
+          </p:cNvPr>
+          <p:cNvSpPr/>
+          <p:nvPr/>
+        </p:nvSpPr>
+        <p:spPr>
+          <a:xfrm rot="10800000">
+            <a:off x="10250614" y="1739900"/>
+            <a:ext cx="315786" cy="3245104"/>
+          </a:xfrm>
+          <a:prstGeom prst="downArrow">
+            <a:avLst/>
+          </a:prstGeom>
+          <a:gradFill>
+            <a:gsLst>
+              <a:gs pos="0">
+                <a:schemeClr val="accent2">
+                  <a:lumMod val="60000"/>
+                  <a:lumOff val="40000"/>
+                </a:schemeClr>
+              </a:gs>
+              <a:gs pos="35000">
+                <a:schemeClr val="bg2">
+                  <a:lumMod val="75000"/>
+                </a:schemeClr>
+              </a:gs>
+              <a:gs pos="61000">
+                <a:schemeClr val="accent4">
+                  <a:lumMod val="20000"/>
+                  <a:lumOff val="80000"/>
+                </a:schemeClr>
+              </a:gs>
+              <a:gs pos="85000">
+                <a:schemeClr val="accent1">
+                  <a:lumMod val="60000"/>
+                  <a:lumOff val="40000"/>
+                </a:schemeClr>
+              </a:gs>
+            </a:gsLst>
+            <a:lin ang="5400000" scaled="1"/>
+          </a:gradFill>
+        </p:spPr>
+        <p:style>
+          <a:lnRef idx="2">
+            <a:schemeClr val="accent1">
+              <a:shade val="50000"/>
+            </a:schemeClr>
+          </a:lnRef>
+          <a:fillRef idx="1">
+            <a:schemeClr val="accent1"/>
+          </a:fillRef>
+          <a:effectRef idx="0">
+            <a:schemeClr val="accent1"/>
+          </a:effectRef>
+          <a:fontRef idx="minor">
+            <a:schemeClr val="lt1"/>
+          </a:fontRef>
+        </p:style>
+        <p:txBody>
+          <a:bodyPr rtlCol="0" anchor="ctr"/>
+          <a:lstStyle/>
+          <a:p>
+            <a:pPr algn="ctr"/>
+            <a:endParaRPr lang="en-US"/>
+          </a:p>
+        </p:txBody>
+      </p:sp>
+      <p:sp>
+        <p:nvSpPr>
+          <p:cNvPr id="15" name="TextBox 14">
+            <a:extLst>
+              <a:ext uri="{FF2B5EF4-FFF2-40B4-BE49-F238E27FC236}">
+                <a16:creationId xmlns:a16="http://schemas.microsoft.com/office/drawing/2014/main" id="{31A92138-6F0B-4D0C-B488-D21523198A44}"/>
+              </a:ext>
+            </a:extLst>
+          </p:cNvPr>
+          <p:cNvSpPr txBox="1"/>
+          <p:nvPr/>
+        </p:nvSpPr>
+        <p:spPr>
+          <a:xfrm rot="16200000">
+            <a:off x="9370050" y="3121791"/>
+            <a:ext cx="2762038" cy="369332"/>
+          </a:xfrm>
+          <a:prstGeom prst="rect">
+            <a:avLst/>
+          </a:prstGeom>
+          <a:noFill/>
+        </p:spPr>
+        <p:txBody>
+          <a:bodyPr wrap="none" rtlCol="0">
+            <a:spAutoFit/>
+          </a:bodyPr>
+          <a:lstStyle/>
+          <a:p>
+            <a:r>
+              <a:rPr lang="en-US" dirty="0"/>
+              <a:t>Constraint-based Definition</a:t>
+            </a:r>
+          </a:p>
+        </p:txBody>
+      </p:sp>
+      <p:sp>
+        <p:nvSpPr>
+          <p:cNvPr id="16" name="Arrow: Down 15">
+            <a:extLst>
+              <a:ext uri="{FF2B5EF4-FFF2-40B4-BE49-F238E27FC236}">
+                <a16:creationId xmlns:a16="http://schemas.microsoft.com/office/drawing/2014/main" id="{FD7F0013-E967-4918-BB1A-6C68139D125F}"/>
+              </a:ext>
+            </a:extLst>
+          </p:cNvPr>
+          <p:cNvSpPr/>
+          <p:nvPr/>
+        </p:nvSpPr>
+        <p:spPr>
+          <a:xfrm>
+            <a:off x="1404883" y="2203238"/>
+            <a:ext cx="220717" cy="482600"/>
+          </a:xfrm>
+          <a:prstGeom prst="downArrow">
+            <a:avLst/>
+          </a:prstGeom>
+          <a:gradFill>
+            <a:gsLst>
+              <a:gs pos="0">
+                <a:schemeClr val="accent1">
+                  <a:lumMod val="60000"/>
+                  <a:lumOff val="40000"/>
+                </a:schemeClr>
+              </a:gs>
+              <a:gs pos="100000">
+                <a:schemeClr val="accent4">
+                  <a:lumMod val="60000"/>
+                  <a:lumOff val="40000"/>
+                </a:schemeClr>
+              </a:gs>
+            </a:gsLst>
+            <a:lin ang="5400000" scaled="1"/>
+          </a:gradFill>
+        </p:spPr>
+        <p:style>
+          <a:lnRef idx="2">
+            <a:schemeClr val="accent1">
+              <a:shade val="50000"/>
+            </a:schemeClr>
+          </a:lnRef>
+          <a:fillRef idx="1">
+            <a:schemeClr val="accent1"/>
+          </a:fillRef>
+          <a:effectRef idx="0">
+            <a:schemeClr val="accent1"/>
+          </a:effectRef>
+          <a:fontRef idx="minor">
+            <a:schemeClr val="lt1"/>
+          </a:fontRef>
+        </p:style>
+        <p:txBody>
+          <a:bodyPr rtlCol="0" anchor="ctr"/>
+          <a:lstStyle/>
+          <a:p>
+            <a:pPr algn="ctr"/>
+            <a:endParaRPr lang="en-US"/>
+          </a:p>
+        </p:txBody>
+      </p:sp>
+      <p:sp>
+        <p:nvSpPr>
+          <p:cNvPr id="17" name="Arrow: Down 16">
+            <a:extLst>
+              <a:ext uri="{FF2B5EF4-FFF2-40B4-BE49-F238E27FC236}">
+                <a16:creationId xmlns:a16="http://schemas.microsoft.com/office/drawing/2014/main" id="{57BFF4D7-DBF5-49CE-9AAF-D07FBA4A9F1E}"/>
+              </a:ext>
+            </a:extLst>
+          </p:cNvPr>
+          <p:cNvSpPr/>
+          <p:nvPr/>
+        </p:nvSpPr>
+        <p:spPr>
+          <a:xfrm>
+            <a:off x="1404882" y="3238501"/>
+            <a:ext cx="220717" cy="482600"/>
+          </a:xfrm>
+          <a:prstGeom prst="downArrow">
+            <a:avLst/>
+          </a:prstGeom>
+          <a:gradFill>
+            <a:gsLst>
+              <a:gs pos="0">
+                <a:schemeClr val="accent4">
+                  <a:lumMod val="60000"/>
+                  <a:lumOff val="40000"/>
+                </a:schemeClr>
+              </a:gs>
+              <a:gs pos="100000">
+                <a:schemeClr val="accent3">
+                  <a:lumMod val="60000"/>
+                  <a:lumOff val="40000"/>
+                </a:schemeClr>
+              </a:gs>
+            </a:gsLst>
+            <a:lin ang="5400000" scaled="1"/>
+          </a:gradFill>
+        </p:spPr>
+        <p:style>
+          <a:lnRef idx="2">
+            <a:schemeClr val="accent1">
+              <a:shade val="50000"/>
+            </a:schemeClr>
+          </a:lnRef>
+          <a:fillRef idx="1">
+            <a:schemeClr val="accent1"/>
+          </a:fillRef>
+          <a:effectRef idx="0">
+            <a:schemeClr val="accent1"/>
+          </a:effectRef>
+          <a:fontRef idx="minor">
+            <a:schemeClr val="lt1"/>
+          </a:fontRef>
+        </p:style>
+        <p:txBody>
+          <a:bodyPr rtlCol="0" anchor="ctr"/>
+          <a:lstStyle/>
+          <a:p>
+            <a:pPr algn="ctr"/>
+            <a:endParaRPr lang="en-US"/>
+          </a:p>
+        </p:txBody>
+      </p:sp>
+      <p:sp>
+        <p:nvSpPr>
+          <p:cNvPr id="18" name="Arrow: Down 17">
+            <a:extLst>
+              <a:ext uri="{FF2B5EF4-FFF2-40B4-BE49-F238E27FC236}">
+                <a16:creationId xmlns:a16="http://schemas.microsoft.com/office/drawing/2014/main" id="{3D68A192-3A6E-4946-AA32-A499676C9849}"/>
+              </a:ext>
+            </a:extLst>
+          </p:cNvPr>
+          <p:cNvSpPr/>
+          <p:nvPr/>
+        </p:nvSpPr>
+        <p:spPr>
+          <a:xfrm>
+            <a:off x="1404882" y="4241799"/>
+            <a:ext cx="220717" cy="482600"/>
+          </a:xfrm>
+          <a:prstGeom prst="downArrow">
+            <a:avLst/>
+          </a:prstGeom>
+          <a:gradFill>
+            <a:gsLst>
+              <a:gs pos="0">
+                <a:schemeClr val="accent3">
+                  <a:lumMod val="60000"/>
+                  <a:lumOff val="40000"/>
+                </a:schemeClr>
+              </a:gs>
+              <a:gs pos="100000">
+                <a:schemeClr val="accent2">
+                  <a:lumMod val="60000"/>
+                  <a:lumOff val="40000"/>
+                </a:schemeClr>
+              </a:gs>
+            </a:gsLst>
+            <a:lin ang="5400000" scaled="1"/>
+          </a:gradFill>
+        </p:spPr>
+        <p:style>
+          <a:lnRef idx="2">
+            <a:schemeClr val="accent1">
+              <a:shade val="50000"/>
+            </a:schemeClr>
+          </a:lnRef>
+          <a:fillRef idx="1">
+            <a:schemeClr val="accent1"/>
+          </a:fillRef>
+          <a:effectRef idx="0">
+            <a:schemeClr val="accent1"/>
+          </a:effectRef>
+          <a:fontRef idx="minor">
+            <a:schemeClr val="lt1"/>
+          </a:fontRef>
+        </p:style>
+        <p:txBody>
+          <a:bodyPr rtlCol="0" anchor="ctr"/>
+          <a:lstStyle/>
+          <a:p>
+            <a:pPr algn="ctr"/>
+            <a:endParaRPr lang="en-US"/>
+          </a:p>
+        </p:txBody>
+      </p:sp>
+      <p:sp>
+        <p:nvSpPr>
+          <p:cNvPr id="19" name="TextBox 18">
+            <a:extLst>
+              <a:ext uri="{FF2B5EF4-FFF2-40B4-BE49-F238E27FC236}">
+                <a16:creationId xmlns:a16="http://schemas.microsoft.com/office/drawing/2014/main" id="{2BE96E4D-4470-44D8-93A2-731D8FE9B845}"/>
+              </a:ext>
+            </a:extLst>
+          </p:cNvPr>
+          <p:cNvSpPr txBox="1"/>
+          <p:nvPr/>
+        </p:nvSpPr>
+        <p:spPr>
+          <a:xfrm rot="5400000">
+            <a:off x="-572017" y="3295134"/>
+            <a:ext cx="2859565" cy="369332"/>
+          </a:xfrm>
+          <a:prstGeom prst="rect">
+            <a:avLst/>
+          </a:prstGeom>
+          <a:noFill/>
+        </p:spPr>
+        <p:txBody>
+          <a:bodyPr wrap="none" rtlCol="0">
+            <a:spAutoFit/>
+          </a:bodyPr>
+          <a:lstStyle/>
+          <a:p>
+            <a:r>
+              <a:rPr lang="en-US" dirty="0"/>
+              <a:t>Consensus-based Promotion</a:t>
+            </a:r>
+          </a:p>
+        </p:txBody>
+      </p:sp>
+      <p:sp>
+        <p:nvSpPr>
+          <p:cNvPr id="20" name="TextBox 19">
+            <a:extLst>
+              <a:ext uri="{FF2B5EF4-FFF2-40B4-BE49-F238E27FC236}">
+                <a16:creationId xmlns:a16="http://schemas.microsoft.com/office/drawing/2014/main" id="{7BF904E7-B6D7-4EE0-BB67-E2905293C276}"/>
+              </a:ext>
+            </a:extLst>
+          </p:cNvPr>
+          <p:cNvSpPr txBox="1"/>
+          <p:nvPr/>
+        </p:nvSpPr>
+        <p:spPr>
+          <a:xfrm>
+            <a:off x="188663" y="201721"/>
+            <a:ext cx="3307316" cy="369332"/>
+          </a:xfrm>
+          <a:prstGeom prst="rect">
+            <a:avLst/>
+          </a:prstGeom>
+          <a:noFill/>
+        </p:spPr>
+        <p:txBody>
+          <a:bodyPr wrap="none" rtlCol="0">
+            <a:spAutoFit/>
+          </a:bodyPr>
+          <a:lstStyle/>
+          <a:p>
+            <a:r>
+              <a:rPr lang="en-US" dirty="0"/>
+              <a:t>Data Model Standards Landscape</a:t>
+            </a:r>
+          </a:p>
+        </p:txBody>
+      </p:sp>
+    </p:spTree>
+    <p:extLst>
+      <p:ext uri="{BB962C8B-B14F-4D97-AF65-F5344CB8AC3E}">
+        <p14:creationId xmlns:p14="http://schemas.microsoft.com/office/powerpoint/2010/main" val="443574612"/>
+      </p:ext>
+    </p:extLst>
+  </p:cSld>
+  <p:clrMapOvr>
+    <a:masterClrMapping/>
+  </p:clrMapOvr>
+</p:sld>
+</file>
+
+<file path=ppt/slides/slide4.xml><?xml version="1.0" encoding="utf-8"?>
+<p:sld xmlns:a="http://schemas.openxmlformats.org/drawingml/2006/main" xmlns:r="http://schemas.openxmlformats.org/officeDocument/2006/relationships" xmlns:p="http://schemas.openxmlformats.org/presentationml/2006/main">
+  <p:cSld>
+    <p:spTree>
+      <p:nvGrpSpPr>
+        <p:cNvPr id="1" name=""/>
+        <p:cNvGrpSpPr/>
+        <p:nvPr/>
+      </p:nvGrpSpPr>
+      <p:grpSpPr>
+        <a:xfrm>
+          <a:off x="0" y="0"/>
+          <a:ext cx="0" cy="0"/>
+          <a:chOff x="0" y="0"/>
+          <a:chExt cx="0" cy="0"/>
+        </a:xfrm>
+      </p:grpSpPr>
+      <p:sp>
+        <p:nvSpPr>
+          <p:cNvPr id="23" name="Rectangle: Rounded Corners 22">
+            <a:extLst>
+              <a:ext uri="{FF2B5EF4-FFF2-40B4-BE49-F238E27FC236}">
+                <a16:creationId xmlns:a16="http://schemas.microsoft.com/office/drawing/2014/main" id="{F8A5242D-B367-4DA5-A846-46385B7F4058}"/>
+              </a:ext>
+            </a:extLst>
+          </p:cNvPr>
+          <p:cNvSpPr/>
+          <p:nvPr/>
+        </p:nvSpPr>
+        <p:spPr>
+          <a:xfrm>
+            <a:off x="6294329" y="1355062"/>
+            <a:ext cx="2624959" cy="2555549"/>
+          </a:xfrm>
+          <a:prstGeom prst="roundRect">
+            <a:avLst>
+              <a:gd name="adj" fmla="val 7908"/>
+            </a:avLst>
+          </a:prstGeom>
+        </p:spPr>
+        <p:style>
+          <a:lnRef idx="1">
+            <a:schemeClr val="accent3"/>
+          </a:lnRef>
+          <a:fillRef idx="2">
+            <a:schemeClr val="accent3"/>
+          </a:fillRef>
+          <a:effectRef idx="1">
+            <a:schemeClr val="accent3"/>
+          </a:effectRef>
+          <a:fontRef idx="minor">
+            <a:schemeClr val="dk1"/>
+          </a:fontRef>
+        </p:style>
+        <p:txBody>
+          <a:bodyPr rtlCol="0" anchor="ctr"/>
+          <a:lstStyle/>
+          <a:p>
+            <a:pPr algn="ctr"/>
+            <a:endParaRPr lang="en-US"/>
+          </a:p>
+        </p:txBody>
+      </p:sp>
+      <p:sp>
+        <p:nvSpPr>
+          <p:cNvPr id="22" name="Rectangle: Rounded Corners 21">
+            <a:extLst>
+              <a:ext uri="{FF2B5EF4-FFF2-40B4-BE49-F238E27FC236}">
+                <a16:creationId xmlns:a16="http://schemas.microsoft.com/office/drawing/2014/main" id="{4B4359B2-FBCE-45C5-9985-DB046BCC1F55}"/>
+              </a:ext>
+            </a:extLst>
+          </p:cNvPr>
+          <p:cNvSpPr/>
+          <p:nvPr/>
+        </p:nvSpPr>
+        <p:spPr>
+          <a:xfrm>
+            <a:off x="3347439" y="1355063"/>
+            <a:ext cx="2624959" cy="2555549"/>
+          </a:xfrm>
+          <a:prstGeom prst="roundRect">
+            <a:avLst>
+              <a:gd name="adj" fmla="val 7908"/>
+            </a:avLst>
+          </a:prstGeom>
+        </p:spPr>
+        <p:style>
+          <a:lnRef idx="1">
+            <a:schemeClr val="accent3"/>
+          </a:lnRef>
+          <a:fillRef idx="2">
+            <a:schemeClr val="accent3"/>
+          </a:fillRef>
+          <a:effectRef idx="1">
+            <a:schemeClr val="accent3"/>
+          </a:effectRef>
+          <a:fontRef idx="minor">
+            <a:schemeClr val="dk1"/>
+          </a:fontRef>
+        </p:style>
+        <p:txBody>
+          <a:bodyPr rtlCol="0" anchor="ctr"/>
+          <a:lstStyle/>
+          <a:p>
+            <a:pPr algn="ctr"/>
+            <a:endParaRPr lang="en-US"/>
+          </a:p>
+        </p:txBody>
+      </p:sp>
+      <p:sp>
+        <p:nvSpPr>
+          <p:cNvPr id="4" name="Rectangle: Rounded Corners 3">
+            <a:extLst>
+              <a:ext uri="{FF2B5EF4-FFF2-40B4-BE49-F238E27FC236}">
+                <a16:creationId xmlns:a16="http://schemas.microsoft.com/office/drawing/2014/main" id="{7E8C27C6-A8F7-4EB1-AC17-256FCEF52D75}"/>
+              </a:ext>
+            </a:extLst>
+          </p:cNvPr>
+          <p:cNvSpPr/>
+          <p:nvPr/>
+        </p:nvSpPr>
+        <p:spPr>
+          <a:xfrm>
+            <a:off x="2554014" y="2238702"/>
+            <a:ext cx="1734208" cy="788277"/>
+          </a:xfrm>
+          <a:prstGeom prst="roundRect">
+            <a:avLst>
+              <a:gd name="adj" fmla="val 22815"/>
+            </a:avLst>
+          </a:prstGeom>
+        </p:spPr>
+        <p:style>
+          <a:lnRef idx="2">
+            <a:schemeClr val="dk1"/>
+          </a:lnRef>
+          <a:fillRef idx="1">
+            <a:schemeClr val="lt1"/>
+          </a:fillRef>
+          <a:effectRef idx="0">
+            <a:schemeClr val="dk1"/>
+          </a:effectRef>
+          <a:fontRef idx="minor">
+            <a:schemeClr val="dk1"/>
+          </a:fontRef>
+        </p:style>
+        <p:txBody>
+          <a:bodyPr rtlCol="0" anchor="ctr"/>
+          <a:lstStyle/>
+          <a:p>
+            <a:pPr algn="ctr"/>
+            <a:r>
+              <a:rPr lang="en-US" dirty="0"/>
+              <a:t>Providers</a:t>
+            </a:r>
+          </a:p>
+        </p:txBody>
+      </p:sp>
+      <p:sp>
+        <p:nvSpPr>
+          <p:cNvPr id="6" name="Rectangle: Rounded Corners 5">
+            <a:extLst>
+              <a:ext uri="{FF2B5EF4-FFF2-40B4-BE49-F238E27FC236}">
+                <a16:creationId xmlns:a16="http://schemas.microsoft.com/office/drawing/2014/main" id="{62CA6A54-71B1-49F3-9E4E-30782D630A40}"/>
+              </a:ext>
+            </a:extLst>
+          </p:cNvPr>
+          <p:cNvSpPr/>
+          <p:nvPr/>
+        </p:nvSpPr>
+        <p:spPr>
+          <a:xfrm>
+            <a:off x="5260427" y="2238701"/>
+            <a:ext cx="1734208" cy="788277"/>
+          </a:xfrm>
+          <a:prstGeom prst="roundRect">
+            <a:avLst>
+              <a:gd name="adj" fmla="val 22815"/>
+            </a:avLst>
+          </a:prstGeom>
+        </p:spPr>
+        <p:style>
+          <a:lnRef idx="2">
+            <a:schemeClr val="dk1"/>
+          </a:lnRef>
+          <a:fillRef idx="1">
+            <a:schemeClr val="lt1"/>
+          </a:fillRef>
+          <a:effectRef idx="0">
+            <a:schemeClr val="dk1"/>
+          </a:effectRef>
+          <a:fontRef idx="minor">
+            <a:schemeClr val="dk1"/>
+          </a:fontRef>
+        </p:style>
+        <p:txBody>
+          <a:bodyPr rtlCol="0" anchor="ctr"/>
+          <a:lstStyle/>
+          <a:p>
+            <a:pPr algn="ctr"/>
+            <a:r>
+              <a:rPr lang="en-US" dirty="0"/>
+              <a:t>Aggregators</a:t>
+            </a:r>
+          </a:p>
+        </p:txBody>
+      </p:sp>
+      <p:sp>
+        <p:nvSpPr>
+          <p:cNvPr id="7" name="Rectangle: Rounded Corners 6">
+            <a:extLst>
+              <a:ext uri="{FF2B5EF4-FFF2-40B4-BE49-F238E27FC236}">
+                <a16:creationId xmlns:a16="http://schemas.microsoft.com/office/drawing/2014/main" id="{A59D8396-DEA9-4AB0-8899-46A551BA2B7D}"/>
+              </a:ext>
+            </a:extLst>
+          </p:cNvPr>
+          <p:cNvSpPr/>
+          <p:nvPr/>
+        </p:nvSpPr>
+        <p:spPr>
+          <a:xfrm>
+            <a:off x="7966840" y="2238701"/>
+            <a:ext cx="1734208" cy="788277"/>
+          </a:xfrm>
+          <a:prstGeom prst="roundRect">
+            <a:avLst>
+              <a:gd name="adj" fmla="val 22815"/>
+            </a:avLst>
+          </a:prstGeom>
+        </p:spPr>
+        <p:style>
+          <a:lnRef idx="2">
+            <a:schemeClr val="dk1"/>
+          </a:lnRef>
+          <a:fillRef idx="1">
+            <a:schemeClr val="lt1"/>
+          </a:fillRef>
+          <a:effectRef idx="0">
+            <a:schemeClr val="dk1"/>
+          </a:effectRef>
+          <a:fontRef idx="minor">
+            <a:schemeClr val="dk1"/>
+          </a:fontRef>
+        </p:style>
+        <p:txBody>
+          <a:bodyPr rtlCol="0" anchor="ctr"/>
+          <a:lstStyle/>
+          <a:p>
+            <a:pPr algn="ctr"/>
+            <a:r>
+              <a:rPr lang="en-US" dirty="0"/>
+              <a:t>Receivers</a:t>
+            </a:r>
+          </a:p>
+        </p:txBody>
+      </p:sp>
+      <p:sp>
+        <p:nvSpPr>
+          <p:cNvPr id="10" name="Arrow: Circular 9">
+            <a:extLst>
+              <a:ext uri="{FF2B5EF4-FFF2-40B4-BE49-F238E27FC236}">
+                <a16:creationId xmlns:a16="http://schemas.microsoft.com/office/drawing/2014/main" id="{FA4DF3AE-0825-48AC-9219-F02047D72F65}"/>
+              </a:ext>
+            </a:extLst>
+          </p:cNvPr>
+          <p:cNvSpPr/>
+          <p:nvPr/>
+        </p:nvSpPr>
+        <p:spPr>
+          <a:xfrm>
+            <a:off x="3907221" y="1654431"/>
+            <a:ext cx="1734208" cy="978408"/>
+          </a:xfrm>
+          <a:prstGeom prst="circularArrow">
+            <a:avLst>
+              <a:gd name="adj1" fmla="val 3309"/>
+              <a:gd name="adj2" fmla="val 697099"/>
+              <a:gd name="adj3" fmla="val 21018354"/>
+              <a:gd name="adj4" fmla="val 10760252"/>
+              <a:gd name="adj5" fmla="val 7062"/>
+            </a:avLst>
+          </a:prstGeom>
+        </p:spPr>
+        <p:style>
+          <a:lnRef idx="2">
+            <a:schemeClr val="accent1">
+              <a:shade val="50000"/>
+            </a:schemeClr>
+          </a:lnRef>
+          <a:fillRef idx="1">
+            <a:schemeClr val="accent1"/>
+          </a:fillRef>
+          <a:effectRef idx="0">
+            <a:schemeClr val="accent1"/>
+          </a:effectRef>
+          <a:fontRef idx="minor">
+            <a:schemeClr val="lt1"/>
+          </a:fontRef>
+        </p:style>
+        <p:txBody>
+          <a:bodyPr rtlCol="0" anchor="ctr"/>
+          <a:lstStyle/>
+          <a:p>
+            <a:pPr algn="ctr"/>
+            <a:endParaRPr lang="en-US">
+              <a:solidFill>
+                <a:schemeClr val="tx1"/>
+              </a:solidFill>
+            </a:endParaRPr>
+          </a:p>
+        </p:txBody>
+      </p:sp>
+      <p:sp>
+        <p:nvSpPr>
+          <p:cNvPr id="11" name="Arrow: Circular 10">
+            <a:extLst>
+              <a:ext uri="{FF2B5EF4-FFF2-40B4-BE49-F238E27FC236}">
+                <a16:creationId xmlns:a16="http://schemas.microsoft.com/office/drawing/2014/main" id="{5225920C-D0FE-4BBF-8781-6A11E40B3DEF}"/>
+              </a:ext>
+            </a:extLst>
+          </p:cNvPr>
+          <p:cNvSpPr/>
+          <p:nvPr/>
+        </p:nvSpPr>
+        <p:spPr>
+          <a:xfrm rot="10800000">
+            <a:off x="3907220" y="2632840"/>
+            <a:ext cx="1734208" cy="978408"/>
+          </a:xfrm>
+          <a:prstGeom prst="circularArrow">
+            <a:avLst>
+              <a:gd name="adj1" fmla="val 3309"/>
+              <a:gd name="adj2" fmla="val 697099"/>
+              <a:gd name="adj3" fmla="val 21018354"/>
+              <a:gd name="adj4" fmla="val 10760252"/>
+              <a:gd name="adj5" fmla="val 7062"/>
+            </a:avLst>
+          </a:prstGeom>
+        </p:spPr>
+        <p:style>
+          <a:lnRef idx="2">
+            <a:schemeClr val="accent1">
+              <a:shade val="50000"/>
+            </a:schemeClr>
+          </a:lnRef>
+          <a:fillRef idx="1">
+            <a:schemeClr val="accent1"/>
+          </a:fillRef>
+          <a:effectRef idx="0">
+            <a:schemeClr val="accent1"/>
+          </a:effectRef>
+          <a:fontRef idx="minor">
+            <a:schemeClr val="lt1"/>
+          </a:fontRef>
+        </p:style>
+        <p:txBody>
+          <a:bodyPr rtlCol="0" anchor="ctr"/>
+          <a:lstStyle/>
+          <a:p>
+            <a:pPr algn="ctr"/>
+            <a:endParaRPr lang="en-US">
+              <a:solidFill>
+                <a:schemeClr val="tx1"/>
+              </a:solidFill>
+            </a:endParaRPr>
+          </a:p>
+        </p:txBody>
+      </p:sp>
+      <p:sp>
+        <p:nvSpPr>
+          <p:cNvPr id="13" name="Arrow: Pentagon 12">
+            <a:extLst>
+              <a:ext uri="{FF2B5EF4-FFF2-40B4-BE49-F238E27FC236}">
+                <a16:creationId xmlns:a16="http://schemas.microsoft.com/office/drawing/2014/main" id="{729B8AD1-13E9-444A-B7CD-6C4120D04F71}"/>
+              </a:ext>
+            </a:extLst>
+          </p:cNvPr>
+          <p:cNvSpPr/>
+          <p:nvPr/>
+        </p:nvSpPr>
+        <p:spPr>
+          <a:xfrm>
+            <a:off x="2609021" y="3758793"/>
+            <a:ext cx="978408" cy="484632"/>
+          </a:xfrm>
+          <a:prstGeom prst="homePlate">
+            <a:avLst/>
+          </a:prstGeom>
+        </p:spPr>
+        <p:style>
+          <a:lnRef idx="2">
+            <a:schemeClr val="accent1">
+              <a:shade val="50000"/>
+            </a:schemeClr>
+          </a:lnRef>
+          <a:fillRef idx="1">
+            <a:schemeClr val="accent1"/>
+          </a:fillRef>
+          <a:effectRef idx="0">
+            <a:schemeClr val="accent1"/>
+          </a:effectRef>
+          <a:fontRef idx="minor">
+            <a:schemeClr val="lt1"/>
+          </a:fontRef>
+        </p:style>
+        <p:txBody>
+          <a:bodyPr rtlCol="0" anchor="ctr"/>
+          <a:lstStyle/>
+          <a:p>
+            <a:pPr algn="ctr"/>
+            <a:endParaRPr lang="en-US"/>
+          </a:p>
+        </p:txBody>
+      </p:sp>
+      <p:sp>
+        <p:nvSpPr>
+          <p:cNvPr id="14" name="Arrow: Chevron 13">
+            <a:extLst>
+              <a:ext uri="{FF2B5EF4-FFF2-40B4-BE49-F238E27FC236}">
+                <a16:creationId xmlns:a16="http://schemas.microsoft.com/office/drawing/2014/main" id="{81DD1B9B-200A-438F-A0E4-6C248ED5CD59}"/>
+              </a:ext>
+            </a:extLst>
+          </p:cNvPr>
+          <p:cNvSpPr/>
+          <p:nvPr/>
+        </p:nvSpPr>
+        <p:spPr>
+          <a:xfrm>
+            <a:off x="3587429" y="3758793"/>
+            <a:ext cx="978408" cy="484632"/>
+          </a:xfrm>
+          <a:prstGeom prst="chevron">
+            <a:avLst/>
+          </a:prstGeom>
+        </p:spPr>
+        <p:style>
+          <a:lnRef idx="2">
+            <a:schemeClr val="accent1">
+              <a:shade val="50000"/>
+            </a:schemeClr>
+          </a:lnRef>
+          <a:fillRef idx="1">
+            <a:schemeClr val="accent1"/>
+          </a:fillRef>
+          <a:effectRef idx="0">
+            <a:schemeClr val="accent1"/>
+          </a:effectRef>
+          <a:fontRef idx="minor">
+            <a:schemeClr val="lt1"/>
+          </a:fontRef>
+        </p:style>
+        <p:txBody>
+          <a:bodyPr rtlCol="0" anchor="ctr"/>
+          <a:lstStyle/>
+          <a:p>
+            <a:pPr algn="ctr"/>
+            <a:endParaRPr lang="en-US">
+              <a:solidFill>
+                <a:schemeClr val="tx1"/>
+              </a:solidFill>
+            </a:endParaRPr>
+          </a:p>
+        </p:txBody>
+      </p:sp>
+      <p:sp>
+        <p:nvSpPr>
+          <p:cNvPr id="15" name="Arrow: Chevron 14">
+            <a:extLst>
+              <a:ext uri="{FF2B5EF4-FFF2-40B4-BE49-F238E27FC236}">
+                <a16:creationId xmlns:a16="http://schemas.microsoft.com/office/drawing/2014/main" id="{08BA4365-A150-4FD6-9FEF-8FA2C956CAF6}"/>
+              </a:ext>
+            </a:extLst>
+          </p:cNvPr>
+          <p:cNvSpPr/>
+          <p:nvPr/>
+        </p:nvSpPr>
+        <p:spPr>
+          <a:xfrm>
+            <a:off x="4565837" y="3758793"/>
+            <a:ext cx="978408" cy="484632"/>
+          </a:xfrm>
+          <a:prstGeom prst="chevron">
+            <a:avLst/>
+          </a:prstGeom>
+        </p:spPr>
+        <p:style>
+          <a:lnRef idx="2">
+            <a:schemeClr val="accent1">
+              <a:shade val="50000"/>
+            </a:schemeClr>
+          </a:lnRef>
+          <a:fillRef idx="1">
+            <a:schemeClr val="accent1"/>
+          </a:fillRef>
+          <a:effectRef idx="0">
+            <a:schemeClr val="accent1"/>
+          </a:effectRef>
+          <a:fontRef idx="minor">
+            <a:schemeClr val="lt1"/>
+          </a:fontRef>
+        </p:style>
+        <p:txBody>
+          <a:bodyPr rtlCol="0" anchor="ctr"/>
+          <a:lstStyle/>
+          <a:p>
+            <a:pPr algn="ctr"/>
+            <a:endParaRPr lang="en-US">
+              <a:solidFill>
+                <a:schemeClr val="tx1"/>
+              </a:solidFill>
+            </a:endParaRPr>
+          </a:p>
+        </p:txBody>
+      </p:sp>
+      <p:sp>
+        <p:nvSpPr>
+          <p:cNvPr id="16" name="Arrow: Chevron 15">
+            <a:extLst>
+              <a:ext uri="{FF2B5EF4-FFF2-40B4-BE49-F238E27FC236}">
+                <a16:creationId xmlns:a16="http://schemas.microsoft.com/office/drawing/2014/main" id="{3B8A07A9-79C6-4050-8CE1-EF7EAEFD078B}"/>
+              </a:ext>
+            </a:extLst>
+          </p:cNvPr>
+          <p:cNvSpPr/>
+          <p:nvPr/>
+        </p:nvSpPr>
+        <p:spPr>
+          <a:xfrm>
+            <a:off x="5544245" y="3758793"/>
+            <a:ext cx="978408" cy="484632"/>
+          </a:xfrm>
+          <a:prstGeom prst="chevron">
+            <a:avLst/>
+          </a:prstGeom>
+        </p:spPr>
+        <p:style>
+          <a:lnRef idx="2">
+            <a:schemeClr val="accent1">
+              <a:shade val="50000"/>
+            </a:schemeClr>
+          </a:lnRef>
+          <a:fillRef idx="1">
+            <a:schemeClr val="accent1"/>
+          </a:fillRef>
+          <a:effectRef idx="0">
+            <a:schemeClr val="accent1"/>
+          </a:effectRef>
+          <a:fontRef idx="minor">
+            <a:schemeClr val="lt1"/>
+          </a:fontRef>
+        </p:style>
+        <p:txBody>
+          <a:bodyPr rtlCol="0" anchor="ctr"/>
+          <a:lstStyle/>
+          <a:p>
+            <a:pPr algn="ctr"/>
+            <a:endParaRPr lang="en-US">
+              <a:solidFill>
+                <a:schemeClr val="tx1"/>
+              </a:solidFill>
+            </a:endParaRPr>
+          </a:p>
+        </p:txBody>
+      </p:sp>
+      <p:sp>
+        <p:nvSpPr>
+          <p:cNvPr id="20" name="Arrow: Notched Right 19">
+            <a:extLst>
+              <a:ext uri="{FF2B5EF4-FFF2-40B4-BE49-F238E27FC236}">
+                <a16:creationId xmlns:a16="http://schemas.microsoft.com/office/drawing/2014/main" id="{71AA151A-D77F-4A87-9B7C-4C202BBB397A}"/>
+              </a:ext>
+            </a:extLst>
+          </p:cNvPr>
+          <p:cNvSpPr/>
+          <p:nvPr/>
+        </p:nvSpPr>
+        <p:spPr>
+          <a:xfrm>
+            <a:off x="6500175" y="3516477"/>
+            <a:ext cx="988919" cy="969264"/>
+          </a:xfrm>
+          <a:prstGeom prst="notchedRightArrow">
+            <a:avLst>
+              <a:gd name="adj1" fmla="val 50000"/>
+              <a:gd name="adj2" fmla="val 54880"/>
+            </a:avLst>
+          </a:prstGeom>
+        </p:spPr>
+        <p:style>
+          <a:lnRef idx="2">
+            <a:schemeClr val="accent1">
+              <a:shade val="50000"/>
+            </a:schemeClr>
+          </a:lnRef>
+          <a:fillRef idx="1">
+            <a:schemeClr val="accent1"/>
+          </a:fillRef>
+          <a:effectRef idx="0">
+            <a:schemeClr val="accent1"/>
+          </a:effectRef>
+          <a:fontRef idx="minor">
+            <a:schemeClr val="lt1"/>
+          </a:fontRef>
+        </p:style>
+        <p:txBody>
+          <a:bodyPr rtlCol="0" anchor="ctr"/>
+          <a:lstStyle/>
+          <a:p>
+            <a:pPr algn="ctr"/>
+            <a:endParaRPr lang="en-US"/>
+          </a:p>
+        </p:txBody>
+      </p:sp>
+      <p:sp>
+        <p:nvSpPr>
+          <p:cNvPr id="21" name="Arrow: Right 20">
+            <a:extLst>
+              <a:ext uri="{FF2B5EF4-FFF2-40B4-BE49-F238E27FC236}">
+                <a16:creationId xmlns:a16="http://schemas.microsoft.com/office/drawing/2014/main" id="{E48BFB20-858B-407A-8813-88683EF0ED4F}"/>
+              </a:ext>
+            </a:extLst>
+          </p:cNvPr>
+          <p:cNvSpPr/>
+          <p:nvPr/>
+        </p:nvSpPr>
+        <p:spPr>
+          <a:xfrm>
+            <a:off x="7076088" y="2585544"/>
+            <a:ext cx="809298" cy="94589"/>
+          </a:xfrm>
+          <a:prstGeom prst="rightArrow">
+            <a:avLst/>
+          </a:prstGeom>
+        </p:spPr>
+        <p:style>
+          <a:lnRef idx="2">
+            <a:schemeClr val="accent1">
+              <a:shade val="50000"/>
+            </a:schemeClr>
+          </a:lnRef>
+          <a:fillRef idx="1">
+            <a:schemeClr val="accent1"/>
+          </a:fillRef>
+          <a:effectRef idx="0">
+            <a:schemeClr val="accent1"/>
+          </a:effectRef>
+          <a:fontRef idx="minor">
+            <a:schemeClr val="lt1"/>
+          </a:fontRef>
+        </p:style>
+        <p:txBody>
+          <a:bodyPr rtlCol="0" anchor="ctr"/>
+          <a:lstStyle/>
+          <a:p>
+            <a:pPr algn="ctr"/>
+            <a:endParaRPr lang="en-US"/>
+          </a:p>
+        </p:txBody>
+      </p:sp>
+      <p:sp>
+        <p:nvSpPr>
+          <p:cNvPr id="24" name="TextBox 23">
+            <a:extLst>
+              <a:ext uri="{FF2B5EF4-FFF2-40B4-BE49-F238E27FC236}">
+                <a16:creationId xmlns:a16="http://schemas.microsoft.com/office/drawing/2014/main" id="{530ACF03-3E21-4783-A1BC-2E6A3F24CB67}"/>
+              </a:ext>
+            </a:extLst>
+          </p:cNvPr>
+          <p:cNvSpPr txBox="1"/>
+          <p:nvPr/>
+        </p:nvSpPr>
+        <p:spPr>
+          <a:xfrm>
+            <a:off x="3767029" y="973328"/>
+            <a:ext cx="2014590" cy="369332"/>
+          </a:xfrm>
+          <a:prstGeom prst="rect">
+            <a:avLst/>
+          </a:prstGeom>
+          <a:noFill/>
+        </p:spPr>
+        <p:txBody>
+          <a:bodyPr wrap="none" rtlCol="0">
+            <a:spAutoFit/>
+          </a:bodyPr>
+          <a:lstStyle/>
+          <a:p>
+            <a:r>
+              <a:rPr lang="en-US" dirty="0"/>
+              <a:t>Exchange Scenarios</a:t>
+            </a:r>
+          </a:p>
+        </p:txBody>
+      </p:sp>
+      <p:sp>
+        <p:nvSpPr>
+          <p:cNvPr id="25" name="TextBox 24">
+            <a:extLst>
+              <a:ext uri="{FF2B5EF4-FFF2-40B4-BE49-F238E27FC236}">
+                <a16:creationId xmlns:a16="http://schemas.microsoft.com/office/drawing/2014/main" id="{7919C991-B75E-4E1C-82AB-C8912DED7F00}"/>
+              </a:ext>
+            </a:extLst>
+          </p:cNvPr>
+          <p:cNvSpPr txBox="1"/>
+          <p:nvPr/>
+        </p:nvSpPr>
+        <p:spPr>
+          <a:xfrm>
+            <a:off x="6599513" y="982898"/>
+            <a:ext cx="2054537" cy="369332"/>
+          </a:xfrm>
+          <a:prstGeom prst="rect">
+            <a:avLst/>
+          </a:prstGeom>
+          <a:noFill/>
+        </p:spPr>
+        <p:txBody>
+          <a:bodyPr wrap="none" rtlCol="0">
+            <a:spAutoFit/>
+          </a:bodyPr>
+          <a:lstStyle/>
+          <a:p>
+            <a:r>
+              <a:rPr lang="en-US" dirty="0"/>
+              <a:t>Reporting Scenarios</a:t>
+            </a:r>
+          </a:p>
+        </p:txBody>
+      </p:sp>
+      <p:sp>
+        <p:nvSpPr>
+          <p:cNvPr id="26" name="TextBox 25">
+            <a:extLst>
+              <a:ext uri="{FF2B5EF4-FFF2-40B4-BE49-F238E27FC236}">
+                <a16:creationId xmlns:a16="http://schemas.microsoft.com/office/drawing/2014/main" id="{5974DC83-FDAC-4BE4-B479-F9CA0E1AD844}"/>
+              </a:ext>
+            </a:extLst>
+          </p:cNvPr>
+          <p:cNvSpPr txBox="1"/>
+          <p:nvPr/>
+        </p:nvSpPr>
+        <p:spPr>
+          <a:xfrm>
+            <a:off x="4155461" y="4244063"/>
+            <a:ext cx="1664173" cy="369333"/>
+          </a:xfrm>
+          <a:prstGeom prst="rect">
+            <a:avLst/>
+          </a:prstGeom>
+          <a:noFill/>
+        </p:spPr>
+        <p:txBody>
+          <a:bodyPr wrap="square" rtlCol="0">
+            <a:spAutoFit/>
+          </a:bodyPr>
+          <a:lstStyle/>
+          <a:p>
+            <a:r>
+              <a:rPr lang="en-US" dirty="0" err="1"/>
+              <a:t>Reorting</a:t>
+            </a:r>
+            <a:r>
+              <a:rPr lang="en-US" dirty="0"/>
+              <a:t> Period</a:t>
+            </a:r>
+          </a:p>
+        </p:txBody>
+      </p:sp>
+      <p:sp>
+        <p:nvSpPr>
+          <p:cNvPr id="27" name="TextBox 26">
+            <a:extLst>
+              <a:ext uri="{FF2B5EF4-FFF2-40B4-BE49-F238E27FC236}">
+                <a16:creationId xmlns:a16="http://schemas.microsoft.com/office/drawing/2014/main" id="{A9999BC3-731A-4D2B-9BCD-2F45DFA49C48}"/>
+              </a:ext>
+            </a:extLst>
+          </p:cNvPr>
+          <p:cNvSpPr txBox="1"/>
+          <p:nvPr/>
+        </p:nvSpPr>
+        <p:spPr>
+          <a:xfrm>
+            <a:off x="188663" y="201721"/>
+            <a:ext cx="2782300" cy="369332"/>
+          </a:xfrm>
+          <a:prstGeom prst="rect">
+            <a:avLst/>
+          </a:prstGeom>
+          <a:noFill/>
+        </p:spPr>
+        <p:txBody>
+          <a:bodyPr wrap="none" rtlCol="0">
+            <a:spAutoFit/>
+          </a:bodyPr>
+          <a:lstStyle/>
+          <a:p>
+            <a:r>
+              <a:rPr lang="en-US" dirty="0"/>
+              <a:t>Quality Reporting Scenarios</a:t>
+            </a:r>
+          </a:p>
+        </p:txBody>
+      </p:sp>
+      <p:sp>
+        <p:nvSpPr>
+          <p:cNvPr id="28" name="Oval 27">
+            <a:extLst>
+              <a:ext uri="{FF2B5EF4-FFF2-40B4-BE49-F238E27FC236}">
+                <a16:creationId xmlns:a16="http://schemas.microsoft.com/office/drawing/2014/main" id="{F12D3CEE-27B0-4207-97AA-96A4BCA75AD0}"/>
+              </a:ext>
+            </a:extLst>
+          </p:cNvPr>
+          <p:cNvSpPr/>
+          <p:nvPr/>
+        </p:nvSpPr>
+        <p:spPr>
+          <a:xfrm>
+            <a:off x="2970963" y="4773105"/>
+            <a:ext cx="331076" cy="369332"/>
+          </a:xfrm>
+          <a:prstGeom prst="ellipse">
+            <a:avLst/>
+          </a:prstGeom>
+        </p:spPr>
+        <p:style>
+          <a:lnRef idx="2">
+            <a:schemeClr val="accent1">
+              <a:shade val="50000"/>
+            </a:schemeClr>
+          </a:lnRef>
+          <a:fillRef idx="1">
+            <a:schemeClr val="accent1"/>
+          </a:fillRef>
+          <a:effectRef idx="0">
+            <a:schemeClr val="accent1"/>
+          </a:effectRef>
+          <a:fontRef idx="minor">
+            <a:schemeClr val="lt1"/>
+          </a:fontRef>
+        </p:style>
+        <p:txBody>
+          <a:bodyPr rtlCol="0" anchor="ctr"/>
+          <a:lstStyle/>
+          <a:p>
+            <a:pPr algn="ctr"/>
+            <a:r>
+              <a:rPr lang="en-US" dirty="0"/>
+              <a:t>1</a:t>
+            </a:r>
+          </a:p>
+        </p:txBody>
+      </p:sp>
+      <p:sp>
+        <p:nvSpPr>
+          <p:cNvPr id="29" name="Oval 28">
+            <a:extLst>
+              <a:ext uri="{FF2B5EF4-FFF2-40B4-BE49-F238E27FC236}">
+                <a16:creationId xmlns:a16="http://schemas.microsoft.com/office/drawing/2014/main" id="{FD078174-DD93-4B60-9E10-D033CB23A4AC}"/>
+              </a:ext>
+            </a:extLst>
+          </p:cNvPr>
+          <p:cNvSpPr/>
+          <p:nvPr/>
+        </p:nvSpPr>
+        <p:spPr>
+          <a:xfrm>
+            <a:off x="2970963" y="5297152"/>
+            <a:ext cx="331076" cy="369332"/>
+          </a:xfrm>
+          <a:prstGeom prst="ellipse">
+            <a:avLst/>
+          </a:prstGeom>
+        </p:spPr>
+        <p:style>
+          <a:lnRef idx="2">
+            <a:schemeClr val="accent1">
+              <a:shade val="50000"/>
+            </a:schemeClr>
+          </a:lnRef>
+          <a:fillRef idx="1">
+            <a:schemeClr val="accent1"/>
+          </a:fillRef>
+          <a:effectRef idx="0">
+            <a:schemeClr val="accent1"/>
+          </a:effectRef>
+          <a:fontRef idx="minor">
+            <a:schemeClr val="lt1"/>
+          </a:fontRef>
+        </p:style>
+        <p:txBody>
+          <a:bodyPr rtlCol="0" anchor="ctr"/>
+          <a:lstStyle/>
+          <a:p>
+            <a:pPr algn="ctr"/>
+            <a:r>
+              <a:rPr lang="en-US" dirty="0"/>
+              <a:t>2</a:t>
+            </a:r>
+          </a:p>
+        </p:txBody>
+      </p:sp>
+      <p:sp>
+        <p:nvSpPr>
+          <p:cNvPr id="31" name="Oval 30">
+            <a:extLst>
+              <a:ext uri="{FF2B5EF4-FFF2-40B4-BE49-F238E27FC236}">
+                <a16:creationId xmlns:a16="http://schemas.microsoft.com/office/drawing/2014/main" id="{31A1A947-A48B-4F73-B101-F4DEB368CFD1}"/>
+              </a:ext>
+            </a:extLst>
+          </p:cNvPr>
+          <p:cNvSpPr/>
+          <p:nvPr/>
+        </p:nvSpPr>
+        <p:spPr>
+          <a:xfrm>
+            <a:off x="2970963" y="5821199"/>
+            <a:ext cx="331076" cy="369332"/>
+          </a:xfrm>
+          <a:prstGeom prst="ellipse">
+            <a:avLst/>
+          </a:prstGeom>
+        </p:spPr>
+        <p:style>
+          <a:lnRef idx="2">
+            <a:schemeClr val="accent1">
+              <a:shade val="50000"/>
+            </a:schemeClr>
+          </a:lnRef>
+          <a:fillRef idx="1">
+            <a:schemeClr val="accent1"/>
+          </a:fillRef>
+          <a:effectRef idx="0">
+            <a:schemeClr val="accent1"/>
+          </a:effectRef>
+          <a:fontRef idx="minor">
+            <a:schemeClr val="lt1"/>
+          </a:fontRef>
+        </p:style>
+        <p:txBody>
+          <a:bodyPr rtlCol="0" anchor="ctr"/>
+          <a:lstStyle/>
+          <a:p>
+            <a:pPr algn="ctr"/>
+            <a:r>
+              <a:rPr lang="en-US" dirty="0"/>
+              <a:t>3</a:t>
+            </a:r>
+          </a:p>
+        </p:txBody>
+      </p:sp>
+      <p:sp>
+        <p:nvSpPr>
+          <p:cNvPr id="32" name="Oval 31">
+            <a:extLst>
+              <a:ext uri="{FF2B5EF4-FFF2-40B4-BE49-F238E27FC236}">
+                <a16:creationId xmlns:a16="http://schemas.microsoft.com/office/drawing/2014/main" id="{326A7B3C-087B-4086-B8CF-BC973DE13751}"/>
+              </a:ext>
+            </a:extLst>
+          </p:cNvPr>
+          <p:cNvSpPr/>
+          <p:nvPr/>
+        </p:nvSpPr>
+        <p:spPr>
+          <a:xfrm>
+            <a:off x="6033449" y="4763078"/>
+            <a:ext cx="331076" cy="369332"/>
+          </a:xfrm>
+          <a:prstGeom prst="ellipse">
+            <a:avLst/>
+          </a:prstGeom>
+        </p:spPr>
+        <p:style>
+          <a:lnRef idx="2">
+            <a:schemeClr val="accent1">
+              <a:shade val="50000"/>
+            </a:schemeClr>
+          </a:lnRef>
+          <a:fillRef idx="1">
+            <a:schemeClr val="accent1"/>
+          </a:fillRef>
+          <a:effectRef idx="0">
+            <a:schemeClr val="accent1"/>
+          </a:effectRef>
+          <a:fontRef idx="minor">
+            <a:schemeClr val="lt1"/>
+          </a:fontRef>
+        </p:style>
+        <p:txBody>
+          <a:bodyPr rtlCol="0" anchor="ctr"/>
+          <a:lstStyle/>
+          <a:p>
+            <a:pPr algn="ctr"/>
+            <a:r>
+              <a:rPr lang="en-US" dirty="0"/>
+              <a:t>4</a:t>
+            </a:r>
+          </a:p>
+        </p:txBody>
+      </p:sp>
+      <p:sp>
+        <p:nvSpPr>
+          <p:cNvPr id="33" name="Oval 32">
+            <a:extLst>
+              <a:ext uri="{FF2B5EF4-FFF2-40B4-BE49-F238E27FC236}">
+                <a16:creationId xmlns:a16="http://schemas.microsoft.com/office/drawing/2014/main" id="{185EDC90-8346-42AF-973D-DFB42CF7DC56}"/>
+              </a:ext>
+            </a:extLst>
+          </p:cNvPr>
+          <p:cNvSpPr/>
+          <p:nvPr/>
+        </p:nvSpPr>
+        <p:spPr>
+          <a:xfrm>
+            <a:off x="6033449" y="5290488"/>
+            <a:ext cx="331076" cy="369332"/>
+          </a:xfrm>
+          <a:prstGeom prst="ellipse">
+            <a:avLst/>
+          </a:prstGeom>
+        </p:spPr>
+        <p:style>
+          <a:lnRef idx="2">
+            <a:schemeClr val="accent1">
+              <a:shade val="50000"/>
+            </a:schemeClr>
+          </a:lnRef>
+          <a:fillRef idx="1">
+            <a:schemeClr val="accent1"/>
+          </a:fillRef>
+          <a:effectRef idx="0">
+            <a:schemeClr val="accent1"/>
+          </a:effectRef>
+          <a:fontRef idx="minor">
+            <a:schemeClr val="lt1"/>
+          </a:fontRef>
+        </p:style>
+        <p:txBody>
+          <a:bodyPr rtlCol="0" anchor="ctr"/>
+          <a:lstStyle/>
+          <a:p>
+            <a:pPr algn="ctr"/>
+            <a:r>
+              <a:rPr lang="en-US" dirty="0"/>
+              <a:t>5</a:t>
+            </a:r>
+          </a:p>
+        </p:txBody>
+      </p:sp>
+      <p:sp>
+        <p:nvSpPr>
+          <p:cNvPr id="34" name="Oval 33">
+            <a:extLst>
+              <a:ext uri="{FF2B5EF4-FFF2-40B4-BE49-F238E27FC236}">
+                <a16:creationId xmlns:a16="http://schemas.microsoft.com/office/drawing/2014/main" id="{99283339-11C6-4E92-841E-B25BDA2A2054}"/>
+              </a:ext>
+            </a:extLst>
+          </p:cNvPr>
+          <p:cNvSpPr/>
+          <p:nvPr/>
+        </p:nvSpPr>
+        <p:spPr>
+          <a:xfrm>
+            <a:off x="6033449" y="5814535"/>
+            <a:ext cx="331076" cy="369332"/>
+          </a:xfrm>
+          <a:prstGeom prst="ellipse">
+            <a:avLst/>
+          </a:prstGeom>
+        </p:spPr>
+        <p:style>
+          <a:lnRef idx="2">
+            <a:schemeClr val="accent1">
+              <a:shade val="50000"/>
+            </a:schemeClr>
+          </a:lnRef>
+          <a:fillRef idx="1">
+            <a:schemeClr val="accent1"/>
+          </a:fillRef>
+          <a:effectRef idx="0">
+            <a:schemeClr val="accent1"/>
+          </a:effectRef>
+          <a:fontRef idx="minor">
+            <a:schemeClr val="lt1"/>
+          </a:fontRef>
+        </p:style>
+        <p:txBody>
+          <a:bodyPr rtlCol="0" anchor="ctr"/>
+          <a:lstStyle/>
+          <a:p>
+            <a:pPr algn="ctr"/>
+            <a:r>
+              <a:rPr lang="en-US" dirty="0"/>
+              <a:t>6</a:t>
+            </a:r>
+          </a:p>
+        </p:txBody>
+      </p:sp>
+      <p:sp>
+        <p:nvSpPr>
+          <p:cNvPr id="35" name="TextBox 34">
+            <a:extLst>
+              <a:ext uri="{FF2B5EF4-FFF2-40B4-BE49-F238E27FC236}">
+                <a16:creationId xmlns:a16="http://schemas.microsoft.com/office/drawing/2014/main" id="{48936F3F-CEDB-4BD7-9BDE-1379D8563790}"/>
+              </a:ext>
+            </a:extLst>
+          </p:cNvPr>
+          <p:cNvSpPr txBox="1"/>
+          <p:nvPr/>
+        </p:nvSpPr>
+        <p:spPr>
+          <a:xfrm>
+            <a:off x="3464757" y="4773105"/>
+            <a:ext cx="1337097" cy="369332"/>
+          </a:xfrm>
+          <a:prstGeom prst="rect">
+            <a:avLst/>
+          </a:prstGeom>
+          <a:noFill/>
+        </p:spPr>
+        <p:txBody>
+          <a:bodyPr wrap="none" rtlCol="0">
+            <a:spAutoFit/>
+          </a:bodyPr>
+          <a:lstStyle/>
+          <a:p>
+            <a:r>
+              <a:rPr lang="en-US" dirty="0"/>
+              <a:t>Submit Data</a:t>
+            </a:r>
+          </a:p>
+        </p:txBody>
+      </p:sp>
+      <p:sp>
+        <p:nvSpPr>
+          <p:cNvPr id="36" name="TextBox 35">
+            <a:extLst>
+              <a:ext uri="{FF2B5EF4-FFF2-40B4-BE49-F238E27FC236}">
+                <a16:creationId xmlns:a16="http://schemas.microsoft.com/office/drawing/2014/main" id="{8AEC4D0D-AD37-4542-9E9E-509CC721F37E}"/>
+              </a:ext>
+            </a:extLst>
+          </p:cNvPr>
+          <p:cNvSpPr txBox="1"/>
+          <p:nvPr/>
+        </p:nvSpPr>
+        <p:spPr>
+          <a:xfrm>
+            <a:off x="3453535" y="5303720"/>
+            <a:ext cx="1314655" cy="369332"/>
+          </a:xfrm>
+          <a:prstGeom prst="rect">
+            <a:avLst/>
+          </a:prstGeom>
+          <a:noFill/>
+        </p:spPr>
+        <p:txBody>
+          <a:bodyPr wrap="none" rtlCol="0">
+            <a:spAutoFit/>
+          </a:bodyPr>
+          <a:lstStyle/>
+          <a:p>
+            <a:r>
+              <a:rPr lang="en-US" dirty="0"/>
+              <a:t>Collect Data</a:t>
+            </a:r>
+          </a:p>
+        </p:txBody>
+      </p:sp>
+      <p:sp>
+        <p:nvSpPr>
+          <p:cNvPr id="37" name="TextBox 36">
+            <a:extLst>
+              <a:ext uri="{FF2B5EF4-FFF2-40B4-BE49-F238E27FC236}">
+                <a16:creationId xmlns:a16="http://schemas.microsoft.com/office/drawing/2014/main" id="{7E220F5C-FA4B-4797-90DD-A97C755C3F4D}"/>
+              </a:ext>
+            </a:extLst>
+          </p:cNvPr>
+          <p:cNvSpPr txBox="1"/>
+          <p:nvPr/>
+        </p:nvSpPr>
+        <p:spPr>
+          <a:xfrm>
+            <a:off x="3464757" y="5835429"/>
+            <a:ext cx="1347869" cy="369332"/>
+          </a:xfrm>
+          <a:prstGeom prst="rect">
+            <a:avLst/>
+          </a:prstGeom>
+          <a:noFill/>
+        </p:spPr>
+        <p:txBody>
+          <a:bodyPr wrap="none" rtlCol="0">
+            <a:spAutoFit/>
+          </a:bodyPr>
+          <a:lstStyle/>
+          <a:p>
+            <a:r>
+              <a:rPr lang="en-US" dirty="0"/>
+              <a:t>Subscription</a:t>
+            </a:r>
+          </a:p>
+        </p:txBody>
+      </p:sp>
+      <p:sp>
+        <p:nvSpPr>
+          <p:cNvPr id="38" name="TextBox 37">
+            <a:extLst>
+              <a:ext uri="{FF2B5EF4-FFF2-40B4-BE49-F238E27FC236}">
+                <a16:creationId xmlns:a16="http://schemas.microsoft.com/office/drawing/2014/main" id="{ECAC1126-8A72-43E0-81B6-CDB1970A707E}"/>
+              </a:ext>
+            </a:extLst>
+          </p:cNvPr>
+          <p:cNvSpPr txBox="1"/>
+          <p:nvPr/>
+        </p:nvSpPr>
+        <p:spPr>
+          <a:xfrm>
+            <a:off x="6548289" y="4746955"/>
+            <a:ext cx="1103187" cy="369332"/>
+          </a:xfrm>
+          <a:prstGeom prst="rect">
+            <a:avLst/>
+          </a:prstGeom>
+          <a:noFill/>
+        </p:spPr>
+        <p:txBody>
+          <a:bodyPr wrap="none" rtlCol="0">
+            <a:spAutoFit/>
+          </a:bodyPr>
+          <a:lstStyle/>
+          <a:p>
+            <a:r>
+              <a:rPr lang="en-US" dirty="0"/>
+              <a:t>Individual</a:t>
+            </a:r>
+          </a:p>
+        </p:txBody>
+      </p:sp>
+      <p:sp>
+        <p:nvSpPr>
+          <p:cNvPr id="39" name="TextBox 38">
+            <a:extLst>
+              <a:ext uri="{FF2B5EF4-FFF2-40B4-BE49-F238E27FC236}">
+                <a16:creationId xmlns:a16="http://schemas.microsoft.com/office/drawing/2014/main" id="{19F38669-ACCD-4463-89D1-B738E5C4071D}"/>
+              </a:ext>
+            </a:extLst>
+          </p:cNvPr>
+          <p:cNvSpPr txBox="1"/>
+          <p:nvPr/>
+        </p:nvSpPr>
+        <p:spPr>
+          <a:xfrm>
+            <a:off x="6537067" y="5277570"/>
+            <a:ext cx="1077090" cy="369332"/>
+          </a:xfrm>
+          <a:prstGeom prst="rect">
+            <a:avLst/>
+          </a:prstGeom>
+          <a:noFill/>
+        </p:spPr>
+        <p:txBody>
+          <a:bodyPr wrap="none" rtlCol="0">
+            <a:spAutoFit/>
+          </a:bodyPr>
+          <a:lstStyle/>
+          <a:p>
+            <a:r>
+              <a:rPr lang="en-US" dirty="0"/>
+              <a:t>Summary</a:t>
+            </a:r>
+          </a:p>
+        </p:txBody>
+      </p:sp>
+      <p:sp>
+        <p:nvSpPr>
+          <p:cNvPr id="40" name="TextBox 39">
+            <a:extLst>
+              <a:ext uri="{FF2B5EF4-FFF2-40B4-BE49-F238E27FC236}">
+                <a16:creationId xmlns:a16="http://schemas.microsoft.com/office/drawing/2014/main" id="{5176EA77-8354-472A-B825-A49D042C6325}"/>
+              </a:ext>
+            </a:extLst>
+          </p:cNvPr>
+          <p:cNvSpPr txBox="1"/>
+          <p:nvPr/>
+        </p:nvSpPr>
+        <p:spPr>
+          <a:xfrm>
+            <a:off x="6548289" y="5809279"/>
+            <a:ext cx="1216487" cy="369332"/>
+          </a:xfrm>
+          <a:prstGeom prst="rect">
+            <a:avLst/>
+          </a:prstGeom>
+          <a:noFill/>
+        </p:spPr>
+        <p:txBody>
+          <a:bodyPr wrap="none" rtlCol="0">
+            <a:spAutoFit/>
+          </a:bodyPr>
+          <a:lstStyle/>
+          <a:p>
+            <a:r>
+              <a:rPr lang="en-US" dirty="0"/>
+              <a:t>Patient List</a:t>
+            </a:r>
+          </a:p>
+        </p:txBody>
+      </p:sp>
+    </p:spTree>
+    <p:extLst>
+      <p:ext uri="{BB962C8B-B14F-4D97-AF65-F5344CB8AC3E}">
+        <p14:creationId xmlns:p14="http://schemas.microsoft.com/office/powerpoint/2010/main" val="1551355754"/>
+      </p:ext>
+    </p:extLst>
+  </p:cSld>
+  <p:clrMapOvr>
+    <a:masterClrMapping/>
+  </p:clrMapOvr>
+</p:sld>
+</file>
+
 <file path=ppt/theme/theme1.xml><?xml version="1.0" encoding="utf-8"?>
 <a:theme xmlns:a="http://schemas.openxmlformats.org/drawingml/2006/main" name="Office Theme">
   <a:themeElements>

</xml_diff>

<commit_message>
Updated the ecosystem diagram.
</commit_message>
<xml_diff>
--- a/diagrams/FHIR Measure IG Diagram.pptx
+++ b/diagrams/FHIR Measure IG Diagram.pptx
@@ -7002,8 +7002,8 @@
         </p:nvSpPr>
         <p:spPr>
           <a:xfrm>
-            <a:off x="4155461" y="4244063"/>
-            <a:ext cx="1664173" cy="369333"/>
+            <a:off x="4027223" y="4255626"/>
+            <a:ext cx="2209064" cy="369332"/>
           </a:xfrm>
           <a:prstGeom prst="rect">
             <a:avLst/>
@@ -7017,12 +7017,8 @@
           <a:lstStyle/>
           <a:p>
             <a:r>
-              <a:rPr lang="en-US" dirty="0" err="1"/>
-              <a:t>Reorting</a:t>
-            </a:r>
-            <a:r>
               <a:rPr lang="en-US" dirty="0"/>
-              <a:t> Period</a:t>
+              <a:t>Measurement Period</a:t>
             </a:r>
           </a:p>
         </p:txBody>

</xml_diff>

<commit_message>
Applying feedback from working session and measure developers
</commit_message>
<xml_diff>
--- a/diagrams/FHIR Measure IG Diagram.pptx
+++ b/diagrams/FHIR Measure IG Diagram.pptx
@@ -262,7 +262,7 @@
           <a:p>
             <a:fld id="{A1C33FE8-8021-45D4-B0C5-0B5FC73F013B}" type="datetimeFigureOut">
               <a:rPr lang="en-US" smtClean="0"/>
-              <a:t>3/3/2019</a:t>
+              <a:t>3/5/2019</a:t>
             </a:fld>
             <a:endParaRPr lang="en-US"/>
           </a:p>
@@ -460,7 +460,7 @@
           <a:p>
             <a:fld id="{A1C33FE8-8021-45D4-B0C5-0B5FC73F013B}" type="datetimeFigureOut">
               <a:rPr lang="en-US" smtClean="0"/>
-              <a:t>3/3/2019</a:t>
+              <a:t>3/5/2019</a:t>
             </a:fld>
             <a:endParaRPr lang="en-US"/>
           </a:p>
@@ -668,7 +668,7 @@
           <a:p>
             <a:fld id="{A1C33FE8-8021-45D4-B0C5-0B5FC73F013B}" type="datetimeFigureOut">
               <a:rPr lang="en-US" smtClean="0"/>
-              <a:t>3/3/2019</a:t>
+              <a:t>3/5/2019</a:t>
             </a:fld>
             <a:endParaRPr lang="en-US"/>
           </a:p>
@@ -866,7 +866,7 @@
           <a:p>
             <a:fld id="{A1C33FE8-8021-45D4-B0C5-0B5FC73F013B}" type="datetimeFigureOut">
               <a:rPr lang="en-US" smtClean="0"/>
-              <a:t>3/3/2019</a:t>
+              <a:t>3/5/2019</a:t>
             </a:fld>
             <a:endParaRPr lang="en-US"/>
           </a:p>
@@ -1141,7 +1141,7 @@
           <a:p>
             <a:fld id="{A1C33FE8-8021-45D4-B0C5-0B5FC73F013B}" type="datetimeFigureOut">
               <a:rPr lang="en-US" smtClean="0"/>
-              <a:t>3/3/2019</a:t>
+              <a:t>3/5/2019</a:t>
             </a:fld>
             <a:endParaRPr lang="en-US"/>
           </a:p>
@@ -1406,7 +1406,7 @@
           <a:p>
             <a:fld id="{A1C33FE8-8021-45D4-B0C5-0B5FC73F013B}" type="datetimeFigureOut">
               <a:rPr lang="en-US" smtClean="0"/>
-              <a:t>3/3/2019</a:t>
+              <a:t>3/5/2019</a:t>
             </a:fld>
             <a:endParaRPr lang="en-US"/>
           </a:p>
@@ -1818,7 +1818,7 @@
           <a:p>
             <a:fld id="{A1C33FE8-8021-45D4-B0C5-0B5FC73F013B}" type="datetimeFigureOut">
               <a:rPr lang="en-US" smtClean="0"/>
-              <a:t>3/3/2019</a:t>
+              <a:t>3/5/2019</a:t>
             </a:fld>
             <a:endParaRPr lang="en-US"/>
           </a:p>
@@ -1959,7 +1959,7 @@
           <a:p>
             <a:fld id="{A1C33FE8-8021-45D4-B0C5-0B5FC73F013B}" type="datetimeFigureOut">
               <a:rPr lang="en-US" smtClean="0"/>
-              <a:t>3/3/2019</a:t>
+              <a:t>3/5/2019</a:t>
             </a:fld>
             <a:endParaRPr lang="en-US"/>
           </a:p>
@@ -2072,7 +2072,7 @@
           <a:p>
             <a:fld id="{A1C33FE8-8021-45D4-B0C5-0B5FC73F013B}" type="datetimeFigureOut">
               <a:rPr lang="en-US" smtClean="0"/>
-              <a:t>3/3/2019</a:t>
+              <a:t>3/5/2019</a:t>
             </a:fld>
             <a:endParaRPr lang="en-US"/>
           </a:p>
@@ -2383,7 +2383,7 @@
           <a:p>
             <a:fld id="{A1C33FE8-8021-45D4-B0C5-0B5FC73F013B}" type="datetimeFigureOut">
               <a:rPr lang="en-US" smtClean="0"/>
-              <a:t>3/3/2019</a:t>
+              <a:t>3/5/2019</a:t>
             </a:fld>
             <a:endParaRPr lang="en-US"/>
           </a:p>
@@ -2671,7 +2671,7 @@
           <a:p>
             <a:fld id="{A1C33FE8-8021-45D4-B0C5-0B5FC73F013B}" type="datetimeFigureOut">
               <a:rPr lang="en-US" smtClean="0"/>
-              <a:t>3/3/2019</a:t>
+              <a:t>3/5/2019</a:t>
             </a:fld>
             <a:endParaRPr lang="en-US"/>
           </a:p>
@@ -2912,7 +2912,7 @@
           <a:p>
             <a:fld id="{A1C33FE8-8021-45D4-B0C5-0B5FC73F013B}" type="datetimeFigureOut">
               <a:rPr lang="en-US" smtClean="0"/>
-              <a:t>3/3/2019</a:t>
+              <a:t>3/5/2019</a:t>
             </a:fld>
             <a:endParaRPr lang="en-US"/>
           </a:p>
@@ -3932,13 +3932,18 @@
           <a:p>
             <a:pPr algn="ctr"/>
             <a:r>
-              <a:rPr lang="en-US" dirty="0">
+              <a:rPr lang="en-US">
                 <a:solidFill>
                   <a:schemeClr val="bg1"/>
                 </a:solidFill>
               </a:rPr>
-              <a:t>FHIR QUICK</a:t>
-            </a:r>
+              <a:t>QI Core</a:t>
+            </a:r>
+            <a:endParaRPr lang="en-US" dirty="0">
+              <a:solidFill>
+                <a:schemeClr val="bg1"/>
+              </a:solidFill>
+            </a:endParaRPr>
           </a:p>
           <a:p>
             <a:pPr algn="ctr"/>
@@ -4076,36 +4081,6 @@
           </a:p>
         </p:txBody>
       </p:sp>
-      <p:pic>
-        <p:nvPicPr>
-          <p:cNvPr id="21" name="Picture 20">
-            <a:extLst>
-              <a:ext uri="{FF2B5EF4-FFF2-40B4-BE49-F238E27FC236}">
-                <a16:creationId xmlns:a16="http://schemas.microsoft.com/office/drawing/2014/main" id="{03D3BEA9-8538-47F7-8B1C-7F448AE63391}"/>
-              </a:ext>
-            </a:extLst>
-          </p:cNvPr>
-          <p:cNvPicPr>
-            <a:picLocks noChangeAspect="1"/>
-          </p:cNvPicPr>
-          <p:nvPr/>
-        </p:nvPicPr>
-        <p:blipFill>
-          <a:blip r:embed="rId2"/>
-          <a:stretch>
-            <a:fillRect/>
-          </a:stretch>
-        </p:blipFill>
-        <p:spPr>
-          <a:xfrm>
-            <a:off x="4004238" y="3779604"/>
-            <a:ext cx="6050280" cy="2941320"/>
-          </a:xfrm>
-          <a:prstGeom prst="rect">
-            <a:avLst/>
-          </a:prstGeom>
-        </p:spPr>
-      </p:pic>
     </p:spTree>
     <p:extLst>
       <p:ext uri="{BB962C8B-B14F-4D97-AF65-F5344CB8AC3E}">
@@ -5133,7 +5108,7 @@
             <a:pPr algn="ctr"/>
             <a:r>
               <a:rPr lang="en-US" dirty="0"/>
-              <a:t>DEQM IG</a:t>
+              <a:t>DEQM (Reporting) IG</a:t>
             </a:r>
           </a:p>
         </p:txBody>
@@ -5873,8 +5848,13 @@
             <a:pPr algn="ctr"/>
             <a:r>
               <a:rPr lang="en-US" dirty="0"/>
-              <a:t>DEQM</a:t>
-            </a:r>
+              <a:t>DEQM/HEDIS/</a:t>
+            </a:r>
+            <a:r>
+              <a:rPr lang="en-US" dirty="0" err="1"/>
+              <a:t>etc</a:t>
+            </a:r>
+            <a:endParaRPr lang="en-US" dirty="0"/>
           </a:p>
         </p:txBody>
       </p:sp>

</xml_diff>

<commit_message>
Updates to quality reporting scenarios diagram.
</commit_message>
<xml_diff>
--- a/diagrams/FHIR Measure IG Diagram.pptx
+++ b/diagrams/FHIR Measure IG Diagram.pptx
@@ -9,6 +9,7 @@
     <p:sldId id="257" r:id="rId3"/>
     <p:sldId id="258" r:id="rId4"/>
     <p:sldId id="259" r:id="rId5"/>
+    <p:sldId id="260" r:id="rId6"/>
   </p:sldIdLst>
   <p:sldSz cx="12192000" cy="6858000"/>
   <p:notesSz cx="6858000" cy="9144000"/>
@@ -262,7 +263,7 @@
           <a:p>
             <a:fld id="{A1C33FE8-8021-45D4-B0C5-0B5FC73F013B}" type="datetimeFigureOut">
               <a:rPr lang="en-US" smtClean="0"/>
-              <a:t>3/5/2019</a:t>
+              <a:t>3/6/2019</a:t>
             </a:fld>
             <a:endParaRPr lang="en-US"/>
           </a:p>
@@ -460,7 +461,7 @@
           <a:p>
             <a:fld id="{A1C33FE8-8021-45D4-B0C5-0B5FC73F013B}" type="datetimeFigureOut">
               <a:rPr lang="en-US" smtClean="0"/>
-              <a:t>3/5/2019</a:t>
+              <a:t>3/6/2019</a:t>
             </a:fld>
             <a:endParaRPr lang="en-US"/>
           </a:p>
@@ -668,7 +669,7 @@
           <a:p>
             <a:fld id="{A1C33FE8-8021-45D4-B0C5-0B5FC73F013B}" type="datetimeFigureOut">
               <a:rPr lang="en-US" smtClean="0"/>
-              <a:t>3/5/2019</a:t>
+              <a:t>3/6/2019</a:t>
             </a:fld>
             <a:endParaRPr lang="en-US"/>
           </a:p>
@@ -866,7 +867,7 @@
           <a:p>
             <a:fld id="{A1C33FE8-8021-45D4-B0C5-0B5FC73F013B}" type="datetimeFigureOut">
               <a:rPr lang="en-US" smtClean="0"/>
-              <a:t>3/5/2019</a:t>
+              <a:t>3/6/2019</a:t>
             </a:fld>
             <a:endParaRPr lang="en-US"/>
           </a:p>
@@ -1141,7 +1142,7 @@
           <a:p>
             <a:fld id="{A1C33FE8-8021-45D4-B0C5-0B5FC73F013B}" type="datetimeFigureOut">
               <a:rPr lang="en-US" smtClean="0"/>
-              <a:t>3/5/2019</a:t>
+              <a:t>3/6/2019</a:t>
             </a:fld>
             <a:endParaRPr lang="en-US"/>
           </a:p>
@@ -1406,7 +1407,7 @@
           <a:p>
             <a:fld id="{A1C33FE8-8021-45D4-B0C5-0B5FC73F013B}" type="datetimeFigureOut">
               <a:rPr lang="en-US" smtClean="0"/>
-              <a:t>3/5/2019</a:t>
+              <a:t>3/6/2019</a:t>
             </a:fld>
             <a:endParaRPr lang="en-US"/>
           </a:p>
@@ -1818,7 +1819,7 @@
           <a:p>
             <a:fld id="{A1C33FE8-8021-45D4-B0C5-0B5FC73F013B}" type="datetimeFigureOut">
               <a:rPr lang="en-US" smtClean="0"/>
-              <a:t>3/5/2019</a:t>
+              <a:t>3/6/2019</a:t>
             </a:fld>
             <a:endParaRPr lang="en-US"/>
           </a:p>
@@ -1959,7 +1960,7 @@
           <a:p>
             <a:fld id="{A1C33FE8-8021-45D4-B0C5-0B5FC73F013B}" type="datetimeFigureOut">
               <a:rPr lang="en-US" smtClean="0"/>
-              <a:t>3/5/2019</a:t>
+              <a:t>3/6/2019</a:t>
             </a:fld>
             <a:endParaRPr lang="en-US"/>
           </a:p>
@@ -2072,7 +2073,7 @@
           <a:p>
             <a:fld id="{A1C33FE8-8021-45D4-B0C5-0B5FC73F013B}" type="datetimeFigureOut">
               <a:rPr lang="en-US" smtClean="0"/>
-              <a:t>3/5/2019</a:t>
+              <a:t>3/6/2019</a:t>
             </a:fld>
             <a:endParaRPr lang="en-US"/>
           </a:p>
@@ -2383,7 +2384,7 @@
           <a:p>
             <a:fld id="{A1C33FE8-8021-45D4-B0C5-0B5FC73F013B}" type="datetimeFigureOut">
               <a:rPr lang="en-US" smtClean="0"/>
-              <a:t>3/5/2019</a:t>
+              <a:t>3/6/2019</a:t>
             </a:fld>
             <a:endParaRPr lang="en-US"/>
           </a:p>
@@ -2671,7 +2672,7 @@
           <a:p>
             <a:fld id="{A1C33FE8-8021-45D4-B0C5-0B5FC73F013B}" type="datetimeFigureOut">
               <a:rPr lang="en-US" smtClean="0"/>
-              <a:t>3/5/2019</a:t>
+              <a:t>3/6/2019</a:t>
             </a:fld>
             <a:endParaRPr lang="en-US"/>
           </a:p>
@@ -2912,7 +2913,7 @@
           <a:p>
             <a:fld id="{A1C33FE8-8021-45D4-B0C5-0B5FC73F013B}" type="datetimeFigureOut">
               <a:rPr lang="en-US" smtClean="0"/>
-              <a:t>3/5/2019</a:t>
+              <a:t>3/6/2019</a:t>
             </a:fld>
             <a:endParaRPr lang="en-US"/>
           </a:p>
@@ -7555,6 +7556,1220 @@
 </p:sld>
 </file>
 
+<file path=ppt/slides/slide5.xml><?xml version="1.0" encoding="utf-8"?>
+<p:sld xmlns:a="http://schemas.openxmlformats.org/drawingml/2006/main" xmlns:r="http://schemas.openxmlformats.org/officeDocument/2006/relationships" xmlns:p="http://schemas.openxmlformats.org/presentationml/2006/main">
+  <p:cSld>
+    <p:spTree>
+      <p:nvGrpSpPr>
+        <p:cNvPr id="1" name=""/>
+        <p:cNvGrpSpPr/>
+        <p:nvPr/>
+      </p:nvGrpSpPr>
+      <p:grpSpPr>
+        <a:xfrm>
+          <a:off x="0" y="0"/>
+          <a:ext cx="0" cy="0"/>
+          <a:chOff x="0" y="0"/>
+          <a:chExt cx="0" cy="0"/>
+        </a:xfrm>
+      </p:grpSpPr>
+      <p:sp>
+        <p:nvSpPr>
+          <p:cNvPr id="23" name="Rectangle: Rounded Corners 22">
+            <a:extLst>
+              <a:ext uri="{FF2B5EF4-FFF2-40B4-BE49-F238E27FC236}">
+                <a16:creationId xmlns:a16="http://schemas.microsoft.com/office/drawing/2014/main" id="{F8A5242D-B367-4DA5-A846-46385B7F4058}"/>
+              </a:ext>
+            </a:extLst>
+          </p:cNvPr>
+          <p:cNvSpPr/>
+          <p:nvPr/>
+        </p:nvSpPr>
+        <p:spPr>
+          <a:xfrm>
+            <a:off x="5677417" y="1368040"/>
+            <a:ext cx="3516244" cy="3774892"/>
+          </a:xfrm>
+          <a:prstGeom prst="roundRect">
+            <a:avLst>
+              <a:gd name="adj" fmla="val 7908"/>
+            </a:avLst>
+          </a:prstGeom>
+        </p:spPr>
+        <p:style>
+          <a:lnRef idx="1">
+            <a:schemeClr val="accent3"/>
+          </a:lnRef>
+          <a:fillRef idx="2">
+            <a:schemeClr val="accent3"/>
+          </a:fillRef>
+          <a:effectRef idx="1">
+            <a:schemeClr val="accent3"/>
+          </a:effectRef>
+          <a:fontRef idx="minor">
+            <a:schemeClr val="dk1"/>
+          </a:fontRef>
+        </p:style>
+        <p:txBody>
+          <a:bodyPr rtlCol="0" anchor="ctr"/>
+          <a:lstStyle/>
+          <a:p>
+            <a:pPr algn="ctr"/>
+            <a:endParaRPr lang="en-US" dirty="0"/>
+          </a:p>
+        </p:txBody>
+      </p:sp>
+      <p:sp>
+        <p:nvSpPr>
+          <p:cNvPr id="22" name="Rectangle: Rounded Corners 21">
+            <a:extLst>
+              <a:ext uri="{FF2B5EF4-FFF2-40B4-BE49-F238E27FC236}">
+                <a16:creationId xmlns:a16="http://schemas.microsoft.com/office/drawing/2014/main" id="{4B4359B2-FBCE-45C5-9985-DB046BCC1F55}"/>
+              </a:ext>
+            </a:extLst>
+          </p:cNvPr>
+          <p:cNvSpPr/>
+          <p:nvPr/>
+        </p:nvSpPr>
+        <p:spPr>
+          <a:xfrm>
+            <a:off x="1677418" y="1368040"/>
+            <a:ext cx="3638342" cy="3774892"/>
+          </a:xfrm>
+          <a:prstGeom prst="roundRect">
+            <a:avLst>
+              <a:gd name="adj" fmla="val 7908"/>
+            </a:avLst>
+          </a:prstGeom>
+        </p:spPr>
+        <p:style>
+          <a:lnRef idx="1">
+            <a:schemeClr val="accent3"/>
+          </a:lnRef>
+          <a:fillRef idx="2">
+            <a:schemeClr val="accent3"/>
+          </a:fillRef>
+          <a:effectRef idx="1">
+            <a:schemeClr val="accent3"/>
+          </a:effectRef>
+          <a:fontRef idx="minor">
+            <a:schemeClr val="dk1"/>
+          </a:fontRef>
+        </p:style>
+        <p:txBody>
+          <a:bodyPr rtlCol="0" anchor="ctr"/>
+          <a:lstStyle/>
+          <a:p>
+            <a:pPr algn="ctr"/>
+            <a:endParaRPr lang="en-US" dirty="0"/>
+          </a:p>
+        </p:txBody>
+      </p:sp>
+      <p:sp>
+        <p:nvSpPr>
+          <p:cNvPr id="7" name="Rectangle: Rounded Corners 6">
+            <a:extLst>
+              <a:ext uri="{FF2B5EF4-FFF2-40B4-BE49-F238E27FC236}">
+                <a16:creationId xmlns:a16="http://schemas.microsoft.com/office/drawing/2014/main" id="{A59D8396-DEA9-4AB0-8899-46A551BA2B7D}"/>
+              </a:ext>
+            </a:extLst>
+          </p:cNvPr>
+          <p:cNvSpPr/>
+          <p:nvPr/>
+        </p:nvSpPr>
+        <p:spPr>
+          <a:xfrm>
+            <a:off x="8341256" y="2610429"/>
+            <a:ext cx="1822429" cy="788277"/>
+          </a:xfrm>
+          <a:prstGeom prst="roundRect">
+            <a:avLst>
+              <a:gd name="adj" fmla="val 22815"/>
+            </a:avLst>
+          </a:prstGeom>
+        </p:spPr>
+        <p:style>
+          <a:lnRef idx="2">
+            <a:schemeClr val="dk1"/>
+          </a:lnRef>
+          <a:fillRef idx="1">
+            <a:schemeClr val="lt1"/>
+          </a:fillRef>
+          <a:effectRef idx="0">
+            <a:schemeClr val="dk1"/>
+          </a:effectRef>
+          <a:fontRef idx="minor">
+            <a:schemeClr val="dk1"/>
+          </a:fontRef>
+        </p:style>
+        <p:txBody>
+          <a:bodyPr rtlCol="0" anchor="ctr"/>
+          <a:lstStyle/>
+          <a:p>
+            <a:pPr algn="ctr"/>
+            <a:r>
+              <a:rPr lang="en-US" dirty="0"/>
+              <a:t>Receivers</a:t>
+            </a:r>
+          </a:p>
+        </p:txBody>
+      </p:sp>
+      <p:sp>
+        <p:nvSpPr>
+          <p:cNvPr id="10" name="Arrow: Circular 9">
+            <a:extLst>
+              <a:ext uri="{FF2B5EF4-FFF2-40B4-BE49-F238E27FC236}">
+                <a16:creationId xmlns:a16="http://schemas.microsoft.com/office/drawing/2014/main" id="{FA4DF3AE-0825-48AC-9219-F02047D72F65}"/>
+              </a:ext>
+            </a:extLst>
+          </p:cNvPr>
+          <p:cNvSpPr/>
+          <p:nvPr/>
+        </p:nvSpPr>
+        <p:spPr>
+          <a:xfrm>
+            <a:off x="2479210" y="1938971"/>
+            <a:ext cx="2604948" cy="1261007"/>
+          </a:xfrm>
+          <a:prstGeom prst="circularArrow">
+            <a:avLst>
+              <a:gd name="adj1" fmla="val 3309"/>
+              <a:gd name="adj2" fmla="val 761917"/>
+              <a:gd name="adj3" fmla="val 21018354"/>
+              <a:gd name="adj4" fmla="val 10666627"/>
+              <a:gd name="adj5" fmla="val 7062"/>
+            </a:avLst>
+          </a:prstGeom>
+        </p:spPr>
+        <p:style>
+          <a:lnRef idx="2">
+            <a:schemeClr val="accent1">
+              <a:shade val="50000"/>
+            </a:schemeClr>
+          </a:lnRef>
+          <a:fillRef idx="1">
+            <a:schemeClr val="accent1"/>
+          </a:fillRef>
+          <a:effectRef idx="0">
+            <a:schemeClr val="accent1"/>
+          </a:effectRef>
+          <a:fontRef idx="minor">
+            <a:schemeClr val="lt1"/>
+          </a:fontRef>
+        </p:style>
+        <p:txBody>
+          <a:bodyPr rtlCol="0" anchor="ctr"/>
+          <a:lstStyle/>
+          <a:p>
+            <a:pPr algn="ctr"/>
+            <a:endParaRPr lang="en-US" dirty="0">
+              <a:solidFill>
+                <a:schemeClr val="tx1"/>
+              </a:solidFill>
+            </a:endParaRPr>
+          </a:p>
+        </p:txBody>
+      </p:sp>
+      <p:sp>
+        <p:nvSpPr>
+          <p:cNvPr id="11" name="Arrow: Circular 10">
+            <a:extLst>
+              <a:ext uri="{FF2B5EF4-FFF2-40B4-BE49-F238E27FC236}">
+                <a16:creationId xmlns:a16="http://schemas.microsoft.com/office/drawing/2014/main" id="{5225920C-D0FE-4BBF-8781-6A11E40B3DEF}"/>
+              </a:ext>
+            </a:extLst>
+          </p:cNvPr>
+          <p:cNvSpPr/>
+          <p:nvPr/>
+        </p:nvSpPr>
+        <p:spPr>
+          <a:xfrm rot="10800000">
+            <a:off x="2455989" y="2785132"/>
+            <a:ext cx="2628169" cy="1356979"/>
+          </a:xfrm>
+          <a:prstGeom prst="circularArrow">
+            <a:avLst>
+              <a:gd name="adj1" fmla="val 3309"/>
+              <a:gd name="adj2" fmla="val 697099"/>
+              <a:gd name="adj3" fmla="val 21018354"/>
+              <a:gd name="adj4" fmla="val 10650853"/>
+              <a:gd name="adj5" fmla="val 7062"/>
+            </a:avLst>
+          </a:prstGeom>
+        </p:spPr>
+        <p:style>
+          <a:lnRef idx="2">
+            <a:schemeClr val="accent1">
+              <a:shade val="50000"/>
+            </a:schemeClr>
+          </a:lnRef>
+          <a:fillRef idx="1">
+            <a:schemeClr val="accent1"/>
+          </a:fillRef>
+          <a:effectRef idx="0">
+            <a:schemeClr val="accent1"/>
+          </a:effectRef>
+          <a:fontRef idx="minor">
+            <a:schemeClr val="lt1"/>
+          </a:fontRef>
+        </p:style>
+        <p:txBody>
+          <a:bodyPr rtlCol="0" anchor="ctr"/>
+          <a:lstStyle/>
+          <a:p>
+            <a:pPr algn="ctr"/>
+            <a:endParaRPr lang="en-US" dirty="0">
+              <a:solidFill>
+                <a:schemeClr val="tx1"/>
+              </a:solidFill>
+            </a:endParaRPr>
+          </a:p>
+        </p:txBody>
+      </p:sp>
+      <p:sp>
+        <p:nvSpPr>
+          <p:cNvPr id="21" name="Arrow: Right 20">
+            <a:extLst>
+              <a:ext uri="{FF2B5EF4-FFF2-40B4-BE49-F238E27FC236}">
+                <a16:creationId xmlns:a16="http://schemas.microsoft.com/office/drawing/2014/main" id="{E48BFB20-858B-407A-8813-88683EF0ED4F}"/>
+              </a:ext>
+            </a:extLst>
+          </p:cNvPr>
+          <p:cNvSpPr/>
+          <p:nvPr/>
+        </p:nvSpPr>
+        <p:spPr>
+          <a:xfrm>
+            <a:off x="6339588" y="2960868"/>
+            <a:ext cx="1955225" cy="117709"/>
+          </a:xfrm>
+          <a:prstGeom prst="rightArrow">
+            <a:avLst/>
+          </a:prstGeom>
+        </p:spPr>
+        <p:style>
+          <a:lnRef idx="2">
+            <a:schemeClr val="accent1">
+              <a:shade val="50000"/>
+            </a:schemeClr>
+          </a:lnRef>
+          <a:fillRef idx="1">
+            <a:schemeClr val="accent1"/>
+          </a:fillRef>
+          <a:effectRef idx="0">
+            <a:schemeClr val="accent1"/>
+          </a:effectRef>
+          <a:fontRef idx="minor">
+            <a:schemeClr val="lt1"/>
+          </a:fontRef>
+        </p:style>
+        <p:txBody>
+          <a:bodyPr rtlCol="0" anchor="ctr"/>
+          <a:lstStyle/>
+          <a:p>
+            <a:pPr algn="ctr"/>
+            <a:endParaRPr lang="en-US">
+              <a:solidFill>
+                <a:schemeClr val="tx1"/>
+              </a:solidFill>
+            </a:endParaRPr>
+          </a:p>
+        </p:txBody>
+      </p:sp>
+      <p:sp>
+        <p:nvSpPr>
+          <p:cNvPr id="24" name="TextBox 23">
+            <a:extLst>
+              <a:ext uri="{FF2B5EF4-FFF2-40B4-BE49-F238E27FC236}">
+                <a16:creationId xmlns:a16="http://schemas.microsoft.com/office/drawing/2014/main" id="{530ACF03-3E21-4783-A1BC-2E6A3F24CB67}"/>
+              </a:ext>
+            </a:extLst>
+          </p:cNvPr>
+          <p:cNvSpPr txBox="1"/>
+          <p:nvPr/>
+        </p:nvSpPr>
+        <p:spPr>
+          <a:xfrm>
+            <a:off x="2329474" y="5253698"/>
+            <a:ext cx="2084302" cy="369332"/>
+          </a:xfrm>
+          <a:prstGeom prst="rect">
+            <a:avLst/>
+          </a:prstGeom>
+          <a:noFill/>
+        </p:spPr>
+        <p:txBody>
+          <a:bodyPr wrap="square" rtlCol="0">
+            <a:spAutoFit/>
+          </a:bodyPr>
+          <a:lstStyle/>
+          <a:p>
+            <a:r>
+              <a:rPr lang="en-US" dirty="0"/>
+              <a:t>Exchange Scenarios:</a:t>
+            </a:r>
+          </a:p>
+        </p:txBody>
+      </p:sp>
+      <p:sp>
+        <p:nvSpPr>
+          <p:cNvPr id="25" name="TextBox 24">
+            <a:extLst>
+              <a:ext uri="{FF2B5EF4-FFF2-40B4-BE49-F238E27FC236}">
+                <a16:creationId xmlns:a16="http://schemas.microsoft.com/office/drawing/2014/main" id="{7919C991-B75E-4E1C-82AB-C8912DED7F00}"/>
+              </a:ext>
+            </a:extLst>
+          </p:cNvPr>
+          <p:cNvSpPr txBox="1"/>
+          <p:nvPr/>
+        </p:nvSpPr>
+        <p:spPr>
+          <a:xfrm>
+            <a:off x="6339588" y="5259860"/>
+            <a:ext cx="2129299" cy="646331"/>
+          </a:xfrm>
+          <a:prstGeom prst="rect">
+            <a:avLst/>
+          </a:prstGeom>
+          <a:noFill/>
+        </p:spPr>
+        <p:txBody>
+          <a:bodyPr wrap="square" rtlCol="0">
+            <a:spAutoFit/>
+          </a:bodyPr>
+          <a:lstStyle/>
+          <a:p>
+            <a:r>
+              <a:rPr lang="en-US" dirty="0"/>
+              <a:t>Reporting Scenarios:</a:t>
+            </a:r>
+          </a:p>
+          <a:p>
+            <a:endParaRPr lang="en-US" dirty="0"/>
+          </a:p>
+        </p:txBody>
+      </p:sp>
+      <p:grpSp>
+        <p:nvGrpSpPr>
+          <p:cNvPr id="17" name="Group 16">
+            <a:extLst>
+              <a:ext uri="{FF2B5EF4-FFF2-40B4-BE49-F238E27FC236}">
+                <a16:creationId xmlns:a16="http://schemas.microsoft.com/office/drawing/2014/main" id="{2F3557E3-0CAD-984F-A138-ED1F380E79BA}"/>
+              </a:ext>
+            </a:extLst>
+          </p:cNvPr>
+          <p:cNvGrpSpPr/>
+          <p:nvPr/>
+        </p:nvGrpSpPr>
+        <p:grpSpPr>
+          <a:xfrm>
+            <a:off x="1373867" y="883408"/>
+            <a:ext cx="4965722" cy="969264"/>
+            <a:chOff x="1458252" y="478790"/>
+            <a:chExt cx="4880073" cy="969264"/>
+          </a:xfrm>
+        </p:grpSpPr>
+        <p:sp>
+          <p:nvSpPr>
+            <p:cNvPr id="13" name="Arrow: Pentagon 12">
+              <a:extLst>
+                <a:ext uri="{FF2B5EF4-FFF2-40B4-BE49-F238E27FC236}">
+                  <a16:creationId xmlns:a16="http://schemas.microsoft.com/office/drawing/2014/main" id="{729B8AD1-13E9-444A-B7CD-6C4120D04F71}"/>
+                </a:ext>
+              </a:extLst>
+            </p:cNvPr>
+            <p:cNvSpPr/>
+            <p:nvPr/>
+          </p:nvSpPr>
+          <p:spPr>
+            <a:xfrm>
+              <a:off x="1458252" y="721106"/>
+              <a:ext cx="978408" cy="484632"/>
+            </a:xfrm>
+            <a:prstGeom prst="homePlate">
+              <a:avLst/>
+            </a:prstGeom>
+          </p:spPr>
+          <p:style>
+            <a:lnRef idx="2">
+              <a:schemeClr val="accent1">
+                <a:shade val="50000"/>
+              </a:schemeClr>
+            </a:lnRef>
+            <a:fillRef idx="1">
+              <a:schemeClr val="accent1"/>
+            </a:fillRef>
+            <a:effectRef idx="0">
+              <a:schemeClr val="accent1"/>
+            </a:effectRef>
+            <a:fontRef idx="minor">
+              <a:schemeClr val="lt1"/>
+            </a:fontRef>
+          </p:style>
+          <p:txBody>
+            <a:bodyPr rtlCol="0" anchor="ctr"/>
+            <a:lstStyle/>
+            <a:p>
+              <a:pPr algn="ctr"/>
+              <a:endParaRPr lang="en-US"/>
+            </a:p>
+          </p:txBody>
+        </p:sp>
+        <p:sp>
+          <p:nvSpPr>
+            <p:cNvPr id="14" name="Arrow: Chevron 13">
+              <a:extLst>
+                <a:ext uri="{FF2B5EF4-FFF2-40B4-BE49-F238E27FC236}">
+                  <a16:creationId xmlns:a16="http://schemas.microsoft.com/office/drawing/2014/main" id="{81DD1B9B-200A-438F-A0E4-6C248ED5CD59}"/>
+                </a:ext>
+              </a:extLst>
+            </p:cNvPr>
+            <p:cNvSpPr/>
+            <p:nvPr/>
+          </p:nvSpPr>
+          <p:spPr>
+            <a:xfrm>
+              <a:off x="2436660" y="721106"/>
+              <a:ext cx="978408" cy="484632"/>
+            </a:xfrm>
+            <a:prstGeom prst="chevron">
+              <a:avLst/>
+            </a:prstGeom>
+          </p:spPr>
+          <p:style>
+            <a:lnRef idx="2">
+              <a:schemeClr val="accent1">
+                <a:shade val="50000"/>
+              </a:schemeClr>
+            </a:lnRef>
+            <a:fillRef idx="1">
+              <a:schemeClr val="accent1"/>
+            </a:fillRef>
+            <a:effectRef idx="0">
+              <a:schemeClr val="accent1"/>
+            </a:effectRef>
+            <a:fontRef idx="minor">
+              <a:schemeClr val="lt1"/>
+            </a:fontRef>
+          </p:style>
+          <p:txBody>
+            <a:bodyPr rtlCol="0" anchor="ctr"/>
+            <a:lstStyle/>
+            <a:p>
+              <a:pPr algn="ctr"/>
+              <a:endParaRPr lang="en-US">
+                <a:solidFill>
+                  <a:schemeClr val="tx1"/>
+                </a:solidFill>
+              </a:endParaRPr>
+            </a:p>
+          </p:txBody>
+        </p:sp>
+        <p:sp>
+          <p:nvSpPr>
+            <p:cNvPr id="15" name="Arrow: Chevron 14">
+              <a:extLst>
+                <a:ext uri="{FF2B5EF4-FFF2-40B4-BE49-F238E27FC236}">
+                  <a16:creationId xmlns:a16="http://schemas.microsoft.com/office/drawing/2014/main" id="{08BA4365-A150-4FD6-9FEF-8FA2C956CAF6}"/>
+                </a:ext>
+              </a:extLst>
+            </p:cNvPr>
+            <p:cNvSpPr/>
+            <p:nvPr/>
+          </p:nvSpPr>
+          <p:spPr>
+            <a:xfrm>
+              <a:off x="3415068" y="721106"/>
+              <a:ext cx="978408" cy="484632"/>
+            </a:xfrm>
+            <a:prstGeom prst="chevron">
+              <a:avLst/>
+            </a:prstGeom>
+          </p:spPr>
+          <p:style>
+            <a:lnRef idx="2">
+              <a:schemeClr val="accent1">
+                <a:shade val="50000"/>
+              </a:schemeClr>
+            </a:lnRef>
+            <a:fillRef idx="1">
+              <a:schemeClr val="accent1"/>
+            </a:fillRef>
+            <a:effectRef idx="0">
+              <a:schemeClr val="accent1"/>
+            </a:effectRef>
+            <a:fontRef idx="minor">
+              <a:schemeClr val="lt1"/>
+            </a:fontRef>
+          </p:style>
+          <p:txBody>
+            <a:bodyPr rtlCol="0" anchor="ctr"/>
+            <a:lstStyle/>
+            <a:p>
+              <a:pPr algn="ctr"/>
+              <a:endParaRPr lang="en-US">
+                <a:solidFill>
+                  <a:schemeClr val="tx1"/>
+                </a:solidFill>
+              </a:endParaRPr>
+            </a:p>
+          </p:txBody>
+        </p:sp>
+        <p:sp>
+          <p:nvSpPr>
+            <p:cNvPr id="16" name="Arrow: Chevron 15">
+              <a:extLst>
+                <a:ext uri="{FF2B5EF4-FFF2-40B4-BE49-F238E27FC236}">
+                  <a16:creationId xmlns:a16="http://schemas.microsoft.com/office/drawing/2014/main" id="{3B8A07A9-79C6-4050-8CE1-EF7EAEFD078B}"/>
+                </a:ext>
+              </a:extLst>
+            </p:cNvPr>
+            <p:cNvSpPr/>
+            <p:nvPr/>
+          </p:nvSpPr>
+          <p:spPr>
+            <a:xfrm>
+              <a:off x="4393476" y="721106"/>
+              <a:ext cx="978408" cy="484632"/>
+            </a:xfrm>
+            <a:prstGeom prst="chevron">
+              <a:avLst/>
+            </a:prstGeom>
+          </p:spPr>
+          <p:style>
+            <a:lnRef idx="2">
+              <a:schemeClr val="accent1">
+                <a:shade val="50000"/>
+              </a:schemeClr>
+            </a:lnRef>
+            <a:fillRef idx="1">
+              <a:schemeClr val="accent1"/>
+            </a:fillRef>
+            <a:effectRef idx="0">
+              <a:schemeClr val="accent1"/>
+            </a:effectRef>
+            <a:fontRef idx="minor">
+              <a:schemeClr val="lt1"/>
+            </a:fontRef>
+          </p:style>
+          <p:txBody>
+            <a:bodyPr rtlCol="0" anchor="ctr"/>
+            <a:lstStyle/>
+            <a:p>
+              <a:pPr algn="ctr"/>
+              <a:endParaRPr lang="en-US">
+                <a:solidFill>
+                  <a:schemeClr val="tx1"/>
+                </a:solidFill>
+              </a:endParaRPr>
+            </a:p>
+          </p:txBody>
+        </p:sp>
+        <p:sp>
+          <p:nvSpPr>
+            <p:cNvPr id="20" name="Arrow: Notched Right 19">
+              <a:extLst>
+                <a:ext uri="{FF2B5EF4-FFF2-40B4-BE49-F238E27FC236}">
+                  <a16:creationId xmlns:a16="http://schemas.microsoft.com/office/drawing/2014/main" id="{71AA151A-D77F-4A87-9B7C-4C202BBB397A}"/>
+                </a:ext>
+              </a:extLst>
+            </p:cNvPr>
+            <p:cNvSpPr/>
+            <p:nvPr/>
+          </p:nvSpPr>
+          <p:spPr>
+            <a:xfrm>
+              <a:off x="5349406" y="478790"/>
+              <a:ext cx="988919" cy="969264"/>
+            </a:xfrm>
+            <a:prstGeom prst="notchedRightArrow">
+              <a:avLst>
+                <a:gd name="adj1" fmla="val 50000"/>
+                <a:gd name="adj2" fmla="val 54880"/>
+              </a:avLst>
+            </a:prstGeom>
+          </p:spPr>
+          <p:style>
+            <a:lnRef idx="2">
+              <a:schemeClr val="accent1">
+                <a:shade val="50000"/>
+              </a:schemeClr>
+            </a:lnRef>
+            <a:fillRef idx="1">
+              <a:schemeClr val="accent1"/>
+            </a:fillRef>
+            <a:effectRef idx="0">
+              <a:schemeClr val="accent1"/>
+            </a:effectRef>
+            <a:fontRef idx="minor">
+              <a:schemeClr val="lt1"/>
+            </a:fontRef>
+          </p:style>
+          <p:txBody>
+            <a:bodyPr rtlCol="0" anchor="ctr"/>
+            <a:lstStyle/>
+            <a:p>
+              <a:pPr algn="ctr"/>
+              <a:endParaRPr lang="en-US"/>
+            </a:p>
+          </p:txBody>
+        </p:sp>
+      </p:grpSp>
+      <p:sp>
+        <p:nvSpPr>
+          <p:cNvPr id="26" name="TextBox 25">
+            <a:extLst>
+              <a:ext uri="{FF2B5EF4-FFF2-40B4-BE49-F238E27FC236}">
+                <a16:creationId xmlns:a16="http://schemas.microsoft.com/office/drawing/2014/main" id="{5974DC83-FDAC-4BE4-B479-F9CA0E1AD844}"/>
+              </a:ext>
+            </a:extLst>
+          </p:cNvPr>
+          <p:cNvSpPr txBox="1"/>
+          <p:nvPr/>
+        </p:nvSpPr>
+        <p:spPr>
+          <a:xfrm>
+            <a:off x="2444949" y="776751"/>
+            <a:ext cx="2209064" cy="369332"/>
+          </a:xfrm>
+          <a:prstGeom prst="rect">
+            <a:avLst/>
+          </a:prstGeom>
+          <a:noFill/>
+        </p:spPr>
+        <p:txBody>
+          <a:bodyPr wrap="square" rtlCol="0">
+            <a:spAutoFit/>
+          </a:bodyPr>
+          <a:lstStyle/>
+          <a:p>
+            <a:r>
+              <a:rPr lang="en-US" dirty="0"/>
+              <a:t>Measurement Period</a:t>
+            </a:r>
+          </a:p>
+        </p:txBody>
+      </p:sp>
+      <p:sp>
+        <p:nvSpPr>
+          <p:cNvPr id="27" name="TextBox 26">
+            <a:extLst>
+              <a:ext uri="{FF2B5EF4-FFF2-40B4-BE49-F238E27FC236}">
+                <a16:creationId xmlns:a16="http://schemas.microsoft.com/office/drawing/2014/main" id="{A9999BC3-731A-4D2B-9BCD-2F45DFA49C48}"/>
+              </a:ext>
+            </a:extLst>
+          </p:cNvPr>
+          <p:cNvSpPr txBox="1"/>
+          <p:nvPr/>
+        </p:nvSpPr>
+        <p:spPr>
+          <a:xfrm>
+            <a:off x="188663" y="201721"/>
+            <a:ext cx="2782300" cy="369332"/>
+          </a:xfrm>
+          <a:prstGeom prst="rect">
+            <a:avLst/>
+          </a:prstGeom>
+          <a:noFill/>
+        </p:spPr>
+        <p:txBody>
+          <a:bodyPr wrap="none" rtlCol="0">
+            <a:spAutoFit/>
+          </a:bodyPr>
+          <a:lstStyle/>
+          <a:p>
+            <a:r>
+              <a:rPr lang="en-US" dirty="0"/>
+              <a:t>Quality Reporting Scenarios</a:t>
+            </a:r>
+          </a:p>
+        </p:txBody>
+      </p:sp>
+      <p:grpSp>
+        <p:nvGrpSpPr>
+          <p:cNvPr id="19" name="Group 18">
+            <a:extLst>
+              <a:ext uri="{FF2B5EF4-FFF2-40B4-BE49-F238E27FC236}">
+                <a16:creationId xmlns:a16="http://schemas.microsoft.com/office/drawing/2014/main" id="{2B6DA874-73EC-BD4A-B710-73713864466C}"/>
+              </a:ext>
+            </a:extLst>
+          </p:cNvPr>
+          <p:cNvGrpSpPr/>
+          <p:nvPr/>
+        </p:nvGrpSpPr>
+        <p:grpSpPr>
+          <a:xfrm>
+            <a:off x="6497766" y="3500792"/>
+            <a:ext cx="1913447" cy="918761"/>
+            <a:chOff x="6796559" y="3235267"/>
+            <a:chExt cx="1913447" cy="918761"/>
+          </a:xfrm>
+        </p:grpSpPr>
+        <p:sp>
+          <p:nvSpPr>
+            <p:cNvPr id="59" name="Snip Single Corner Rectangle 58">
+              <a:extLst>
+                <a:ext uri="{FF2B5EF4-FFF2-40B4-BE49-F238E27FC236}">
+                  <a16:creationId xmlns:a16="http://schemas.microsoft.com/office/drawing/2014/main" id="{A57D1F6A-D447-164F-A432-DFE0DA3047FB}"/>
+                </a:ext>
+              </a:extLst>
+            </p:cNvPr>
+            <p:cNvSpPr/>
+            <p:nvPr/>
+          </p:nvSpPr>
+          <p:spPr>
+            <a:xfrm>
+              <a:off x="6843003" y="3235267"/>
+              <a:ext cx="1702641" cy="918761"/>
+            </a:xfrm>
+            <a:prstGeom prst="snip1Rect">
+              <a:avLst/>
+            </a:prstGeom>
+            <a:solidFill>
+              <a:schemeClr val="accent6">
+                <a:lumMod val="60000"/>
+                <a:lumOff val="40000"/>
+              </a:schemeClr>
+            </a:solidFill>
+            <a:ln>
+              <a:solidFill>
+                <a:schemeClr val="tx1"/>
+              </a:solidFill>
+            </a:ln>
+          </p:spPr>
+          <p:style>
+            <a:lnRef idx="2">
+              <a:schemeClr val="accent1">
+                <a:shade val="50000"/>
+              </a:schemeClr>
+            </a:lnRef>
+            <a:fillRef idx="1">
+              <a:schemeClr val="accent1"/>
+            </a:fillRef>
+            <a:effectRef idx="0">
+              <a:schemeClr val="accent1"/>
+            </a:effectRef>
+            <a:fontRef idx="minor">
+              <a:schemeClr val="lt1"/>
+            </a:fontRef>
+          </p:style>
+          <p:txBody>
+            <a:bodyPr rtlCol="0" anchor="ctr"/>
+            <a:lstStyle/>
+            <a:p>
+              <a:pPr algn="ctr"/>
+              <a:endParaRPr lang="en-US"/>
+            </a:p>
+          </p:txBody>
+        </p:sp>
+        <p:sp>
+          <p:nvSpPr>
+            <p:cNvPr id="38" name="TextBox 37">
+              <a:extLst>
+                <a:ext uri="{FF2B5EF4-FFF2-40B4-BE49-F238E27FC236}">
+                  <a16:creationId xmlns:a16="http://schemas.microsoft.com/office/drawing/2014/main" id="{ECAC1126-8A72-43E0-81B6-CDB1970A707E}"/>
+                </a:ext>
+              </a:extLst>
+            </p:cNvPr>
+            <p:cNvSpPr txBox="1"/>
+            <p:nvPr/>
+          </p:nvSpPr>
+          <p:spPr>
+            <a:xfrm>
+              <a:off x="6811245" y="3241146"/>
+              <a:ext cx="1592019" cy="338554"/>
+            </a:xfrm>
+            <a:prstGeom prst="rect">
+              <a:avLst/>
+            </a:prstGeom>
+            <a:noFill/>
+          </p:spPr>
+          <p:txBody>
+            <a:bodyPr wrap="square" rtlCol="0">
+              <a:spAutoFit/>
+            </a:bodyPr>
+            <a:lstStyle/>
+            <a:p>
+              <a:r>
+                <a:rPr lang="en-US" sz="1600" dirty="0">
+                  <a:latin typeface="Courier" pitchFamily="2" charset="0"/>
+                </a:rPr>
+                <a:t>individual</a:t>
+              </a:r>
+            </a:p>
+          </p:txBody>
+        </p:sp>
+        <p:sp>
+          <p:nvSpPr>
+            <p:cNvPr id="39" name="TextBox 38">
+              <a:extLst>
+                <a:ext uri="{FF2B5EF4-FFF2-40B4-BE49-F238E27FC236}">
+                  <a16:creationId xmlns:a16="http://schemas.microsoft.com/office/drawing/2014/main" id="{19F38669-ACCD-4463-89D1-B738E5C4071D}"/>
+                </a:ext>
+              </a:extLst>
+            </p:cNvPr>
+            <p:cNvSpPr txBox="1"/>
+            <p:nvPr/>
+          </p:nvSpPr>
+          <p:spPr>
+            <a:xfrm>
+              <a:off x="6811245" y="3528554"/>
+              <a:ext cx="1280073" cy="338554"/>
+            </a:xfrm>
+            <a:prstGeom prst="rect">
+              <a:avLst/>
+            </a:prstGeom>
+            <a:noFill/>
+          </p:spPr>
+          <p:txBody>
+            <a:bodyPr wrap="square" rtlCol="0">
+              <a:spAutoFit/>
+            </a:bodyPr>
+            <a:lstStyle/>
+            <a:p>
+              <a:r>
+                <a:rPr lang="en-US" sz="1600" dirty="0">
+                  <a:latin typeface="Courier" pitchFamily="2" charset="0"/>
+                </a:rPr>
+                <a:t>summary</a:t>
+              </a:r>
+            </a:p>
+          </p:txBody>
+        </p:sp>
+        <p:sp>
+          <p:nvSpPr>
+            <p:cNvPr id="40" name="TextBox 39">
+              <a:extLst>
+                <a:ext uri="{FF2B5EF4-FFF2-40B4-BE49-F238E27FC236}">
+                  <a16:creationId xmlns:a16="http://schemas.microsoft.com/office/drawing/2014/main" id="{5176EA77-8354-472A-B825-A49D042C6325}"/>
+                </a:ext>
+              </a:extLst>
+            </p:cNvPr>
+            <p:cNvSpPr txBox="1"/>
+            <p:nvPr/>
+          </p:nvSpPr>
+          <p:spPr>
+            <a:xfrm>
+              <a:off x="6796559" y="3815474"/>
+              <a:ext cx="1913447" cy="338554"/>
+            </a:xfrm>
+            <a:prstGeom prst="rect">
+              <a:avLst/>
+            </a:prstGeom>
+            <a:noFill/>
+          </p:spPr>
+          <p:txBody>
+            <a:bodyPr wrap="square" rtlCol="0">
+              <a:spAutoFit/>
+            </a:bodyPr>
+            <a:lstStyle/>
+            <a:p>
+              <a:r>
+                <a:rPr lang="en-US" sz="1600" dirty="0">
+                  <a:latin typeface="Courier" pitchFamily="2" charset="0"/>
+                </a:rPr>
+                <a:t>patient-list</a:t>
+              </a:r>
+            </a:p>
+          </p:txBody>
+        </p:sp>
+      </p:grpSp>
+      <p:sp>
+        <p:nvSpPr>
+          <p:cNvPr id="50" name="TextBox 49">
+            <a:extLst>
+              <a:ext uri="{FF2B5EF4-FFF2-40B4-BE49-F238E27FC236}">
+                <a16:creationId xmlns:a16="http://schemas.microsoft.com/office/drawing/2014/main" id="{C7C10D4D-E94F-E142-91D7-2B14A108A1E4}"/>
+              </a:ext>
+            </a:extLst>
+          </p:cNvPr>
+          <p:cNvSpPr txBox="1"/>
+          <p:nvPr/>
+        </p:nvSpPr>
+        <p:spPr>
+          <a:xfrm>
+            <a:off x="1517598" y="5602473"/>
+            <a:ext cx="3837065" cy="369332"/>
+          </a:xfrm>
+          <a:prstGeom prst="rect">
+            <a:avLst/>
+          </a:prstGeom>
+          <a:noFill/>
+        </p:spPr>
+        <p:txBody>
+          <a:bodyPr wrap="square" rtlCol="0">
+            <a:spAutoFit/>
+          </a:bodyPr>
+          <a:lstStyle/>
+          <a:p>
+            <a:r>
+              <a:rPr lang="en-US" dirty="0"/>
+              <a:t>Submit Data, Collect Data, Subscription</a:t>
+            </a:r>
+          </a:p>
+        </p:txBody>
+      </p:sp>
+      <p:grpSp>
+        <p:nvGrpSpPr>
+          <p:cNvPr id="18" name="Group 17">
+            <a:extLst>
+              <a:ext uri="{FF2B5EF4-FFF2-40B4-BE49-F238E27FC236}">
+                <a16:creationId xmlns:a16="http://schemas.microsoft.com/office/drawing/2014/main" id="{AEEC9073-E7FB-DE4B-9FC4-E36D1CFA9550}"/>
+              </a:ext>
+            </a:extLst>
+          </p:cNvPr>
+          <p:cNvGrpSpPr/>
+          <p:nvPr/>
+        </p:nvGrpSpPr>
+        <p:grpSpPr>
+          <a:xfrm>
+            <a:off x="2707669" y="4207298"/>
+            <a:ext cx="2124808" cy="664084"/>
+            <a:chOff x="2862110" y="2885008"/>
+            <a:chExt cx="2247060" cy="583024"/>
+          </a:xfrm>
+        </p:grpSpPr>
+        <p:sp>
+          <p:nvSpPr>
+            <p:cNvPr id="9" name="Snip Single Corner Rectangle 8">
+              <a:extLst>
+                <a:ext uri="{FF2B5EF4-FFF2-40B4-BE49-F238E27FC236}">
+                  <a16:creationId xmlns:a16="http://schemas.microsoft.com/office/drawing/2014/main" id="{0854D18C-8904-5248-9E54-B9A7993466BA}"/>
+                </a:ext>
+              </a:extLst>
+            </p:cNvPr>
+            <p:cNvSpPr/>
+            <p:nvPr/>
+          </p:nvSpPr>
+          <p:spPr>
+            <a:xfrm>
+              <a:off x="2862110" y="2885008"/>
+              <a:ext cx="2247060" cy="583024"/>
+            </a:xfrm>
+            <a:prstGeom prst="snip1Rect">
+              <a:avLst/>
+            </a:prstGeom>
+            <a:solidFill>
+              <a:schemeClr val="accent6">
+                <a:lumMod val="60000"/>
+                <a:lumOff val="40000"/>
+              </a:schemeClr>
+            </a:solidFill>
+            <a:ln>
+              <a:solidFill>
+                <a:schemeClr val="tx1"/>
+              </a:solidFill>
+            </a:ln>
+          </p:spPr>
+          <p:style>
+            <a:lnRef idx="2">
+              <a:schemeClr val="accent1">
+                <a:shade val="50000"/>
+              </a:schemeClr>
+            </a:lnRef>
+            <a:fillRef idx="1">
+              <a:schemeClr val="accent1"/>
+            </a:fillRef>
+            <a:effectRef idx="0">
+              <a:schemeClr val="accent1"/>
+            </a:effectRef>
+            <a:fontRef idx="minor">
+              <a:schemeClr val="lt1"/>
+            </a:fontRef>
+          </p:style>
+          <p:txBody>
+            <a:bodyPr rtlCol="0" anchor="ctr"/>
+            <a:lstStyle/>
+            <a:p>
+              <a:pPr algn="ctr"/>
+              <a:endParaRPr lang="en-US"/>
+            </a:p>
+          </p:txBody>
+        </p:sp>
+        <p:sp>
+          <p:nvSpPr>
+            <p:cNvPr id="2" name="TextBox 1">
+              <a:extLst>
+                <a:ext uri="{FF2B5EF4-FFF2-40B4-BE49-F238E27FC236}">
+                  <a16:creationId xmlns:a16="http://schemas.microsoft.com/office/drawing/2014/main" id="{7112CC0E-364C-4B40-941C-ECFBE718FD91}"/>
+                </a:ext>
+              </a:extLst>
+            </p:cNvPr>
+            <p:cNvSpPr txBox="1"/>
+            <p:nvPr/>
+          </p:nvSpPr>
+          <p:spPr>
+            <a:xfrm>
+              <a:off x="2921276" y="3024531"/>
+              <a:ext cx="2153285" cy="297229"/>
+            </a:xfrm>
+            <a:prstGeom prst="rect">
+              <a:avLst/>
+            </a:prstGeom>
+            <a:noFill/>
+          </p:spPr>
+          <p:txBody>
+            <a:bodyPr wrap="none" rtlCol="0">
+              <a:spAutoFit/>
+            </a:bodyPr>
+            <a:lstStyle/>
+            <a:p>
+              <a:r>
+                <a:rPr lang="en-US" sz="1600" dirty="0">
+                  <a:latin typeface="Courier" pitchFamily="2" charset="0"/>
+                </a:rPr>
+                <a:t>data-collection</a:t>
+              </a:r>
+            </a:p>
+          </p:txBody>
+        </p:sp>
+      </p:grpSp>
+      <p:sp>
+        <p:nvSpPr>
+          <p:cNvPr id="3" name="TextBox 2">
+            <a:extLst>
+              <a:ext uri="{FF2B5EF4-FFF2-40B4-BE49-F238E27FC236}">
+                <a16:creationId xmlns:a16="http://schemas.microsoft.com/office/drawing/2014/main" id="{00579A05-9DD2-BC46-8BE8-67B089111F3E}"/>
+              </a:ext>
+            </a:extLst>
+          </p:cNvPr>
+          <p:cNvSpPr txBox="1"/>
+          <p:nvPr/>
+        </p:nvSpPr>
+        <p:spPr>
+          <a:xfrm>
+            <a:off x="7017426" y="5599276"/>
+            <a:ext cx="698862" cy="369332"/>
+          </a:xfrm>
+          <a:prstGeom prst="rect">
+            <a:avLst/>
+          </a:prstGeom>
+          <a:noFill/>
+        </p:spPr>
+        <p:txBody>
+          <a:bodyPr wrap="square" rtlCol="0">
+            <a:spAutoFit/>
+          </a:bodyPr>
+          <a:lstStyle/>
+          <a:p>
+            <a:r>
+              <a:rPr lang="en-US" dirty="0"/>
+              <a:t>POST</a:t>
+            </a:r>
+          </a:p>
+        </p:txBody>
+      </p:sp>
+      <p:sp>
+        <p:nvSpPr>
+          <p:cNvPr id="6" name="Rectangle: Rounded Corners 5">
+            <a:extLst>
+              <a:ext uri="{FF2B5EF4-FFF2-40B4-BE49-F238E27FC236}">
+                <a16:creationId xmlns:a16="http://schemas.microsoft.com/office/drawing/2014/main" id="{62CA6A54-71B1-49F3-9E4E-30782D630A40}"/>
+              </a:ext>
+            </a:extLst>
+          </p:cNvPr>
+          <p:cNvSpPr/>
+          <p:nvPr/>
+        </p:nvSpPr>
+        <p:spPr>
+          <a:xfrm>
+            <a:off x="4470314" y="2613368"/>
+            <a:ext cx="1869274" cy="788277"/>
+          </a:xfrm>
+          <a:prstGeom prst="roundRect">
+            <a:avLst>
+              <a:gd name="adj" fmla="val 22815"/>
+            </a:avLst>
+          </a:prstGeom>
+        </p:spPr>
+        <p:style>
+          <a:lnRef idx="2">
+            <a:schemeClr val="dk1"/>
+          </a:lnRef>
+          <a:fillRef idx="1">
+            <a:schemeClr val="lt1"/>
+          </a:fillRef>
+          <a:effectRef idx="0">
+            <a:schemeClr val="dk1"/>
+          </a:effectRef>
+          <a:fontRef idx="minor">
+            <a:schemeClr val="dk1"/>
+          </a:fontRef>
+        </p:style>
+        <p:txBody>
+          <a:bodyPr rtlCol="0" anchor="ctr"/>
+          <a:lstStyle/>
+          <a:p>
+            <a:pPr algn="ctr"/>
+            <a:r>
+              <a:rPr lang="en-US" dirty="0"/>
+              <a:t>Aggregators</a:t>
+            </a:r>
+          </a:p>
+        </p:txBody>
+      </p:sp>
+      <p:sp>
+        <p:nvSpPr>
+          <p:cNvPr id="4" name="Rectangle: Rounded Corners 3">
+            <a:extLst>
+              <a:ext uri="{FF2B5EF4-FFF2-40B4-BE49-F238E27FC236}">
+                <a16:creationId xmlns:a16="http://schemas.microsoft.com/office/drawing/2014/main" id="{7E8C27C6-A8F7-4EB1-AC17-256FCEF52D75}"/>
+              </a:ext>
+            </a:extLst>
+          </p:cNvPr>
+          <p:cNvSpPr/>
+          <p:nvPr/>
+        </p:nvSpPr>
+        <p:spPr>
+          <a:xfrm>
+            <a:off x="1326792" y="2660940"/>
+            <a:ext cx="1869274" cy="788277"/>
+          </a:xfrm>
+          <a:prstGeom prst="roundRect">
+            <a:avLst>
+              <a:gd name="adj" fmla="val 22815"/>
+            </a:avLst>
+          </a:prstGeom>
+        </p:spPr>
+        <p:style>
+          <a:lnRef idx="2">
+            <a:schemeClr val="dk1"/>
+          </a:lnRef>
+          <a:fillRef idx="1">
+            <a:schemeClr val="lt1"/>
+          </a:fillRef>
+          <a:effectRef idx="0">
+            <a:schemeClr val="dk1"/>
+          </a:effectRef>
+          <a:fontRef idx="minor">
+            <a:schemeClr val="dk1"/>
+          </a:fontRef>
+        </p:style>
+        <p:txBody>
+          <a:bodyPr rtlCol="0" anchor="ctr"/>
+          <a:lstStyle/>
+          <a:p>
+            <a:pPr algn="ctr"/>
+            <a:r>
+              <a:rPr lang="en-US" dirty="0"/>
+              <a:t>Providers</a:t>
+            </a:r>
+          </a:p>
+        </p:txBody>
+      </p:sp>
+    </p:spTree>
+    <p:extLst>
+      <p:ext uri="{BB962C8B-B14F-4D97-AF65-F5344CB8AC3E}">
+        <p14:creationId xmlns:p14="http://schemas.microsoft.com/office/powerpoint/2010/main" val="3927831198"/>
+      </p:ext>
+    </p:extLst>
+  </p:cSld>
+  <p:clrMapOvr>
+    <a:masterClrMapping/>
+  </p:clrMapOvr>
+</p:sld>
+</file>
+
 <file path=ppt/theme/theme1.xml><?xml version="1.0" encoding="utf-8"?>
 <a:theme xmlns:a="http://schemas.openxmlformats.org/drawingml/2006/main" name="Office Theme">
   <a:themeElements>

</xml_diff>

<commit_message>
Updates to home page.
</commit_message>
<xml_diff>
--- a/diagrams/FHIR Measure IG Diagram.pptx
+++ b/diagrams/FHIR Measure IG Diagram.pptx
@@ -8,8 +8,6 @@
     <p:sldId id="256" r:id="rId2"/>
     <p:sldId id="257" r:id="rId3"/>
     <p:sldId id="258" r:id="rId4"/>
-    <p:sldId id="259" r:id="rId5"/>
-    <p:sldId id="260" r:id="rId6"/>
   </p:sldIdLst>
   <p:sldSz cx="12192000" cy="6858000"/>
   <p:notesSz cx="6858000" cy="9144000"/>
@@ -6271,2543 +6269,6 @@
 </p:sld>
 </file>
 
-<file path=ppt/slides/slide4.xml><?xml version="1.0" encoding="utf-8"?>
-<p:sld xmlns:a="http://schemas.openxmlformats.org/drawingml/2006/main" xmlns:r="http://schemas.openxmlformats.org/officeDocument/2006/relationships" xmlns:p="http://schemas.openxmlformats.org/presentationml/2006/main">
-  <p:cSld>
-    <p:spTree>
-      <p:nvGrpSpPr>
-        <p:cNvPr id="1" name=""/>
-        <p:cNvGrpSpPr/>
-        <p:nvPr/>
-      </p:nvGrpSpPr>
-      <p:grpSpPr>
-        <a:xfrm>
-          <a:off x="0" y="0"/>
-          <a:ext cx="0" cy="0"/>
-          <a:chOff x="0" y="0"/>
-          <a:chExt cx="0" cy="0"/>
-        </a:xfrm>
-      </p:grpSpPr>
-      <p:sp>
-        <p:nvSpPr>
-          <p:cNvPr id="23" name="Rectangle: Rounded Corners 22">
-            <a:extLst>
-              <a:ext uri="{FF2B5EF4-FFF2-40B4-BE49-F238E27FC236}">
-                <a16:creationId xmlns:a16="http://schemas.microsoft.com/office/drawing/2014/main" id="{F8A5242D-B367-4DA5-A846-46385B7F4058}"/>
-              </a:ext>
-            </a:extLst>
-          </p:cNvPr>
-          <p:cNvSpPr/>
-          <p:nvPr/>
-        </p:nvSpPr>
-        <p:spPr>
-          <a:xfrm>
-            <a:off x="6294329" y="1355062"/>
-            <a:ext cx="2624959" cy="2555549"/>
-          </a:xfrm>
-          <a:prstGeom prst="roundRect">
-            <a:avLst>
-              <a:gd name="adj" fmla="val 7908"/>
-            </a:avLst>
-          </a:prstGeom>
-        </p:spPr>
-        <p:style>
-          <a:lnRef idx="1">
-            <a:schemeClr val="accent3"/>
-          </a:lnRef>
-          <a:fillRef idx="2">
-            <a:schemeClr val="accent3"/>
-          </a:fillRef>
-          <a:effectRef idx="1">
-            <a:schemeClr val="accent3"/>
-          </a:effectRef>
-          <a:fontRef idx="minor">
-            <a:schemeClr val="dk1"/>
-          </a:fontRef>
-        </p:style>
-        <p:txBody>
-          <a:bodyPr rtlCol="0" anchor="ctr"/>
-          <a:lstStyle/>
-          <a:p>
-            <a:pPr algn="ctr"/>
-            <a:endParaRPr lang="en-US"/>
-          </a:p>
-        </p:txBody>
-      </p:sp>
-      <p:sp>
-        <p:nvSpPr>
-          <p:cNvPr id="22" name="Rectangle: Rounded Corners 21">
-            <a:extLst>
-              <a:ext uri="{FF2B5EF4-FFF2-40B4-BE49-F238E27FC236}">
-                <a16:creationId xmlns:a16="http://schemas.microsoft.com/office/drawing/2014/main" id="{4B4359B2-FBCE-45C5-9985-DB046BCC1F55}"/>
-              </a:ext>
-            </a:extLst>
-          </p:cNvPr>
-          <p:cNvSpPr/>
-          <p:nvPr/>
-        </p:nvSpPr>
-        <p:spPr>
-          <a:xfrm>
-            <a:off x="3347439" y="1355063"/>
-            <a:ext cx="2624959" cy="2555549"/>
-          </a:xfrm>
-          <a:prstGeom prst="roundRect">
-            <a:avLst>
-              <a:gd name="adj" fmla="val 7908"/>
-            </a:avLst>
-          </a:prstGeom>
-        </p:spPr>
-        <p:style>
-          <a:lnRef idx="1">
-            <a:schemeClr val="accent3"/>
-          </a:lnRef>
-          <a:fillRef idx="2">
-            <a:schemeClr val="accent3"/>
-          </a:fillRef>
-          <a:effectRef idx="1">
-            <a:schemeClr val="accent3"/>
-          </a:effectRef>
-          <a:fontRef idx="minor">
-            <a:schemeClr val="dk1"/>
-          </a:fontRef>
-        </p:style>
-        <p:txBody>
-          <a:bodyPr rtlCol="0" anchor="ctr"/>
-          <a:lstStyle/>
-          <a:p>
-            <a:pPr algn="ctr"/>
-            <a:endParaRPr lang="en-US"/>
-          </a:p>
-        </p:txBody>
-      </p:sp>
-      <p:sp>
-        <p:nvSpPr>
-          <p:cNvPr id="4" name="Rectangle: Rounded Corners 3">
-            <a:extLst>
-              <a:ext uri="{FF2B5EF4-FFF2-40B4-BE49-F238E27FC236}">
-                <a16:creationId xmlns:a16="http://schemas.microsoft.com/office/drawing/2014/main" id="{7E8C27C6-A8F7-4EB1-AC17-256FCEF52D75}"/>
-              </a:ext>
-            </a:extLst>
-          </p:cNvPr>
-          <p:cNvSpPr/>
-          <p:nvPr/>
-        </p:nvSpPr>
-        <p:spPr>
-          <a:xfrm>
-            <a:off x="2554014" y="2238702"/>
-            <a:ext cx="1734208" cy="788277"/>
-          </a:xfrm>
-          <a:prstGeom prst="roundRect">
-            <a:avLst>
-              <a:gd name="adj" fmla="val 22815"/>
-            </a:avLst>
-          </a:prstGeom>
-        </p:spPr>
-        <p:style>
-          <a:lnRef idx="2">
-            <a:schemeClr val="dk1"/>
-          </a:lnRef>
-          <a:fillRef idx="1">
-            <a:schemeClr val="lt1"/>
-          </a:fillRef>
-          <a:effectRef idx="0">
-            <a:schemeClr val="dk1"/>
-          </a:effectRef>
-          <a:fontRef idx="minor">
-            <a:schemeClr val="dk1"/>
-          </a:fontRef>
-        </p:style>
-        <p:txBody>
-          <a:bodyPr rtlCol="0" anchor="ctr"/>
-          <a:lstStyle/>
-          <a:p>
-            <a:pPr algn="ctr"/>
-            <a:r>
-              <a:rPr lang="en-US" dirty="0"/>
-              <a:t>Providers</a:t>
-            </a:r>
-          </a:p>
-        </p:txBody>
-      </p:sp>
-      <p:sp>
-        <p:nvSpPr>
-          <p:cNvPr id="6" name="Rectangle: Rounded Corners 5">
-            <a:extLst>
-              <a:ext uri="{FF2B5EF4-FFF2-40B4-BE49-F238E27FC236}">
-                <a16:creationId xmlns:a16="http://schemas.microsoft.com/office/drawing/2014/main" id="{62CA6A54-71B1-49F3-9E4E-30782D630A40}"/>
-              </a:ext>
-            </a:extLst>
-          </p:cNvPr>
-          <p:cNvSpPr/>
-          <p:nvPr/>
-        </p:nvSpPr>
-        <p:spPr>
-          <a:xfrm>
-            <a:off x="5260427" y="2238701"/>
-            <a:ext cx="1734208" cy="788277"/>
-          </a:xfrm>
-          <a:prstGeom prst="roundRect">
-            <a:avLst>
-              <a:gd name="adj" fmla="val 22815"/>
-            </a:avLst>
-          </a:prstGeom>
-        </p:spPr>
-        <p:style>
-          <a:lnRef idx="2">
-            <a:schemeClr val="dk1"/>
-          </a:lnRef>
-          <a:fillRef idx="1">
-            <a:schemeClr val="lt1"/>
-          </a:fillRef>
-          <a:effectRef idx="0">
-            <a:schemeClr val="dk1"/>
-          </a:effectRef>
-          <a:fontRef idx="minor">
-            <a:schemeClr val="dk1"/>
-          </a:fontRef>
-        </p:style>
-        <p:txBody>
-          <a:bodyPr rtlCol="0" anchor="ctr"/>
-          <a:lstStyle/>
-          <a:p>
-            <a:pPr algn="ctr"/>
-            <a:r>
-              <a:rPr lang="en-US" dirty="0"/>
-              <a:t>Aggregators</a:t>
-            </a:r>
-          </a:p>
-        </p:txBody>
-      </p:sp>
-      <p:sp>
-        <p:nvSpPr>
-          <p:cNvPr id="7" name="Rectangle: Rounded Corners 6">
-            <a:extLst>
-              <a:ext uri="{FF2B5EF4-FFF2-40B4-BE49-F238E27FC236}">
-                <a16:creationId xmlns:a16="http://schemas.microsoft.com/office/drawing/2014/main" id="{A59D8396-DEA9-4AB0-8899-46A551BA2B7D}"/>
-              </a:ext>
-            </a:extLst>
-          </p:cNvPr>
-          <p:cNvSpPr/>
-          <p:nvPr/>
-        </p:nvSpPr>
-        <p:spPr>
-          <a:xfrm>
-            <a:off x="7966840" y="2238701"/>
-            <a:ext cx="1734208" cy="788277"/>
-          </a:xfrm>
-          <a:prstGeom prst="roundRect">
-            <a:avLst>
-              <a:gd name="adj" fmla="val 22815"/>
-            </a:avLst>
-          </a:prstGeom>
-        </p:spPr>
-        <p:style>
-          <a:lnRef idx="2">
-            <a:schemeClr val="dk1"/>
-          </a:lnRef>
-          <a:fillRef idx="1">
-            <a:schemeClr val="lt1"/>
-          </a:fillRef>
-          <a:effectRef idx="0">
-            <a:schemeClr val="dk1"/>
-          </a:effectRef>
-          <a:fontRef idx="minor">
-            <a:schemeClr val="dk1"/>
-          </a:fontRef>
-        </p:style>
-        <p:txBody>
-          <a:bodyPr rtlCol="0" anchor="ctr"/>
-          <a:lstStyle/>
-          <a:p>
-            <a:pPr algn="ctr"/>
-            <a:r>
-              <a:rPr lang="en-US" dirty="0"/>
-              <a:t>Receivers</a:t>
-            </a:r>
-          </a:p>
-        </p:txBody>
-      </p:sp>
-      <p:sp>
-        <p:nvSpPr>
-          <p:cNvPr id="10" name="Arrow: Circular 9">
-            <a:extLst>
-              <a:ext uri="{FF2B5EF4-FFF2-40B4-BE49-F238E27FC236}">
-                <a16:creationId xmlns:a16="http://schemas.microsoft.com/office/drawing/2014/main" id="{FA4DF3AE-0825-48AC-9219-F02047D72F65}"/>
-              </a:ext>
-            </a:extLst>
-          </p:cNvPr>
-          <p:cNvSpPr/>
-          <p:nvPr/>
-        </p:nvSpPr>
-        <p:spPr>
-          <a:xfrm>
-            <a:off x="3907221" y="1654431"/>
-            <a:ext cx="1734208" cy="978408"/>
-          </a:xfrm>
-          <a:prstGeom prst="circularArrow">
-            <a:avLst>
-              <a:gd name="adj1" fmla="val 3309"/>
-              <a:gd name="adj2" fmla="val 697099"/>
-              <a:gd name="adj3" fmla="val 21018354"/>
-              <a:gd name="adj4" fmla="val 10760252"/>
-              <a:gd name="adj5" fmla="val 7062"/>
-            </a:avLst>
-          </a:prstGeom>
-        </p:spPr>
-        <p:style>
-          <a:lnRef idx="2">
-            <a:schemeClr val="accent1">
-              <a:shade val="50000"/>
-            </a:schemeClr>
-          </a:lnRef>
-          <a:fillRef idx="1">
-            <a:schemeClr val="accent1"/>
-          </a:fillRef>
-          <a:effectRef idx="0">
-            <a:schemeClr val="accent1"/>
-          </a:effectRef>
-          <a:fontRef idx="minor">
-            <a:schemeClr val="lt1"/>
-          </a:fontRef>
-        </p:style>
-        <p:txBody>
-          <a:bodyPr rtlCol="0" anchor="ctr"/>
-          <a:lstStyle/>
-          <a:p>
-            <a:pPr algn="ctr"/>
-            <a:endParaRPr lang="en-US">
-              <a:solidFill>
-                <a:schemeClr val="tx1"/>
-              </a:solidFill>
-            </a:endParaRPr>
-          </a:p>
-        </p:txBody>
-      </p:sp>
-      <p:sp>
-        <p:nvSpPr>
-          <p:cNvPr id="11" name="Arrow: Circular 10">
-            <a:extLst>
-              <a:ext uri="{FF2B5EF4-FFF2-40B4-BE49-F238E27FC236}">
-                <a16:creationId xmlns:a16="http://schemas.microsoft.com/office/drawing/2014/main" id="{5225920C-D0FE-4BBF-8781-6A11E40B3DEF}"/>
-              </a:ext>
-            </a:extLst>
-          </p:cNvPr>
-          <p:cNvSpPr/>
-          <p:nvPr/>
-        </p:nvSpPr>
-        <p:spPr>
-          <a:xfrm rot="10800000">
-            <a:off x="3907220" y="2632840"/>
-            <a:ext cx="1734208" cy="978408"/>
-          </a:xfrm>
-          <a:prstGeom prst="circularArrow">
-            <a:avLst>
-              <a:gd name="adj1" fmla="val 3309"/>
-              <a:gd name="adj2" fmla="val 697099"/>
-              <a:gd name="adj3" fmla="val 21018354"/>
-              <a:gd name="adj4" fmla="val 10760252"/>
-              <a:gd name="adj5" fmla="val 7062"/>
-            </a:avLst>
-          </a:prstGeom>
-        </p:spPr>
-        <p:style>
-          <a:lnRef idx="2">
-            <a:schemeClr val="accent1">
-              <a:shade val="50000"/>
-            </a:schemeClr>
-          </a:lnRef>
-          <a:fillRef idx="1">
-            <a:schemeClr val="accent1"/>
-          </a:fillRef>
-          <a:effectRef idx="0">
-            <a:schemeClr val="accent1"/>
-          </a:effectRef>
-          <a:fontRef idx="minor">
-            <a:schemeClr val="lt1"/>
-          </a:fontRef>
-        </p:style>
-        <p:txBody>
-          <a:bodyPr rtlCol="0" anchor="ctr"/>
-          <a:lstStyle/>
-          <a:p>
-            <a:pPr algn="ctr"/>
-            <a:endParaRPr lang="en-US">
-              <a:solidFill>
-                <a:schemeClr val="tx1"/>
-              </a:solidFill>
-            </a:endParaRPr>
-          </a:p>
-        </p:txBody>
-      </p:sp>
-      <p:sp>
-        <p:nvSpPr>
-          <p:cNvPr id="13" name="Arrow: Pentagon 12">
-            <a:extLst>
-              <a:ext uri="{FF2B5EF4-FFF2-40B4-BE49-F238E27FC236}">
-                <a16:creationId xmlns:a16="http://schemas.microsoft.com/office/drawing/2014/main" id="{729B8AD1-13E9-444A-B7CD-6C4120D04F71}"/>
-              </a:ext>
-            </a:extLst>
-          </p:cNvPr>
-          <p:cNvSpPr/>
-          <p:nvPr/>
-        </p:nvSpPr>
-        <p:spPr>
-          <a:xfrm>
-            <a:off x="2609021" y="3758793"/>
-            <a:ext cx="978408" cy="484632"/>
-          </a:xfrm>
-          <a:prstGeom prst="homePlate">
-            <a:avLst/>
-          </a:prstGeom>
-        </p:spPr>
-        <p:style>
-          <a:lnRef idx="2">
-            <a:schemeClr val="accent1">
-              <a:shade val="50000"/>
-            </a:schemeClr>
-          </a:lnRef>
-          <a:fillRef idx="1">
-            <a:schemeClr val="accent1"/>
-          </a:fillRef>
-          <a:effectRef idx="0">
-            <a:schemeClr val="accent1"/>
-          </a:effectRef>
-          <a:fontRef idx="minor">
-            <a:schemeClr val="lt1"/>
-          </a:fontRef>
-        </p:style>
-        <p:txBody>
-          <a:bodyPr rtlCol="0" anchor="ctr"/>
-          <a:lstStyle/>
-          <a:p>
-            <a:pPr algn="ctr"/>
-            <a:endParaRPr lang="en-US"/>
-          </a:p>
-        </p:txBody>
-      </p:sp>
-      <p:sp>
-        <p:nvSpPr>
-          <p:cNvPr id="14" name="Arrow: Chevron 13">
-            <a:extLst>
-              <a:ext uri="{FF2B5EF4-FFF2-40B4-BE49-F238E27FC236}">
-                <a16:creationId xmlns:a16="http://schemas.microsoft.com/office/drawing/2014/main" id="{81DD1B9B-200A-438F-A0E4-6C248ED5CD59}"/>
-              </a:ext>
-            </a:extLst>
-          </p:cNvPr>
-          <p:cNvSpPr/>
-          <p:nvPr/>
-        </p:nvSpPr>
-        <p:spPr>
-          <a:xfrm>
-            <a:off x="3587429" y="3758793"/>
-            <a:ext cx="978408" cy="484632"/>
-          </a:xfrm>
-          <a:prstGeom prst="chevron">
-            <a:avLst/>
-          </a:prstGeom>
-        </p:spPr>
-        <p:style>
-          <a:lnRef idx="2">
-            <a:schemeClr val="accent1">
-              <a:shade val="50000"/>
-            </a:schemeClr>
-          </a:lnRef>
-          <a:fillRef idx="1">
-            <a:schemeClr val="accent1"/>
-          </a:fillRef>
-          <a:effectRef idx="0">
-            <a:schemeClr val="accent1"/>
-          </a:effectRef>
-          <a:fontRef idx="minor">
-            <a:schemeClr val="lt1"/>
-          </a:fontRef>
-        </p:style>
-        <p:txBody>
-          <a:bodyPr rtlCol="0" anchor="ctr"/>
-          <a:lstStyle/>
-          <a:p>
-            <a:pPr algn="ctr"/>
-            <a:endParaRPr lang="en-US">
-              <a:solidFill>
-                <a:schemeClr val="tx1"/>
-              </a:solidFill>
-            </a:endParaRPr>
-          </a:p>
-        </p:txBody>
-      </p:sp>
-      <p:sp>
-        <p:nvSpPr>
-          <p:cNvPr id="15" name="Arrow: Chevron 14">
-            <a:extLst>
-              <a:ext uri="{FF2B5EF4-FFF2-40B4-BE49-F238E27FC236}">
-                <a16:creationId xmlns:a16="http://schemas.microsoft.com/office/drawing/2014/main" id="{08BA4365-A150-4FD6-9FEF-8FA2C956CAF6}"/>
-              </a:ext>
-            </a:extLst>
-          </p:cNvPr>
-          <p:cNvSpPr/>
-          <p:nvPr/>
-        </p:nvSpPr>
-        <p:spPr>
-          <a:xfrm>
-            <a:off x="4565837" y="3758793"/>
-            <a:ext cx="978408" cy="484632"/>
-          </a:xfrm>
-          <a:prstGeom prst="chevron">
-            <a:avLst/>
-          </a:prstGeom>
-        </p:spPr>
-        <p:style>
-          <a:lnRef idx="2">
-            <a:schemeClr val="accent1">
-              <a:shade val="50000"/>
-            </a:schemeClr>
-          </a:lnRef>
-          <a:fillRef idx="1">
-            <a:schemeClr val="accent1"/>
-          </a:fillRef>
-          <a:effectRef idx="0">
-            <a:schemeClr val="accent1"/>
-          </a:effectRef>
-          <a:fontRef idx="minor">
-            <a:schemeClr val="lt1"/>
-          </a:fontRef>
-        </p:style>
-        <p:txBody>
-          <a:bodyPr rtlCol="0" anchor="ctr"/>
-          <a:lstStyle/>
-          <a:p>
-            <a:pPr algn="ctr"/>
-            <a:endParaRPr lang="en-US">
-              <a:solidFill>
-                <a:schemeClr val="tx1"/>
-              </a:solidFill>
-            </a:endParaRPr>
-          </a:p>
-        </p:txBody>
-      </p:sp>
-      <p:sp>
-        <p:nvSpPr>
-          <p:cNvPr id="16" name="Arrow: Chevron 15">
-            <a:extLst>
-              <a:ext uri="{FF2B5EF4-FFF2-40B4-BE49-F238E27FC236}">
-                <a16:creationId xmlns:a16="http://schemas.microsoft.com/office/drawing/2014/main" id="{3B8A07A9-79C6-4050-8CE1-EF7EAEFD078B}"/>
-              </a:ext>
-            </a:extLst>
-          </p:cNvPr>
-          <p:cNvSpPr/>
-          <p:nvPr/>
-        </p:nvSpPr>
-        <p:spPr>
-          <a:xfrm>
-            <a:off x="5544245" y="3758793"/>
-            <a:ext cx="978408" cy="484632"/>
-          </a:xfrm>
-          <a:prstGeom prst="chevron">
-            <a:avLst/>
-          </a:prstGeom>
-        </p:spPr>
-        <p:style>
-          <a:lnRef idx="2">
-            <a:schemeClr val="accent1">
-              <a:shade val="50000"/>
-            </a:schemeClr>
-          </a:lnRef>
-          <a:fillRef idx="1">
-            <a:schemeClr val="accent1"/>
-          </a:fillRef>
-          <a:effectRef idx="0">
-            <a:schemeClr val="accent1"/>
-          </a:effectRef>
-          <a:fontRef idx="minor">
-            <a:schemeClr val="lt1"/>
-          </a:fontRef>
-        </p:style>
-        <p:txBody>
-          <a:bodyPr rtlCol="0" anchor="ctr"/>
-          <a:lstStyle/>
-          <a:p>
-            <a:pPr algn="ctr"/>
-            <a:endParaRPr lang="en-US">
-              <a:solidFill>
-                <a:schemeClr val="tx1"/>
-              </a:solidFill>
-            </a:endParaRPr>
-          </a:p>
-        </p:txBody>
-      </p:sp>
-      <p:sp>
-        <p:nvSpPr>
-          <p:cNvPr id="20" name="Arrow: Notched Right 19">
-            <a:extLst>
-              <a:ext uri="{FF2B5EF4-FFF2-40B4-BE49-F238E27FC236}">
-                <a16:creationId xmlns:a16="http://schemas.microsoft.com/office/drawing/2014/main" id="{71AA151A-D77F-4A87-9B7C-4C202BBB397A}"/>
-              </a:ext>
-            </a:extLst>
-          </p:cNvPr>
-          <p:cNvSpPr/>
-          <p:nvPr/>
-        </p:nvSpPr>
-        <p:spPr>
-          <a:xfrm>
-            <a:off x="6500175" y="3516477"/>
-            <a:ext cx="988919" cy="969264"/>
-          </a:xfrm>
-          <a:prstGeom prst="notchedRightArrow">
-            <a:avLst>
-              <a:gd name="adj1" fmla="val 50000"/>
-              <a:gd name="adj2" fmla="val 54880"/>
-            </a:avLst>
-          </a:prstGeom>
-        </p:spPr>
-        <p:style>
-          <a:lnRef idx="2">
-            <a:schemeClr val="accent1">
-              <a:shade val="50000"/>
-            </a:schemeClr>
-          </a:lnRef>
-          <a:fillRef idx="1">
-            <a:schemeClr val="accent1"/>
-          </a:fillRef>
-          <a:effectRef idx="0">
-            <a:schemeClr val="accent1"/>
-          </a:effectRef>
-          <a:fontRef idx="minor">
-            <a:schemeClr val="lt1"/>
-          </a:fontRef>
-        </p:style>
-        <p:txBody>
-          <a:bodyPr rtlCol="0" anchor="ctr"/>
-          <a:lstStyle/>
-          <a:p>
-            <a:pPr algn="ctr"/>
-            <a:endParaRPr lang="en-US"/>
-          </a:p>
-        </p:txBody>
-      </p:sp>
-      <p:sp>
-        <p:nvSpPr>
-          <p:cNvPr id="21" name="Arrow: Right 20">
-            <a:extLst>
-              <a:ext uri="{FF2B5EF4-FFF2-40B4-BE49-F238E27FC236}">
-                <a16:creationId xmlns:a16="http://schemas.microsoft.com/office/drawing/2014/main" id="{E48BFB20-858B-407A-8813-88683EF0ED4F}"/>
-              </a:ext>
-            </a:extLst>
-          </p:cNvPr>
-          <p:cNvSpPr/>
-          <p:nvPr/>
-        </p:nvSpPr>
-        <p:spPr>
-          <a:xfrm>
-            <a:off x="7076088" y="2585544"/>
-            <a:ext cx="809298" cy="94589"/>
-          </a:xfrm>
-          <a:prstGeom prst="rightArrow">
-            <a:avLst/>
-          </a:prstGeom>
-        </p:spPr>
-        <p:style>
-          <a:lnRef idx="2">
-            <a:schemeClr val="accent1">
-              <a:shade val="50000"/>
-            </a:schemeClr>
-          </a:lnRef>
-          <a:fillRef idx="1">
-            <a:schemeClr val="accent1"/>
-          </a:fillRef>
-          <a:effectRef idx="0">
-            <a:schemeClr val="accent1"/>
-          </a:effectRef>
-          <a:fontRef idx="minor">
-            <a:schemeClr val="lt1"/>
-          </a:fontRef>
-        </p:style>
-        <p:txBody>
-          <a:bodyPr rtlCol="0" anchor="ctr"/>
-          <a:lstStyle/>
-          <a:p>
-            <a:pPr algn="ctr"/>
-            <a:endParaRPr lang="en-US"/>
-          </a:p>
-        </p:txBody>
-      </p:sp>
-      <p:sp>
-        <p:nvSpPr>
-          <p:cNvPr id="24" name="TextBox 23">
-            <a:extLst>
-              <a:ext uri="{FF2B5EF4-FFF2-40B4-BE49-F238E27FC236}">
-                <a16:creationId xmlns:a16="http://schemas.microsoft.com/office/drawing/2014/main" id="{530ACF03-3E21-4783-A1BC-2E6A3F24CB67}"/>
-              </a:ext>
-            </a:extLst>
-          </p:cNvPr>
-          <p:cNvSpPr txBox="1"/>
-          <p:nvPr/>
-        </p:nvSpPr>
-        <p:spPr>
-          <a:xfrm>
-            <a:off x="3767029" y="973328"/>
-            <a:ext cx="2014590" cy="369332"/>
-          </a:xfrm>
-          <a:prstGeom prst="rect">
-            <a:avLst/>
-          </a:prstGeom>
-          <a:noFill/>
-        </p:spPr>
-        <p:txBody>
-          <a:bodyPr wrap="none" rtlCol="0">
-            <a:spAutoFit/>
-          </a:bodyPr>
-          <a:lstStyle/>
-          <a:p>
-            <a:r>
-              <a:rPr lang="en-US" dirty="0"/>
-              <a:t>Exchange Scenarios</a:t>
-            </a:r>
-          </a:p>
-        </p:txBody>
-      </p:sp>
-      <p:sp>
-        <p:nvSpPr>
-          <p:cNvPr id="25" name="TextBox 24">
-            <a:extLst>
-              <a:ext uri="{FF2B5EF4-FFF2-40B4-BE49-F238E27FC236}">
-                <a16:creationId xmlns:a16="http://schemas.microsoft.com/office/drawing/2014/main" id="{7919C991-B75E-4E1C-82AB-C8912DED7F00}"/>
-              </a:ext>
-            </a:extLst>
-          </p:cNvPr>
-          <p:cNvSpPr txBox="1"/>
-          <p:nvPr/>
-        </p:nvSpPr>
-        <p:spPr>
-          <a:xfrm>
-            <a:off x="6599513" y="982898"/>
-            <a:ext cx="2054537" cy="369332"/>
-          </a:xfrm>
-          <a:prstGeom prst="rect">
-            <a:avLst/>
-          </a:prstGeom>
-          <a:noFill/>
-        </p:spPr>
-        <p:txBody>
-          <a:bodyPr wrap="none" rtlCol="0">
-            <a:spAutoFit/>
-          </a:bodyPr>
-          <a:lstStyle/>
-          <a:p>
-            <a:r>
-              <a:rPr lang="en-US" dirty="0"/>
-              <a:t>Reporting Scenarios</a:t>
-            </a:r>
-          </a:p>
-        </p:txBody>
-      </p:sp>
-      <p:sp>
-        <p:nvSpPr>
-          <p:cNvPr id="26" name="TextBox 25">
-            <a:extLst>
-              <a:ext uri="{FF2B5EF4-FFF2-40B4-BE49-F238E27FC236}">
-                <a16:creationId xmlns:a16="http://schemas.microsoft.com/office/drawing/2014/main" id="{5974DC83-FDAC-4BE4-B479-F9CA0E1AD844}"/>
-              </a:ext>
-            </a:extLst>
-          </p:cNvPr>
-          <p:cNvSpPr txBox="1"/>
-          <p:nvPr/>
-        </p:nvSpPr>
-        <p:spPr>
-          <a:xfrm>
-            <a:off x="4027223" y="4255626"/>
-            <a:ext cx="2209064" cy="369332"/>
-          </a:xfrm>
-          <a:prstGeom prst="rect">
-            <a:avLst/>
-          </a:prstGeom>
-          <a:noFill/>
-        </p:spPr>
-        <p:txBody>
-          <a:bodyPr wrap="square" rtlCol="0">
-            <a:spAutoFit/>
-          </a:bodyPr>
-          <a:lstStyle/>
-          <a:p>
-            <a:r>
-              <a:rPr lang="en-US" dirty="0"/>
-              <a:t>Measurement Period</a:t>
-            </a:r>
-          </a:p>
-        </p:txBody>
-      </p:sp>
-      <p:sp>
-        <p:nvSpPr>
-          <p:cNvPr id="27" name="TextBox 26">
-            <a:extLst>
-              <a:ext uri="{FF2B5EF4-FFF2-40B4-BE49-F238E27FC236}">
-                <a16:creationId xmlns:a16="http://schemas.microsoft.com/office/drawing/2014/main" id="{A9999BC3-731A-4D2B-9BCD-2F45DFA49C48}"/>
-              </a:ext>
-            </a:extLst>
-          </p:cNvPr>
-          <p:cNvSpPr txBox="1"/>
-          <p:nvPr/>
-        </p:nvSpPr>
-        <p:spPr>
-          <a:xfrm>
-            <a:off x="188663" y="201721"/>
-            <a:ext cx="2782300" cy="369332"/>
-          </a:xfrm>
-          <a:prstGeom prst="rect">
-            <a:avLst/>
-          </a:prstGeom>
-          <a:noFill/>
-        </p:spPr>
-        <p:txBody>
-          <a:bodyPr wrap="none" rtlCol="0">
-            <a:spAutoFit/>
-          </a:bodyPr>
-          <a:lstStyle/>
-          <a:p>
-            <a:r>
-              <a:rPr lang="en-US" dirty="0"/>
-              <a:t>Quality Reporting Scenarios</a:t>
-            </a:r>
-          </a:p>
-        </p:txBody>
-      </p:sp>
-      <p:sp>
-        <p:nvSpPr>
-          <p:cNvPr id="28" name="Oval 27">
-            <a:extLst>
-              <a:ext uri="{FF2B5EF4-FFF2-40B4-BE49-F238E27FC236}">
-                <a16:creationId xmlns:a16="http://schemas.microsoft.com/office/drawing/2014/main" id="{F12D3CEE-27B0-4207-97AA-96A4BCA75AD0}"/>
-              </a:ext>
-            </a:extLst>
-          </p:cNvPr>
-          <p:cNvSpPr/>
-          <p:nvPr/>
-        </p:nvSpPr>
-        <p:spPr>
-          <a:xfrm>
-            <a:off x="2970963" y="4773105"/>
-            <a:ext cx="331076" cy="369332"/>
-          </a:xfrm>
-          <a:prstGeom prst="ellipse">
-            <a:avLst/>
-          </a:prstGeom>
-        </p:spPr>
-        <p:style>
-          <a:lnRef idx="2">
-            <a:schemeClr val="accent1">
-              <a:shade val="50000"/>
-            </a:schemeClr>
-          </a:lnRef>
-          <a:fillRef idx="1">
-            <a:schemeClr val="accent1"/>
-          </a:fillRef>
-          <a:effectRef idx="0">
-            <a:schemeClr val="accent1"/>
-          </a:effectRef>
-          <a:fontRef idx="minor">
-            <a:schemeClr val="lt1"/>
-          </a:fontRef>
-        </p:style>
-        <p:txBody>
-          <a:bodyPr rtlCol="0" anchor="ctr"/>
-          <a:lstStyle/>
-          <a:p>
-            <a:pPr algn="ctr"/>
-            <a:r>
-              <a:rPr lang="en-US" dirty="0"/>
-              <a:t>1</a:t>
-            </a:r>
-          </a:p>
-        </p:txBody>
-      </p:sp>
-      <p:sp>
-        <p:nvSpPr>
-          <p:cNvPr id="29" name="Oval 28">
-            <a:extLst>
-              <a:ext uri="{FF2B5EF4-FFF2-40B4-BE49-F238E27FC236}">
-                <a16:creationId xmlns:a16="http://schemas.microsoft.com/office/drawing/2014/main" id="{FD078174-DD93-4B60-9E10-D033CB23A4AC}"/>
-              </a:ext>
-            </a:extLst>
-          </p:cNvPr>
-          <p:cNvSpPr/>
-          <p:nvPr/>
-        </p:nvSpPr>
-        <p:spPr>
-          <a:xfrm>
-            <a:off x="2970963" y="5297152"/>
-            <a:ext cx="331076" cy="369332"/>
-          </a:xfrm>
-          <a:prstGeom prst="ellipse">
-            <a:avLst/>
-          </a:prstGeom>
-        </p:spPr>
-        <p:style>
-          <a:lnRef idx="2">
-            <a:schemeClr val="accent1">
-              <a:shade val="50000"/>
-            </a:schemeClr>
-          </a:lnRef>
-          <a:fillRef idx="1">
-            <a:schemeClr val="accent1"/>
-          </a:fillRef>
-          <a:effectRef idx="0">
-            <a:schemeClr val="accent1"/>
-          </a:effectRef>
-          <a:fontRef idx="minor">
-            <a:schemeClr val="lt1"/>
-          </a:fontRef>
-        </p:style>
-        <p:txBody>
-          <a:bodyPr rtlCol="0" anchor="ctr"/>
-          <a:lstStyle/>
-          <a:p>
-            <a:pPr algn="ctr"/>
-            <a:r>
-              <a:rPr lang="en-US" dirty="0"/>
-              <a:t>2</a:t>
-            </a:r>
-          </a:p>
-        </p:txBody>
-      </p:sp>
-      <p:sp>
-        <p:nvSpPr>
-          <p:cNvPr id="31" name="Oval 30">
-            <a:extLst>
-              <a:ext uri="{FF2B5EF4-FFF2-40B4-BE49-F238E27FC236}">
-                <a16:creationId xmlns:a16="http://schemas.microsoft.com/office/drawing/2014/main" id="{31A1A947-A48B-4F73-B101-F4DEB368CFD1}"/>
-              </a:ext>
-            </a:extLst>
-          </p:cNvPr>
-          <p:cNvSpPr/>
-          <p:nvPr/>
-        </p:nvSpPr>
-        <p:spPr>
-          <a:xfrm>
-            <a:off x="2970963" y="5821199"/>
-            <a:ext cx="331076" cy="369332"/>
-          </a:xfrm>
-          <a:prstGeom prst="ellipse">
-            <a:avLst/>
-          </a:prstGeom>
-        </p:spPr>
-        <p:style>
-          <a:lnRef idx="2">
-            <a:schemeClr val="accent1">
-              <a:shade val="50000"/>
-            </a:schemeClr>
-          </a:lnRef>
-          <a:fillRef idx="1">
-            <a:schemeClr val="accent1"/>
-          </a:fillRef>
-          <a:effectRef idx="0">
-            <a:schemeClr val="accent1"/>
-          </a:effectRef>
-          <a:fontRef idx="minor">
-            <a:schemeClr val="lt1"/>
-          </a:fontRef>
-        </p:style>
-        <p:txBody>
-          <a:bodyPr rtlCol="0" anchor="ctr"/>
-          <a:lstStyle/>
-          <a:p>
-            <a:pPr algn="ctr"/>
-            <a:r>
-              <a:rPr lang="en-US" dirty="0"/>
-              <a:t>3</a:t>
-            </a:r>
-          </a:p>
-        </p:txBody>
-      </p:sp>
-      <p:sp>
-        <p:nvSpPr>
-          <p:cNvPr id="32" name="Oval 31">
-            <a:extLst>
-              <a:ext uri="{FF2B5EF4-FFF2-40B4-BE49-F238E27FC236}">
-                <a16:creationId xmlns:a16="http://schemas.microsoft.com/office/drawing/2014/main" id="{326A7B3C-087B-4086-B8CF-BC973DE13751}"/>
-              </a:ext>
-            </a:extLst>
-          </p:cNvPr>
-          <p:cNvSpPr/>
-          <p:nvPr/>
-        </p:nvSpPr>
-        <p:spPr>
-          <a:xfrm>
-            <a:off x="6033449" y="4763078"/>
-            <a:ext cx="331076" cy="369332"/>
-          </a:xfrm>
-          <a:prstGeom prst="ellipse">
-            <a:avLst/>
-          </a:prstGeom>
-        </p:spPr>
-        <p:style>
-          <a:lnRef idx="2">
-            <a:schemeClr val="accent1">
-              <a:shade val="50000"/>
-            </a:schemeClr>
-          </a:lnRef>
-          <a:fillRef idx="1">
-            <a:schemeClr val="accent1"/>
-          </a:fillRef>
-          <a:effectRef idx="0">
-            <a:schemeClr val="accent1"/>
-          </a:effectRef>
-          <a:fontRef idx="minor">
-            <a:schemeClr val="lt1"/>
-          </a:fontRef>
-        </p:style>
-        <p:txBody>
-          <a:bodyPr rtlCol="0" anchor="ctr"/>
-          <a:lstStyle/>
-          <a:p>
-            <a:pPr algn="ctr"/>
-            <a:r>
-              <a:rPr lang="en-US" dirty="0"/>
-              <a:t>4</a:t>
-            </a:r>
-          </a:p>
-        </p:txBody>
-      </p:sp>
-      <p:sp>
-        <p:nvSpPr>
-          <p:cNvPr id="33" name="Oval 32">
-            <a:extLst>
-              <a:ext uri="{FF2B5EF4-FFF2-40B4-BE49-F238E27FC236}">
-                <a16:creationId xmlns:a16="http://schemas.microsoft.com/office/drawing/2014/main" id="{185EDC90-8346-42AF-973D-DFB42CF7DC56}"/>
-              </a:ext>
-            </a:extLst>
-          </p:cNvPr>
-          <p:cNvSpPr/>
-          <p:nvPr/>
-        </p:nvSpPr>
-        <p:spPr>
-          <a:xfrm>
-            <a:off x="6033449" y="5290488"/>
-            <a:ext cx="331076" cy="369332"/>
-          </a:xfrm>
-          <a:prstGeom prst="ellipse">
-            <a:avLst/>
-          </a:prstGeom>
-        </p:spPr>
-        <p:style>
-          <a:lnRef idx="2">
-            <a:schemeClr val="accent1">
-              <a:shade val="50000"/>
-            </a:schemeClr>
-          </a:lnRef>
-          <a:fillRef idx="1">
-            <a:schemeClr val="accent1"/>
-          </a:fillRef>
-          <a:effectRef idx="0">
-            <a:schemeClr val="accent1"/>
-          </a:effectRef>
-          <a:fontRef idx="minor">
-            <a:schemeClr val="lt1"/>
-          </a:fontRef>
-        </p:style>
-        <p:txBody>
-          <a:bodyPr rtlCol="0" anchor="ctr"/>
-          <a:lstStyle/>
-          <a:p>
-            <a:pPr algn="ctr"/>
-            <a:r>
-              <a:rPr lang="en-US" dirty="0"/>
-              <a:t>5</a:t>
-            </a:r>
-          </a:p>
-        </p:txBody>
-      </p:sp>
-      <p:sp>
-        <p:nvSpPr>
-          <p:cNvPr id="34" name="Oval 33">
-            <a:extLst>
-              <a:ext uri="{FF2B5EF4-FFF2-40B4-BE49-F238E27FC236}">
-                <a16:creationId xmlns:a16="http://schemas.microsoft.com/office/drawing/2014/main" id="{99283339-11C6-4E92-841E-B25BDA2A2054}"/>
-              </a:ext>
-            </a:extLst>
-          </p:cNvPr>
-          <p:cNvSpPr/>
-          <p:nvPr/>
-        </p:nvSpPr>
-        <p:spPr>
-          <a:xfrm>
-            <a:off x="6033449" y="5814535"/>
-            <a:ext cx="331076" cy="369332"/>
-          </a:xfrm>
-          <a:prstGeom prst="ellipse">
-            <a:avLst/>
-          </a:prstGeom>
-        </p:spPr>
-        <p:style>
-          <a:lnRef idx="2">
-            <a:schemeClr val="accent1">
-              <a:shade val="50000"/>
-            </a:schemeClr>
-          </a:lnRef>
-          <a:fillRef idx="1">
-            <a:schemeClr val="accent1"/>
-          </a:fillRef>
-          <a:effectRef idx="0">
-            <a:schemeClr val="accent1"/>
-          </a:effectRef>
-          <a:fontRef idx="minor">
-            <a:schemeClr val="lt1"/>
-          </a:fontRef>
-        </p:style>
-        <p:txBody>
-          <a:bodyPr rtlCol="0" anchor="ctr"/>
-          <a:lstStyle/>
-          <a:p>
-            <a:pPr algn="ctr"/>
-            <a:r>
-              <a:rPr lang="en-US" dirty="0"/>
-              <a:t>6</a:t>
-            </a:r>
-          </a:p>
-        </p:txBody>
-      </p:sp>
-      <p:sp>
-        <p:nvSpPr>
-          <p:cNvPr id="35" name="TextBox 34">
-            <a:extLst>
-              <a:ext uri="{FF2B5EF4-FFF2-40B4-BE49-F238E27FC236}">
-                <a16:creationId xmlns:a16="http://schemas.microsoft.com/office/drawing/2014/main" id="{48936F3F-CEDB-4BD7-9BDE-1379D8563790}"/>
-              </a:ext>
-            </a:extLst>
-          </p:cNvPr>
-          <p:cNvSpPr txBox="1"/>
-          <p:nvPr/>
-        </p:nvSpPr>
-        <p:spPr>
-          <a:xfrm>
-            <a:off x="3464757" y="4773105"/>
-            <a:ext cx="1337097" cy="369332"/>
-          </a:xfrm>
-          <a:prstGeom prst="rect">
-            <a:avLst/>
-          </a:prstGeom>
-          <a:noFill/>
-        </p:spPr>
-        <p:txBody>
-          <a:bodyPr wrap="none" rtlCol="0">
-            <a:spAutoFit/>
-          </a:bodyPr>
-          <a:lstStyle/>
-          <a:p>
-            <a:r>
-              <a:rPr lang="en-US" dirty="0"/>
-              <a:t>Submit Data</a:t>
-            </a:r>
-          </a:p>
-        </p:txBody>
-      </p:sp>
-      <p:sp>
-        <p:nvSpPr>
-          <p:cNvPr id="36" name="TextBox 35">
-            <a:extLst>
-              <a:ext uri="{FF2B5EF4-FFF2-40B4-BE49-F238E27FC236}">
-                <a16:creationId xmlns:a16="http://schemas.microsoft.com/office/drawing/2014/main" id="{8AEC4D0D-AD37-4542-9E9E-509CC721F37E}"/>
-              </a:ext>
-            </a:extLst>
-          </p:cNvPr>
-          <p:cNvSpPr txBox="1"/>
-          <p:nvPr/>
-        </p:nvSpPr>
-        <p:spPr>
-          <a:xfrm>
-            <a:off x="3453535" y="5303720"/>
-            <a:ext cx="1314655" cy="369332"/>
-          </a:xfrm>
-          <a:prstGeom prst="rect">
-            <a:avLst/>
-          </a:prstGeom>
-          <a:noFill/>
-        </p:spPr>
-        <p:txBody>
-          <a:bodyPr wrap="none" rtlCol="0">
-            <a:spAutoFit/>
-          </a:bodyPr>
-          <a:lstStyle/>
-          <a:p>
-            <a:r>
-              <a:rPr lang="en-US" dirty="0"/>
-              <a:t>Collect Data</a:t>
-            </a:r>
-          </a:p>
-        </p:txBody>
-      </p:sp>
-      <p:sp>
-        <p:nvSpPr>
-          <p:cNvPr id="37" name="TextBox 36">
-            <a:extLst>
-              <a:ext uri="{FF2B5EF4-FFF2-40B4-BE49-F238E27FC236}">
-                <a16:creationId xmlns:a16="http://schemas.microsoft.com/office/drawing/2014/main" id="{7E220F5C-FA4B-4797-90DD-A97C755C3F4D}"/>
-              </a:ext>
-            </a:extLst>
-          </p:cNvPr>
-          <p:cNvSpPr txBox="1"/>
-          <p:nvPr/>
-        </p:nvSpPr>
-        <p:spPr>
-          <a:xfrm>
-            <a:off x="3464757" y="5835429"/>
-            <a:ext cx="1347869" cy="369332"/>
-          </a:xfrm>
-          <a:prstGeom prst="rect">
-            <a:avLst/>
-          </a:prstGeom>
-          <a:noFill/>
-        </p:spPr>
-        <p:txBody>
-          <a:bodyPr wrap="none" rtlCol="0">
-            <a:spAutoFit/>
-          </a:bodyPr>
-          <a:lstStyle/>
-          <a:p>
-            <a:r>
-              <a:rPr lang="en-US" dirty="0"/>
-              <a:t>Subscription</a:t>
-            </a:r>
-          </a:p>
-        </p:txBody>
-      </p:sp>
-      <p:sp>
-        <p:nvSpPr>
-          <p:cNvPr id="38" name="TextBox 37">
-            <a:extLst>
-              <a:ext uri="{FF2B5EF4-FFF2-40B4-BE49-F238E27FC236}">
-                <a16:creationId xmlns:a16="http://schemas.microsoft.com/office/drawing/2014/main" id="{ECAC1126-8A72-43E0-81B6-CDB1970A707E}"/>
-              </a:ext>
-            </a:extLst>
-          </p:cNvPr>
-          <p:cNvSpPr txBox="1"/>
-          <p:nvPr/>
-        </p:nvSpPr>
-        <p:spPr>
-          <a:xfrm>
-            <a:off x="6548289" y="4746955"/>
-            <a:ext cx="1103187" cy="369332"/>
-          </a:xfrm>
-          <a:prstGeom prst="rect">
-            <a:avLst/>
-          </a:prstGeom>
-          <a:noFill/>
-        </p:spPr>
-        <p:txBody>
-          <a:bodyPr wrap="none" rtlCol="0">
-            <a:spAutoFit/>
-          </a:bodyPr>
-          <a:lstStyle/>
-          <a:p>
-            <a:r>
-              <a:rPr lang="en-US" dirty="0"/>
-              <a:t>Individual</a:t>
-            </a:r>
-          </a:p>
-        </p:txBody>
-      </p:sp>
-      <p:sp>
-        <p:nvSpPr>
-          <p:cNvPr id="39" name="TextBox 38">
-            <a:extLst>
-              <a:ext uri="{FF2B5EF4-FFF2-40B4-BE49-F238E27FC236}">
-                <a16:creationId xmlns:a16="http://schemas.microsoft.com/office/drawing/2014/main" id="{19F38669-ACCD-4463-89D1-B738E5C4071D}"/>
-              </a:ext>
-            </a:extLst>
-          </p:cNvPr>
-          <p:cNvSpPr txBox="1"/>
-          <p:nvPr/>
-        </p:nvSpPr>
-        <p:spPr>
-          <a:xfrm>
-            <a:off x="6537067" y="5277570"/>
-            <a:ext cx="1077090" cy="369332"/>
-          </a:xfrm>
-          <a:prstGeom prst="rect">
-            <a:avLst/>
-          </a:prstGeom>
-          <a:noFill/>
-        </p:spPr>
-        <p:txBody>
-          <a:bodyPr wrap="none" rtlCol="0">
-            <a:spAutoFit/>
-          </a:bodyPr>
-          <a:lstStyle/>
-          <a:p>
-            <a:r>
-              <a:rPr lang="en-US" dirty="0"/>
-              <a:t>Summary</a:t>
-            </a:r>
-          </a:p>
-        </p:txBody>
-      </p:sp>
-      <p:sp>
-        <p:nvSpPr>
-          <p:cNvPr id="40" name="TextBox 39">
-            <a:extLst>
-              <a:ext uri="{FF2B5EF4-FFF2-40B4-BE49-F238E27FC236}">
-                <a16:creationId xmlns:a16="http://schemas.microsoft.com/office/drawing/2014/main" id="{5176EA77-8354-472A-B825-A49D042C6325}"/>
-              </a:ext>
-            </a:extLst>
-          </p:cNvPr>
-          <p:cNvSpPr txBox="1"/>
-          <p:nvPr/>
-        </p:nvSpPr>
-        <p:spPr>
-          <a:xfrm>
-            <a:off x="6548289" y="5809279"/>
-            <a:ext cx="1216487" cy="369332"/>
-          </a:xfrm>
-          <a:prstGeom prst="rect">
-            <a:avLst/>
-          </a:prstGeom>
-          <a:noFill/>
-        </p:spPr>
-        <p:txBody>
-          <a:bodyPr wrap="none" rtlCol="0">
-            <a:spAutoFit/>
-          </a:bodyPr>
-          <a:lstStyle/>
-          <a:p>
-            <a:r>
-              <a:rPr lang="en-US" dirty="0"/>
-              <a:t>Patient List</a:t>
-            </a:r>
-          </a:p>
-        </p:txBody>
-      </p:sp>
-    </p:spTree>
-    <p:extLst>
-      <p:ext uri="{BB962C8B-B14F-4D97-AF65-F5344CB8AC3E}">
-        <p14:creationId xmlns:p14="http://schemas.microsoft.com/office/powerpoint/2010/main" val="1551355754"/>
-      </p:ext>
-    </p:extLst>
-  </p:cSld>
-  <p:clrMapOvr>
-    <a:masterClrMapping/>
-  </p:clrMapOvr>
-</p:sld>
-</file>
-
-<file path=ppt/slides/slide5.xml><?xml version="1.0" encoding="utf-8"?>
-<p:sld xmlns:a="http://schemas.openxmlformats.org/drawingml/2006/main" xmlns:r="http://schemas.openxmlformats.org/officeDocument/2006/relationships" xmlns:p="http://schemas.openxmlformats.org/presentationml/2006/main">
-  <p:cSld>
-    <p:spTree>
-      <p:nvGrpSpPr>
-        <p:cNvPr id="1" name=""/>
-        <p:cNvGrpSpPr/>
-        <p:nvPr/>
-      </p:nvGrpSpPr>
-      <p:grpSpPr>
-        <a:xfrm>
-          <a:off x="0" y="0"/>
-          <a:ext cx="0" cy="0"/>
-          <a:chOff x="0" y="0"/>
-          <a:chExt cx="0" cy="0"/>
-        </a:xfrm>
-      </p:grpSpPr>
-      <p:sp>
-        <p:nvSpPr>
-          <p:cNvPr id="23" name="Rectangle: Rounded Corners 22">
-            <a:extLst>
-              <a:ext uri="{FF2B5EF4-FFF2-40B4-BE49-F238E27FC236}">
-                <a16:creationId xmlns:a16="http://schemas.microsoft.com/office/drawing/2014/main" id="{F8A5242D-B367-4DA5-A846-46385B7F4058}"/>
-              </a:ext>
-            </a:extLst>
-          </p:cNvPr>
-          <p:cNvSpPr/>
-          <p:nvPr/>
-        </p:nvSpPr>
-        <p:spPr>
-          <a:xfrm>
-            <a:off x="5677417" y="1368040"/>
-            <a:ext cx="3516244" cy="3774892"/>
-          </a:xfrm>
-          <a:prstGeom prst="roundRect">
-            <a:avLst>
-              <a:gd name="adj" fmla="val 7908"/>
-            </a:avLst>
-          </a:prstGeom>
-        </p:spPr>
-        <p:style>
-          <a:lnRef idx="1">
-            <a:schemeClr val="accent3"/>
-          </a:lnRef>
-          <a:fillRef idx="2">
-            <a:schemeClr val="accent3"/>
-          </a:fillRef>
-          <a:effectRef idx="1">
-            <a:schemeClr val="accent3"/>
-          </a:effectRef>
-          <a:fontRef idx="minor">
-            <a:schemeClr val="dk1"/>
-          </a:fontRef>
-        </p:style>
-        <p:txBody>
-          <a:bodyPr rtlCol="0" anchor="ctr"/>
-          <a:lstStyle/>
-          <a:p>
-            <a:pPr algn="ctr"/>
-            <a:endParaRPr lang="en-US" dirty="0"/>
-          </a:p>
-        </p:txBody>
-      </p:sp>
-      <p:sp>
-        <p:nvSpPr>
-          <p:cNvPr id="22" name="Rectangle: Rounded Corners 21">
-            <a:extLst>
-              <a:ext uri="{FF2B5EF4-FFF2-40B4-BE49-F238E27FC236}">
-                <a16:creationId xmlns:a16="http://schemas.microsoft.com/office/drawing/2014/main" id="{4B4359B2-FBCE-45C5-9985-DB046BCC1F55}"/>
-              </a:ext>
-            </a:extLst>
-          </p:cNvPr>
-          <p:cNvSpPr/>
-          <p:nvPr/>
-        </p:nvSpPr>
-        <p:spPr>
-          <a:xfrm>
-            <a:off x="1677418" y="1368040"/>
-            <a:ext cx="3638342" cy="3774892"/>
-          </a:xfrm>
-          <a:prstGeom prst="roundRect">
-            <a:avLst>
-              <a:gd name="adj" fmla="val 7908"/>
-            </a:avLst>
-          </a:prstGeom>
-        </p:spPr>
-        <p:style>
-          <a:lnRef idx="1">
-            <a:schemeClr val="accent3"/>
-          </a:lnRef>
-          <a:fillRef idx="2">
-            <a:schemeClr val="accent3"/>
-          </a:fillRef>
-          <a:effectRef idx="1">
-            <a:schemeClr val="accent3"/>
-          </a:effectRef>
-          <a:fontRef idx="minor">
-            <a:schemeClr val="dk1"/>
-          </a:fontRef>
-        </p:style>
-        <p:txBody>
-          <a:bodyPr rtlCol="0" anchor="ctr"/>
-          <a:lstStyle/>
-          <a:p>
-            <a:pPr algn="ctr"/>
-            <a:endParaRPr lang="en-US" dirty="0"/>
-          </a:p>
-        </p:txBody>
-      </p:sp>
-      <p:sp>
-        <p:nvSpPr>
-          <p:cNvPr id="7" name="Rectangle: Rounded Corners 6">
-            <a:extLst>
-              <a:ext uri="{FF2B5EF4-FFF2-40B4-BE49-F238E27FC236}">
-                <a16:creationId xmlns:a16="http://schemas.microsoft.com/office/drawing/2014/main" id="{A59D8396-DEA9-4AB0-8899-46A551BA2B7D}"/>
-              </a:ext>
-            </a:extLst>
-          </p:cNvPr>
-          <p:cNvSpPr/>
-          <p:nvPr/>
-        </p:nvSpPr>
-        <p:spPr>
-          <a:xfrm>
-            <a:off x="8341256" y="2610429"/>
-            <a:ext cx="1822429" cy="788277"/>
-          </a:xfrm>
-          <a:prstGeom prst="roundRect">
-            <a:avLst>
-              <a:gd name="adj" fmla="val 22815"/>
-            </a:avLst>
-          </a:prstGeom>
-        </p:spPr>
-        <p:style>
-          <a:lnRef idx="2">
-            <a:schemeClr val="dk1"/>
-          </a:lnRef>
-          <a:fillRef idx="1">
-            <a:schemeClr val="lt1"/>
-          </a:fillRef>
-          <a:effectRef idx="0">
-            <a:schemeClr val="dk1"/>
-          </a:effectRef>
-          <a:fontRef idx="minor">
-            <a:schemeClr val="dk1"/>
-          </a:fontRef>
-        </p:style>
-        <p:txBody>
-          <a:bodyPr rtlCol="0" anchor="ctr"/>
-          <a:lstStyle/>
-          <a:p>
-            <a:pPr algn="ctr"/>
-            <a:r>
-              <a:rPr lang="en-US" dirty="0"/>
-              <a:t>Receivers</a:t>
-            </a:r>
-          </a:p>
-        </p:txBody>
-      </p:sp>
-      <p:sp>
-        <p:nvSpPr>
-          <p:cNvPr id="10" name="Arrow: Circular 9">
-            <a:extLst>
-              <a:ext uri="{FF2B5EF4-FFF2-40B4-BE49-F238E27FC236}">
-                <a16:creationId xmlns:a16="http://schemas.microsoft.com/office/drawing/2014/main" id="{FA4DF3AE-0825-48AC-9219-F02047D72F65}"/>
-              </a:ext>
-            </a:extLst>
-          </p:cNvPr>
-          <p:cNvSpPr/>
-          <p:nvPr/>
-        </p:nvSpPr>
-        <p:spPr>
-          <a:xfrm>
-            <a:off x="2479210" y="1938971"/>
-            <a:ext cx="2604948" cy="1261007"/>
-          </a:xfrm>
-          <a:prstGeom prst="circularArrow">
-            <a:avLst>
-              <a:gd name="adj1" fmla="val 3309"/>
-              <a:gd name="adj2" fmla="val 761917"/>
-              <a:gd name="adj3" fmla="val 21018354"/>
-              <a:gd name="adj4" fmla="val 10666627"/>
-              <a:gd name="adj5" fmla="val 7062"/>
-            </a:avLst>
-          </a:prstGeom>
-        </p:spPr>
-        <p:style>
-          <a:lnRef idx="2">
-            <a:schemeClr val="accent1">
-              <a:shade val="50000"/>
-            </a:schemeClr>
-          </a:lnRef>
-          <a:fillRef idx="1">
-            <a:schemeClr val="accent1"/>
-          </a:fillRef>
-          <a:effectRef idx="0">
-            <a:schemeClr val="accent1"/>
-          </a:effectRef>
-          <a:fontRef idx="minor">
-            <a:schemeClr val="lt1"/>
-          </a:fontRef>
-        </p:style>
-        <p:txBody>
-          <a:bodyPr rtlCol="0" anchor="ctr"/>
-          <a:lstStyle/>
-          <a:p>
-            <a:pPr algn="ctr"/>
-            <a:endParaRPr lang="en-US" dirty="0">
-              <a:solidFill>
-                <a:schemeClr val="tx1"/>
-              </a:solidFill>
-            </a:endParaRPr>
-          </a:p>
-        </p:txBody>
-      </p:sp>
-      <p:sp>
-        <p:nvSpPr>
-          <p:cNvPr id="11" name="Arrow: Circular 10">
-            <a:extLst>
-              <a:ext uri="{FF2B5EF4-FFF2-40B4-BE49-F238E27FC236}">
-                <a16:creationId xmlns:a16="http://schemas.microsoft.com/office/drawing/2014/main" id="{5225920C-D0FE-4BBF-8781-6A11E40B3DEF}"/>
-              </a:ext>
-            </a:extLst>
-          </p:cNvPr>
-          <p:cNvSpPr/>
-          <p:nvPr/>
-        </p:nvSpPr>
-        <p:spPr>
-          <a:xfrm rot="10800000">
-            <a:off x="2455989" y="2785132"/>
-            <a:ext cx="2628169" cy="1356979"/>
-          </a:xfrm>
-          <a:prstGeom prst="circularArrow">
-            <a:avLst>
-              <a:gd name="adj1" fmla="val 3309"/>
-              <a:gd name="adj2" fmla="val 697099"/>
-              <a:gd name="adj3" fmla="val 21018354"/>
-              <a:gd name="adj4" fmla="val 10650853"/>
-              <a:gd name="adj5" fmla="val 7062"/>
-            </a:avLst>
-          </a:prstGeom>
-        </p:spPr>
-        <p:style>
-          <a:lnRef idx="2">
-            <a:schemeClr val="accent1">
-              <a:shade val="50000"/>
-            </a:schemeClr>
-          </a:lnRef>
-          <a:fillRef idx="1">
-            <a:schemeClr val="accent1"/>
-          </a:fillRef>
-          <a:effectRef idx="0">
-            <a:schemeClr val="accent1"/>
-          </a:effectRef>
-          <a:fontRef idx="minor">
-            <a:schemeClr val="lt1"/>
-          </a:fontRef>
-        </p:style>
-        <p:txBody>
-          <a:bodyPr rtlCol="0" anchor="ctr"/>
-          <a:lstStyle/>
-          <a:p>
-            <a:pPr algn="ctr"/>
-            <a:endParaRPr lang="en-US" dirty="0">
-              <a:solidFill>
-                <a:schemeClr val="tx1"/>
-              </a:solidFill>
-            </a:endParaRPr>
-          </a:p>
-        </p:txBody>
-      </p:sp>
-      <p:sp>
-        <p:nvSpPr>
-          <p:cNvPr id="21" name="Arrow: Right 20">
-            <a:extLst>
-              <a:ext uri="{FF2B5EF4-FFF2-40B4-BE49-F238E27FC236}">
-                <a16:creationId xmlns:a16="http://schemas.microsoft.com/office/drawing/2014/main" id="{E48BFB20-858B-407A-8813-88683EF0ED4F}"/>
-              </a:ext>
-            </a:extLst>
-          </p:cNvPr>
-          <p:cNvSpPr/>
-          <p:nvPr/>
-        </p:nvSpPr>
-        <p:spPr>
-          <a:xfrm>
-            <a:off x="6339588" y="2960868"/>
-            <a:ext cx="1955225" cy="117709"/>
-          </a:xfrm>
-          <a:prstGeom prst="rightArrow">
-            <a:avLst/>
-          </a:prstGeom>
-        </p:spPr>
-        <p:style>
-          <a:lnRef idx="2">
-            <a:schemeClr val="accent1">
-              <a:shade val="50000"/>
-            </a:schemeClr>
-          </a:lnRef>
-          <a:fillRef idx="1">
-            <a:schemeClr val="accent1"/>
-          </a:fillRef>
-          <a:effectRef idx="0">
-            <a:schemeClr val="accent1"/>
-          </a:effectRef>
-          <a:fontRef idx="minor">
-            <a:schemeClr val="lt1"/>
-          </a:fontRef>
-        </p:style>
-        <p:txBody>
-          <a:bodyPr rtlCol="0" anchor="ctr"/>
-          <a:lstStyle/>
-          <a:p>
-            <a:pPr algn="ctr"/>
-            <a:endParaRPr lang="en-US">
-              <a:solidFill>
-                <a:schemeClr val="tx1"/>
-              </a:solidFill>
-            </a:endParaRPr>
-          </a:p>
-        </p:txBody>
-      </p:sp>
-      <p:sp>
-        <p:nvSpPr>
-          <p:cNvPr id="24" name="TextBox 23">
-            <a:extLst>
-              <a:ext uri="{FF2B5EF4-FFF2-40B4-BE49-F238E27FC236}">
-                <a16:creationId xmlns:a16="http://schemas.microsoft.com/office/drawing/2014/main" id="{530ACF03-3E21-4783-A1BC-2E6A3F24CB67}"/>
-              </a:ext>
-            </a:extLst>
-          </p:cNvPr>
-          <p:cNvSpPr txBox="1"/>
-          <p:nvPr/>
-        </p:nvSpPr>
-        <p:spPr>
-          <a:xfrm>
-            <a:off x="2329474" y="5253698"/>
-            <a:ext cx="2084302" cy="369332"/>
-          </a:xfrm>
-          <a:prstGeom prst="rect">
-            <a:avLst/>
-          </a:prstGeom>
-          <a:noFill/>
-        </p:spPr>
-        <p:txBody>
-          <a:bodyPr wrap="square" rtlCol="0">
-            <a:spAutoFit/>
-          </a:bodyPr>
-          <a:lstStyle/>
-          <a:p>
-            <a:r>
-              <a:rPr lang="en-US" dirty="0"/>
-              <a:t>Exchange Scenarios:</a:t>
-            </a:r>
-          </a:p>
-        </p:txBody>
-      </p:sp>
-      <p:sp>
-        <p:nvSpPr>
-          <p:cNvPr id="25" name="TextBox 24">
-            <a:extLst>
-              <a:ext uri="{FF2B5EF4-FFF2-40B4-BE49-F238E27FC236}">
-                <a16:creationId xmlns:a16="http://schemas.microsoft.com/office/drawing/2014/main" id="{7919C991-B75E-4E1C-82AB-C8912DED7F00}"/>
-              </a:ext>
-            </a:extLst>
-          </p:cNvPr>
-          <p:cNvSpPr txBox="1"/>
-          <p:nvPr/>
-        </p:nvSpPr>
-        <p:spPr>
-          <a:xfrm>
-            <a:off x="6339588" y="5259860"/>
-            <a:ext cx="2129299" cy="646331"/>
-          </a:xfrm>
-          <a:prstGeom prst="rect">
-            <a:avLst/>
-          </a:prstGeom>
-          <a:noFill/>
-        </p:spPr>
-        <p:txBody>
-          <a:bodyPr wrap="square" rtlCol="0">
-            <a:spAutoFit/>
-          </a:bodyPr>
-          <a:lstStyle/>
-          <a:p>
-            <a:r>
-              <a:rPr lang="en-US" dirty="0"/>
-              <a:t>Reporting Scenarios:</a:t>
-            </a:r>
-          </a:p>
-          <a:p>
-            <a:endParaRPr lang="en-US" dirty="0"/>
-          </a:p>
-        </p:txBody>
-      </p:sp>
-      <p:grpSp>
-        <p:nvGrpSpPr>
-          <p:cNvPr id="17" name="Group 16">
-            <a:extLst>
-              <a:ext uri="{FF2B5EF4-FFF2-40B4-BE49-F238E27FC236}">
-                <a16:creationId xmlns:a16="http://schemas.microsoft.com/office/drawing/2014/main" id="{2F3557E3-0CAD-984F-A138-ED1F380E79BA}"/>
-              </a:ext>
-            </a:extLst>
-          </p:cNvPr>
-          <p:cNvGrpSpPr/>
-          <p:nvPr/>
-        </p:nvGrpSpPr>
-        <p:grpSpPr>
-          <a:xfrm>
-            <a:off x="1373867" y="883408"/>
-            <a:ext cx="4965722" cy="969264"/>
-            <a:chOff x="1458252" y="478790"/>
-            <a:chExt cx="4880073" cy="969264"/>
-          </a:xfrm>
-        </p:grpSpPr>
-        <p:sp>
-          <p:nvSpPr>
-            <p:cNvPr id="13" name="Arrow: Pentagon 12">
-              <a:extLst>
-                <a:ext uri="{FF2B5EF4-FFF2-40B4-BE49-F238E27FC236}">
-                  <a16:creationId xmlns:a16="http://schemas.microsoft.com/office/drawing/2014/main" id="{729B8AD1-13E9-444A-B7CD-6C4120D04F71}"/>
-                </a:ext>
-              </a:extLst>
-            </p:cNvPr>
-            <p:cNvSpPr/>
-            <p:nvPr/>
-          </p:nvSpPr>
-          <p:spPr>
-            <a:xfrm>
-              <a:off x="1458252" y="721106"/>
-              <a:ext cx="978408" cy="484632"/>
-            </a:xfrm>
-            <a:prstGeom prst="homePlate">
-              <a:avLst/>
-            </a:prstGeom>
-          </p:spPr>
-          <p:style>
-            <a:lnRef idx="2">
-              <a:schemeClr val="accent1">
-                <a:shade val="50000"/>
-              </a:schemeClr>
-            </a:lnRef>
-            <a:fillRef idx="1">
-              <a:schemeClr val="accent1"/>
-            </a:fillRef>
-            <a:effectRef idx="0">
-              <a:schemeClr val="accent1"/>
-            </a:effectRef>
-            <a:fontRef idx="minor">
-              <a:schemeClr val="lt1"/>
-            </a:fontRef>
-          </p:style>
-          <p:txBody>
-            <a:bodyPr rtlCol="0" anchor="ctr"/>
-            <a:lstStyle/>
-            <a:p>
-              <a:pPr algn="ctr"/>
-              <a:endParaRPr lang="en-US"/>
-            </a:p>
-          </p:txBody>
-        </p:sp>
-        <p:sp>
-          <p:nvSpPr>
-            <p:cNvPr id="14" name="Arrow: Chevron 13">
-              <a:extLst>
-                <a:ext uri="{FF2B5EF4-FFF2-40B4-BE49-F238E27FC236}">
-                  <a16:creationId xmlns:a16="http://schemas.microsoft.com/office/drawing/2014/main" id="{81DD1B9B-200A-438F-A0E4-6C248ED5CD59}"/>
-                </a:ext>
-              </a:extLst>
-            </p:cNvPr>
-            <p:cNvSpPr/>
-            <p:nvPr/>
-          </p:nvSpPr>
-          <p:spPr>
-            <a:xfrm>
-              <a:off x="2436660" y="721106"/>
-              <a:ext cx="978408" cy="484632"/>
-            </a:xfrm>
-            <a:prstGeom prst="chevron">
-              <a:avLst/>
-            </a:prstGeom>
-          </p:spPr>
-          <p:style>
-            <a:lnRef idx="2">
-              <a:schemeClr val="accent1">
-                <a:shade val="50000"/>
-              </a:schemeClr>
-            </a:lnRef>
-            <a:fillRef idx="1">
-              <a:schemeClr val="accent1"/>
-            </a:fillRef>
-            <a:effectRef idx="0">
-              <a:schemeClr val="accent1"/>
-            </a:effectRef>
-            <a:fontRef idx="minor">
-              <a:schemeClr val="lt1"/>
-            </a:fontRef>
-          </p:style>
-          <p:txBody>
-            <a:bodyPr rtlCol="0" anchor="ctr"/>
-            <a:lstStyle/>
-            <a:p>
-              <a:pPr algn="ctr"/>
-              <a:endParaRPr lang="en-US">
-                <a:solidFill>
-                  <a:schemeClr val="tx1"/>
-                </a:solidFill>
-              </a:endParaRPr>
-            </a:p>
-          </p:txBody>
-        </p:sp>
-        <p:sp>
-          <p:nvSpPr>
-            <p:cNvPr id="15" name="Arrow: Chevron 14">
-              <a:extLst>
-                <a:ext uri="{FF2B5EF4-FFF2-40B4-BE49-F238E27FC236}">
-                  <a16:creationId xmlns:a16="http://schemas.microsoft.com/office/drawing/2014/main" id="{08BA4365-A150-4FD6-9FEF-8FA2C956CAF6}"/>
-                </a:ext>
-              </a:extLst>
-            </p:cNvPr>
-            <p:cNvSpPr/>
-            <p:nvPr/>
-          </p:nvSpPr>
-          <p:spPr>
-            <a:xfrm>
-              <a:off x="3415068" y="721106"/>
-              <a:ext cx="978408" cy="484632"/>
-            </a:xfrm>
-            <a:prstGeom prst="chevron">
-              <a:avLst/>
-            </a:prstGeom>
-          </p:spPr>
-          <p:style>
-            <a:lnRef idx="2">
-              <a:schemeClr val="accent1">
-                <a:shade val="50000"/>
-              </a:schemeClr>
-            </a:lnRef>
-            <a:fillRef idx="1">
-              <a:schemeClr val="accent1"/>
-            </a:fillRef>
-            <a:effectRef idx="0">
-              <a:schemeClr val="accent1"/>
-            </a:effectRef>
-            <a:fontRef idx="minor">
-              <a:schemeClr val="lt1"/>
-            </a:fontRef>
-          </p:style>
-          <p:txBody>
-            <a:bodyPr rtlCol="0" anchor="ctr"/>
-            <a:lstStyle/>
-            <a:p>
-              <a:pPr algn="ctr"/>
-              <a:endParaRPr lang="en-US">
-                <a:solidFill>
-                  <a:schemeClr val="tx1"/>
-                </a:solidFill>
-              </a:endParaRPr>
-            </a:p>
-          </p:txBody>
-        </p:sp>
-        <p:sp>
-          <p:nvSpPr>
-            <p:cNvPr id="16" name="Arrow: Chevron 15">
-              <a:extLst>
-                <a:ext uri="{FF2B5EF4-FFF2-40B4-BE49-F238E27FC236}">
-                  <a16:creationId xmlns:a16="http://schemas.microsoft.com/office/drawing/2014/main" id="{3B8A07A9-79C6-4050-8CE1-EF7EAEFD078B}"/>
-                </a:ext>
-              </a:extLst>
-            </p:cNvPr>
-            <p:cNvSpPr/>
-            <p:nvPr/>
-          </p:nvSpPr>
-          <p:spPr>
-            <a:xfrm>
-              <a:off x="4393476" y="721106"/>
-              <a:ext cx="978408" cy="484632"/>
-            </a:xfrm>
-            <a:prstGeom prst="chevron">
-              <a:avLst/>
-            </a:prstGeom>
-          </p:spPr>
-          <p:style>
-            <a:lnRef idx="2">
-              <a:schemeClr val="accent1">
-                <a:shade val="50000"/>
-              </a:schemeClr>
-            </a:lnRef>
-            <a:fillRef idx="1">
-              <a:schemeClr val="accent1"/>
-            </a:fillRef>
-            <a:effectRef idx="0">
-              <a:schemeClr val="accent1"/>
-            </a:effectRef>
-            <a:fontRef idx="minor">
-              <a:schemeClr val="lt1"/>
-            </a:fontRef>
-          </p:style>
-          <p:txBody>
-            <a:bodyPr rtlCol="0" anchor="ctr"/>
-            <a:lstStyle/>
-            <a:p>
-              <a:pPr algn="ctr"/>
-              <a:endParaRPr lang="en-US">
-                <a:solidFill>
-                  <a:schemeClr val="tx1"/>
-                </a:solidFill>
-              </a:endParaRPr>
-            </a:p>
-          </p:txBody>
-        </p:sp>
-        <p:sp>
-          <p:nvSpPr>
-            <p:cNvPr id="20" name="Arrow: Notched Right 19">
-              <a:extLst>
-                <a:ext uri="{FF2B5EF4-FFF2-40B4-BE49-F238E27FC236}">
-                  <a16:creationId xmlns:a16="http://schemas.microsoft.com/office/drawing/2014/main" id="{71AA151A-D77F-4A87-9B7C-4C202BBB397A}"/>
-                </a:ext>
-              </a:extLst>
-            </p:cNvPr>
-            <p:cNvSpPr/>
-            <p:nvPr/>
-          </p:nvSpPr>
-          <p:spPr>
-            <a:xfrm>
-              <a:off x="5349406" y="478790"/>
-              <a:ext cx="988919" cy="969264"/>
-            </a:xfrm>
-            <a:prstGeom prst="notchedRightArrow">
-              <a:avLst>
-                <a:gd name="adj1" fmla="val 50000"/>
-                <a:gd name="adj2" fmla="val 54880"/>
-              </a:avLst>
-            </a:prstGeom>
-          </p:spPr>
-          <p:style>
-            <a:lnRef idx="2">
-              <a:schemeClr val="accent1">
-                <a:shade val="50000"/>
-              </a:schemeClr>
-            </a:lnRef>
-            <a:fillRef idx="1">
-              <a:schemeClr val="accent1"/>
-            </a:fillRef>
-            <a:effectRef idx="0">
-              <a:schemeClr val="accent1"/>
-            </a:effectRef>
-            <a:fontRef idx="minor">
-              <a:schemeClr val="lt1"/>
-            </a:fontRef>
-          </p:style>
-          <p:txBody>
-            <a:bodyPr rtlCol="0" anchor="ctr"/>
-            <a:lstStyle/>
-            <a:p>
-              <a:pPr algn="ctr"/>
-              <a:endParaRPr lang="en-US"/>
-            </a:p>
-          </p:txBody>
-        </p:sp>
-      </p:grpSp>
-      <p:sp>
-        <p:nvSpPr>
-          <p:cNvPr id="26" name="TextBox 25">
-            <a:extLst>
-              <a:ext uri="{FF2B5EF4-FFF2-40B4-BE49-F238E27FC236}">
-                <a16:creationId xmlns:a16="http://schemas.microsoft.com/office/drawing/2014/main" id="{5974DC83-FDAC-4BE4-B479-F9CA0E1AD844}"/>
-              </a:ext>
-            </a:extLst>
-          </p:cNvPr>
-          <p:cNvSpPr txBox="1"/>
-          <p:nvPr/>
-        </p:nvSpPr>
-        <p:spPr>
-          <a:xfrm>
-            <a:off x="2444949" y="776751"/>
-            <a:ext cx="2209064" cy="369332"/>
-          </a:xfrm>
-          <a:prstGeom prst="rect">
-            <a:avLst/>
-          </a:prstGeom>
-          <a:noFill/>
-        </p:spPr>
-        <p:txBody>
-          <a:bodyPr wrap="square" rtlCol="0">
-            <a:spAutoFit/>
-          </a:bodyPr>
-          <a:lstStyle/>
-          <a:p>
-            <a:r>
-              <a:rPr lang="en-US" dirty="0"/>
-              <a:t>Measurement Period</a:t>
-            </a:r>
-          </a:p>
-        </p:txBody>
-      </p:sp>
-      <p:sp>
-        <p:nvSpPr>
-          <p:cNvPr id="27" name="TextBox 26">
-            <a:extLst>
-              <a:ext uri="{FF2B5EF4-FFF2-40B4-BE49-F238E27FC236}">
-                <a16:creationId xmlns:a16="http://schemas.microsoft.com/office/drawing/2014/main" id="{A9999BC3-731A-4D2B-9BCD-2F45DFA49C48}"/>
-              </a:ext>
-            </a:extLst>
-          </p:cNvPr>
-          <p:cNvSpPr txBox="1"/>
-          <p:nvPr/>
-        </p:nvSpPr>
-        <p:spPr>
-          <a:xfrm>
-            <a:off x="188663" y="201721"/>
-            <a:ext cx="2782300" cy="369332"/>
-          </a:xfrm>
-          <a:prstGeom prst="rect">
-            <a:avLst/>
-          </a:prstGeom>
-          <a:noFill/>
-        </p:spPr>
-        <p:txBody>
-          <a:bodyPr wrap="none" rtlCol="0">
-            <a:spAutoFit/>
-          </a:bodyPr>
-          <a:lstStyle/>
-          <a:p>
-            <a:r>
-              <a:rPr lang="en-US" dirty="0"/>
-              <a:t>Quality Reporting Scenarios</a:t>
-            </a:r>
-          </a:p>
-        </p:txBody>
-      </p:sp>
-      <p:grpSp>
-        <p:nvGrpSpPr>
-          <p:cNvPr id="19" name="Group 18">
-            <a:extLst>
-              <a:ext uri="{FF2B5EF4-FFF2-40B4-BE49-F238E27FC236}">
-                <a16:creationId xmlns:a16="http://schemas.microsoft.com/office/drawing/2014/main" id="{2B6DA874-73EC-BD4A-B710-73713864466C}"/>
-              </a:ext>
-            </a:extLst>
-          </p:cNvPr>
-          <p:cNvGrpSpPr/>
-          <p:nvPr/>
-        </p:nvGrpSpPr>
-        <p:grpSpPr>
-          <a:xfrm>
-            <a:off x="6497766" y="3500792"/>
-            <a:ext cx="1913447" cy="918761"/>
-            <a:chOff x="6796559" y="3235267"/>
-            <a:chExt cx="1913447" cy="918761"/>
-          </a:xfrm>
-        </p:grpSpPr>
-        <p:sp>
-          <p:nvSpPr>
-            <p:cNvPr id="59" name="Snip Single Corner Rectangle 58">
-              <a:extLst>
-                <a:ext uri="{FF2B5EF4-FFF2-40B4-BE49-F238E27FC236}">
-                  <a16:creationId xmlns:a16="http://schemas.microsoft.com/office/drawing/2014/main" id="{A57D1F6A-D447-164F-A432-DFE0DA3047FB}"/>
-                </a:ext>
-              </a:extLst>
-            </p:cNvPr>
-            <p:cNvSpPr/>
-            <p:nvPr/>
-          </p:nvSpPr>
-          <p:spPr>
-            <a:xfrm>
-              <a:off x="6843003" y="3235267"/>
-              <a:ext cx="1702641" cy="918761"/>
-            </a:xfrm>
-            <a:prstGeom prst="snip1Rect">
-              <a:avLst/>
-            </a:prstGeom>
-            <a:solidFill>
-              <a:schemeClr val="accent6">
-                <a:lumMod val="60000"/>
-                <a:lumOff val="40000"/>
-              </a:schemeClr>
-            </a:solidFill>
-            <a:ln>
-              <a:solidFill>
-                <a:schemeClr val="tx1"/>
-              </a:solidFill>
-            </a:ln>
-          </p:spPr>
-          <p:style>
-            <a:lnRef idx="2">
-              <a:schemeClr val="accent1">
-                <a:shade val="50000"/>
-              </a:schemeClr>
-            </a:lnRef>
-            <a:fillRef idx="1">
-              <a:schemeClr val="accent1"/>
-            </a:fillRef>
-            <a:effectRef idx="0">
-              <a:schemeClr val="accent1"/>
-            </a:effectRef>
-            <a:fontRef idx="minor">
-              <a:schemeClr val="lt1"/>
-            </a:fontRef>
-          </p:style>
-          <p:txBody>
-            <a:bodyPr rtlCol="0" anchor="ctr"/>
-            <a:lstStyle/>
-            <a:p>
-              <a:pPr algn="ctr"/>
-              <a:endParaRPr lang="en-US"/>
-            </a:p>
-          </p:txBody>
-        </p:sp>
-        <p:sp>
-          <p:nvSpPr>
-            <p:cNvPr id="38" name="TextBox 37">
-              <a:extLst>
-                <a:ext uri="{FF2B5EF4-FFF2-40B4-BE49-F238E27FC236}">
-                  <a16:creationId xmlns:a16="http://schemas.microsoft.com/office/drawing/2014/main" id="{ECAC1126-8A72-43E0-81B6-CDB1970A707E}"/>
-                </a:ext>
-              </a:extLst>
-            </p:cNvPr>
-            <p:cNvSpPr txBox="1"/>
-            <p:nvPr/>
-          </p:nvSpPr>
-          <p:spPr>
-            <a:xfrm>
-              <a:off x="6811245" y="3241146"/>
-              <a:ext cx="1592019" cy="338554"/>
-            </a:xfrm>
-            <a:prstGeom prst="rect">
-              <a:avLst/>
-            </a:prstGeom>
-            <a:noFill/>
-          </p:spPr>
-          <p:txBody>
-            <a:bodyPr wrap="square" rtlCol="0">
-              <a:spAutoFit/>
-            </a:bodyPr>
-            <a:lstStyle/>
-            <a:p>
-              <a:r>
-                <a:rPr lang="en-US" sz="1600" dirty="0">
-                  <a:latin typeface="Courier" pitchFamily="2" charset="0"/>
-                </a:rPr>
-                <a:t>individual</a:t>
-              </a:r>
-            </a:p>
-          </p:txBody>
-        </p:sp>
-        <p:sp>
-          <p:nvSpPr>
-            <p:cNvPr id="39" name="TextBox 38">
-              <a:extLst>
-                <a:ext uri="{FF2B5EF4-FFF2-40B4-BE49-F238E27FC236}">
-                  <a16:creationId xmlns:a16="http://schemas.microsoft.com/office/drawing/2014/main" id="{19F38669-ACCD-4463-89D1-B738E5C4071D}"/>
-                </a:ext>
-              </a:extLst>
-            </p:cNvPr>
-            <p:cNvSpPr txBox="1"/>
-            <p:nvPr/>
-          </p:nvSpPr>
-          <p:spPr>
-            <a:xfrm>
-              <a:off x="6811245" y="3528554"/>
-              <a:ext cx="1280073" cy="338554"/>
-            </a:xfrm>
-            <a:prstGeom prst="rect">
-              <a:avLst/>
-            </a:prstGeom>
-            <a:noFill/>
-          </p:spPr>
-          <p:txBody>
-            <a:bodyPr wrap="square" rtlCol="0">
-              <a:spAutoFit/>
-            </a:bodyPr>
-            <a:lstStyle/>
-            <a:p>
-              <a:r>
-                <a:rPr lang="en-US" sz="1600" dirty="0">
-                  <a:latin typeface="Courier" pitchFamily="2" charset="0"/>
-                </a:rPr>
-                <a:t>summary</a:t>
-              </a:r>
-            </a:p>
-          </p:txBody>
-        </p:sp>
-        <p:sp>
-          <p:nvSpPr>
-            <p:cNvPr id="40" name="TextBox 39">
-              <a:extLst>
-                <a:ext uri="{FF2B5EF4-FFF2-40B4-BE49-F238E27FC236}">
-                  <a16:creationId xmlns:a16="http://schemas.microsoft.com/office/drawing/2014/main" id="{5176EA77-8354-472A-B825-A49D042C6325}"/>
-                </a:ext>
-              </a:extLst>
-            </p:cNvPr>
-            <p:cNvSpPr txBox="1"/>
-            <p:nvPr/>
-          </p:nvSpPr>
-          <p:spPr>
-            <a:xfrm>
-              <a:off x="6796559" y="3815474"/>
-              <a:ext cx="1913447" cy="338554"/>
-            </a:xfrm>
-            <a:prstGeom prst="rect">
-              <a:avLst/>
-            </a:prstGeom>
-            <a:noFill/>
-          </p:spPr>
-          <p:txBody>
-            <a:bodyPr wrap="square" rtlCol="0">
-              <a:spAutoFit/>
-            </a:bodyPr>
-            <a:lstStyle/>
-            <a:p>
-              <a:r>
-                <a:rPr lang="en-US" sz="1600" dirty="0">
-                  <a:latin typeface="Courier" pitchFamily="2" charset="0"/>
-                </a:rPr>
-                <a:t>patient-list</a:t>
-              </a:r>
-            </a:p>
-          </p:txBody>
-        </p:sp>
-      </p:grpSp>
-      <p:sp>
-        <p:nvSpPr>
-          <p:cNvPr id="50" name="TextBox 49">
-            <a:extLst>
-              <a:ext uri="{FF2B5EF4-FFF2-40B4-BE49-F238E27FC236}">
-                <a16:creationId xmlns:a16="http://schemas.microsoft.com/office/drawing/2014/main" id="{C7C10D4D-E94F-E142-91D7-2B14A108A1E4}"/>
-              </a:ext>
-            </a:extLst>
-          </p:cNvPr>
-          <p:cNvSpPr txBox="1"/>
-          <p:nvPr/>
-        </p:nvSpPr>
-        <p:spPr>
-          <a:xfrm>
-            <a:off x="1517598" y="5602473"/>
-            <a:ext cx="3837065" cy="369332"/>
-          </a:xfrm>
-          <a:prstGeom prst="rect">
-            <a:avLst/>
-          </a:prstGeom>
-          <a:noFill/>
-        </p:spPr>
-        <p:txBody>
-          <a:bodyPr wrap="square" rtlCol="0">
-            <a:spAutoFit/>
-          </a:bodyPr>
-          <a:lstStyle/>
-          <a:p>
-            <a:r>
-              <a:rPr lang="en-US" dirty="0"/>
-              <a:t>Submit Data, Collect Data, Subscription</a:t>
-            </a:r>
-          </a:p>
-        </p:txBody>
-      </p:sp>
-      <p:grpSp>
-        <p:nvGrpSpPr>
-          <p:cNvPr id="18" name="Group 17">
-            <a:extLst>
-              <a:ext uri="{FF2B5EF4-FFF2-40B4-BE49-F238E27FC236}">
-                <a16:creationId xmlns:a16="http://schemas.microsoft.com/office/drawing/2014/main" id="{AEEC9073-E7FB-DE4B-9FC4-E36D1CFA9550}"/>
-              </a:ext>
-            </a:extLst>
-          </p:cNvPr>
-          <p:cNvGrpSpPr/>
-          <p:nvPr/>
-        </p:nvGrpSpPr>
-        <p:grpSpPr>
-          <a:xfrm>
-            <a:off x="2707669" y="4207298"/>
-            <a:ext cx="2124808" cy="664084"/>
-            <a:chOff x="2862110" y="2885008"/>
-            <a:chExt cx="2247060" cy="583024"/>
-          </a:xfrm>
-        </p:grpSpPr>
-        <p:sp>
-          <p:nvSpPr>
-            <p:cNvPr id="9" name="Snip Single Corner Rectangle 8">
-              <a:extLst>
-                <a:ext uri="{FF2B5EF4-FFF2-40B4-BE49-F238E27FC236}">
-                  <a16:creationId xmlns:a16="http://schemas.microsoft.com/office/drawing/2014/main" id="{0854D18C-8904-5248-9E54-B9A7993466BA}"/>
-                </a:ext>
-              </a:extLst>
-            </p:cNvPr>
-            <p:cNvSpPr/>
-            <p:nvPr/>
-          </p:nvSpPr>
-          <p:spPr>
-            <a:xfrm>
-              <a:off x="2862110" y="2885008"/>
-              <a:ext cx="2247060" cy="583024"/>
-            </a:xfrm>
-            <a:prstGeom prst="snip1Rect">
-              <a:avLst/>
-            </a:prstGeom>
-            <a:solidFill>
-              <a:schemeClr val="accent6">
-                <a:lumMod val="60000"/>
-                <a:lumOff val="40000"/>
-              </a:schemeClr>
-            </a:solidFill>
-            <a:ln>
-              <a:solidFill>
-                <a:schemeClr val="tx1"/>
-              </a:solidFill>
-            </a:ln>
-          </p:spPr>
-          <p:style>
-            <a:lnRef idx="2">
-              <a:schemeClr val="accent1">
-                <a:shade val="50000"/>
-              </a:schemeClr>
-            </a:lnRef>
-            <a:fillRef idx="1">
-              <a:schemeClr val="accent1"/>
-            </a:fillRef>
-            <a:effectRef idx="0">
-              <a:schemeClr val="accent1"/>
-            </a:effectRef>
-            <a:fontRef idx="minor">
-              <a:schemeClr val="lt1"/>
-            </a:fontRef>
-          </p:style>
-          <p:txBody>
-            <a:bodyPr rtlCol="0" anchor="ctr"/>
-            <a:lstStyle/>
-            <a:p>
-              <a:pPr algn="ctr"/>
-              <a:endParaRPr lang="en-US"/>
-            </a:p>
-          </p:txBody>
-        </p:sp>
-        <p:sp>
-          <p:nvSpPr>
-            <p:cNvPr id="2" name="TextBox 1">
-              <a:extLst>
-                <a:ext uri="{FF2B5EF4-FFF2-40B4-BE49-F238E27FC236}">
-                  <a16:creationId xmlns:a16="http://schemas.microsoft.com/office/drawing/2014/main" id="{7112CC0E-364C-4B40-941C-ECFBE718FD91}"/>
-                </a:ext>
-              </a:extLst>
-            </p:cNvPr>
-            <p:cNvSpPr txBox="1"/>
-            <p:nvPr/>
-          </p:nvSpPr>
-          <p:spPr>
-            <a:xfrm>
-              <a:off x="2921276" y="3024531"/>
-              <a:ext cx="2153285" cy="297229"/>
-            </a:xfrm>
-            <a:prstGeom prst="rect">
-              <a:avLst/>
-            </a:prstGeom>
-            <a:noFill/>
-          </p:spPr>
-          <p:txBody>
-            <a:bodyPr wrap="none" rtlCol="0">
-              <a:spAutoFit/>
-            </a:bodyPr>
-            <a:lstStyle/>
-            <a:p>
-              <a:r>
-                <a:rPr lang="en-US" sz="1600" dirty="0">
-                  <a:latin typeface="Courier" pitchFamily="2" charset="0"/>
-                </a:rPr>
-                <a:t>data-collection</a:t>
-              </a:r>
-            </a:p>
-          </p:txBody>
-        </p:sp>
-      </p:grpSp>
-      <p:sp>
-        <p:nvSpPr>
-          <p:cNvPr id="3" name="TextBox 2">
-            <a:extLst>
-              <a:ext uri="{FF2B5EF4-FFF2-40B4-BE49-F238E27FC236}">
-                <a16:creationId xmlns:a16="http://schemas.microsoft.com/office/drawing/2014/main" id="{00579A05-9DD2-BC46-8BE8-67B089111F3E}"/>
-              </a:ext>
-            </a:extLst>
-          </p:cNvPr>
-          <p:cNvSpPr txBox="1"/>
-          <p:nvPr/>
-        </p:nvSpPr>
-        <p:spPr>
-          <a:xfrm>
-            <a:off x="7017426" y="5599276"/>
-            <a:ext cx="698862" cy="369332"/>
-          </a:xfrm>
-          <a:prstGeom prst="rect">
-            <a:avLst/>
-          </a:prstGeom>
-          <a:noFill/>
-        </p:spPr>
-        <p:txBody>
-          <a:bodyPr wrap="square" rtlCol="0">
-            <a:spAutoFit/>
-          </a:bodyPr>
-          <a:lstStyle/>
-          <a:p>
-            <a:r>
-              <a:rPr lang="en-US" dirty="0"/>
-              <a:t>POST</a:t>
-            </a:r>
-          </a:p>
-        </p:txBody>
-      </p:sp>
-      <p:sp>
-        <p:nvSpPr>
-          <p:cNvPr id="6" name="Rectangle: Rounded Corners 5">
-            <a:extLst>
-              <a:ext uri="{FF2B5EF4-FFF2-40B4-BE49-F238E27FC236}">
-                <a16:creationId xmlns:a16="http://schemas.microsoft.com/office/drawing/2014/main" id="{62CA6A54-71B1-49F3-9E4E-30782D630A40}"/>
-              </a:ext>
-            </a:extLst>
-          </p:cNvPr>
-          <p:cNvSpPr/>
-          <p:nvPr/>
-        </p:nvSpPr>
-        <p:spPr>
-          <a:xfrm>
-            <a:off x="4470314" y="2613368"/>
-            <a:ext cx="1869274" cy="788277"/>
-          </a:xfrm>
-          <a:prstGeom prst="roundRect">
-            <a:avLst>
-              <a:gd name="adj" fmla="val 22815"/>
-            </a:avLst>
-          </a:prstGeom>
-        </p:spPr>
-        <p:style>
-          <a:lnRef idx="2">
-            <a:schemeClr val="dk1"/>
-          </a:lnRef>
-          <a:fillRef idx="1">
-            <a:schemeClr val="lt1"/>
-          </a:fillRef>
-          <a:effectRef idx="0">
-            <a:schemeClr val="dk1"/>
-          </a:effectRef>
-          <a:fontRef idx="minor">
-            <a:schemeClr val="dk1"/>
-          </a:fontRef>
-        </p:style>
-        <p:txBody>
-          <a:bodyPr rtlCol="0" anchor="ctr"/>
-          <a:lstStyle/>
-          <a:p>
-            <a:pPr algn="ctr"/>
-            <a:r>
-              <a:rPr lang="en-US" dirty="0"/>
-              <a:t>Consumers/</a:t>
-            </a:r>
-          </a:p>
-          <a:p>
-            <a:pPr algn="ctr"/>
-            <a:r>
-              <a:rPr lang="en-US" dirty="0"/>
-              <a:t>Reporters</a:t>
-            </a:r>
-          </a:p>
-        </p:txBody>
-      </p:sp>
-      <p:sp>
-        <p:nvSpPr>
-          <p:cNvPr id="4" name="Rectangle: Rounded Corners 3">
-            <a:extLst>
-              <a:ext uri="{FF2B5EF4-FFF2-40B4-BE49-F238E27FC236}">
-                <a16:creationId xmlns:a16="http://schemas.microsoft.com/office/drawing/2014/main" id="{7E8C27C6-A8F7-4EB1-AC17-256FCEF52D75}"/>
-              </a:ext>
-            </a:extLst>
-          </p:cNvPr>
-          <p:cNvSpPr/>
-          <p:nvPr/>
-        </p:nvSpPr>
-        <p:spPr>
-          <a:xfrm>
-            <a:off x="1326792" y="2660940"/>
-            <a:ext cx="1869274" cy="788277"/>
-          </a:xfrm>
-          <a:prstGeom prst="roundRect">
-            <a:avLst>
-              <a:gd name="adj" fmla="val 22815"/>
-            </a:avLst>
-          </a:prstGeom>
-        </p:spPr>
-        <p:style>
-          <a:lnRef idx="2">
-            <a:schemeClr val="dk1"/>
-          </a:lnRef>
-          <a:fillRef idx="1">
-            <a:schemeClr val="lt1"/>
-          </a:fillRef>
-          <a:effectRef idx="0">
-            <a:schemeClr val="dk1"/>
-          </a:effectRef>
-          <a:fontRef idx="minor">
-            <a:schemeClr val="dk1"/>
-          </a:fontRef>
-        </p:style>
-        <p:txBody>
-          <a:bodyPr rtlCol="0" anchor="ctr"/>
-          <a:lstStyle/>
-          <a:p>
-            <a:pPr algn="ctr"/>
-            <a:r>
-              <a:rPr lang="en-US" dirty="0"/>
-              <a:t>Producers</a:t>
-            </a:r>
-          </a:p>
-        </p:txBody>
-      </p:sp>
-    </p:spTree>
-    <p:extLst>
-      <p:ext uri="{BB962C8B-B14F-4D97-AF65-F5344CB8AC3E}">
-        <p14:creationId xmlns:p14="http://schemas.microsoft.com/office/powerpoint/2010/main" val="3927831198"/>
-      </p:ext>
-    </p:extLst>
-  </p:cSld>
-  <p:clrMapOvr>
-    <a:masterClrMapping/>
-  </p:clrMapOvr>
-</p:sld>
-</file>
-
 <file path=ppt/theme/theme1.xml><?xml version="1.0" encoding="utf-8"?>
 <a:theme xmlns:a="http://schemas.openxmlformats.org/drawingml/2006/main" name="Office Theme">
   <a:themeElements>

</xml_diff>